<commit_message>
tuple & dictionary slides
</commit_message>
<xml_diff>
--- a/ipsa/slides/dictionaries.pptx
+++ b/ipsa/slides/dictionaries.pptx
@@ -138,7 +138,7 @@
 <file path=ppt/revisionInfo.xml><?xml version="1.0" encoding="utf-8"?>
 <p1510:revInfo xmlns:a="http://schemas.openxmlformats.org/drawingml/2006/main" xmlns:r="http://schemas.openxmlformats.org/officeDocument/2006/relationships" xmlns:p1510="http://schemas.microsoft.com/office/powerpoint/2015/10/main">
   <p1510:revLst>
-    <p1510:client id="{AEFD98B7-9159-4FE3-84D8-FAE8F6B9861E}" v="29" dt="2022-02-19T10:49:59.423"/>
+    <p1510:client id="{3A49286A-3992-4B37-8BB5-DA83FEA0A6BC}" v="3" dt="2023-02-15T07:54:42.002"/>
   </p1510:revLst>
 </p1510:revInfo>
 </file>
@@ -360,6 +360,159 @@
     </pc:docChg>
   </pc:docChgLst>
   <pc:docChgLst>
+    <pc:chgData name="Gerth Stølting Brodal" userId="04ef4784-6591-4f86-a140-f5c3b108582a" providerId="ADAL" clId="{3A49286A-3992-4B37-8BB5-DA83FEA0A6BC}"/>
+    <pc:docChg chg="undo custSel modSld">
+      <pc:chgData name="Gerth Stølting Brodal" userId="04ef4784-6591-4f86-a140-f5c3b108582a" providerId="ADAL" clId="{3A49286A-3992-4B37-8BB5-DA83FEA0A6BC}" dt="2023-02-15T07:56:10.301" v="219" actId="20577"/>
+      <pc:docMkLst>
+        <pc:docMk/>
+      </pc:docMkLst>
+      <pc:sldChg chg="modSp mod">
+        <pc:chgData name="Gerth Stølting Brodal" userId="04ef4784-6591-4f86-a140-f5c3b108582a" providerId="ADAL" clId="{3A49286A-3992-4B37-8BB5-DA83FEA0A6BC}" dt="2023-02-15T07:26:17.322" v="42" actId="207"/>
+        <pc:sldMkLst>
+          <pc:docMk/>
+          <pc:sldMk cId="2460918877" sldId="545"/>
+        </pc:sldMkLst>
+        <pc:graphicFrameChg chg="modGraphic">
+          <ac:chgData name="Gerth Stølting Brodal" userId="04ef4784-6591-4f86-a140-f5c3b108582a" providerId="ADAL" clId="{3A49286A-3992-4B37-8BB5-DA83FEA0A6BC}" dt="2023-02-15T07:26:17.322" v="42" actId="207"/>
+          <ac:graphicFrameMkLst>
+            <pc:docMk/>
+            <pc:sldMk cId="2460918877" sldId="545"/>
+            <ac:graphicFrameMk id="14" creationId="{00000000-0000-0000-0000-000000000000}"/>
+          </ac:graphicFrameMkLst>
+        </pc:graphicFrameChg>
+      </pc:sldChg>
+      <pc:sldChg chg="modSp mod">
+        <pc:chgData name="Gerth Stølting Brodal" userId="04ef4784-6591-4f86-a140-f5c3b108582a" providerId="ADAL" clId="{3A49286A-3992-4B37-8BB5-DA83FEA0A6BC}" dt="2023-02-15T07:35:23.247" v="50" actId="313"/>
+        <pc:sldMkLst>
+          <pc:docMk/>
+          <pc:sldMk cId="2822266895" sldId="546"/>
+        </pc:sldMkLst>
+        <pc:graphicFrameChg chg="modGraphic">
+          <ac:chgData name="Gerth Stølting Brodal" userId="04ef4784-6591-4f86-a140-f5c3b108582a" providerId="ADAL" clId="{3A49286A-3992-4B37-8BB5-DA83FEA0A6BC}" dt="2023-02-15T07:35:23.247" v="50" actId="313"/>
+          <ac:graphicFrameMkLst>
+            <pc:docMk/>
+            <pc:sldMk cId="2822266895" sldId="546"/>
+            <ac:graphicFrameMk id="5" creationId="{00000000-0000-0000-0000-000000000000}"/>
+          </ac:graphicFrameMkLst>
+        </pc:graphicFrameChg>
+      </pc:sldChg>
+      <pc:sldChg chg="modSp mod">
+        <pc:chgData name="Gerth Stølting Brodal" userId="04ef4784-6591-4f86-a140-f5c3b108582a" providerId="ADAL" clId="{3A49286A-3992-4B37-8BB5-DA83FEA0A6BC}" dt="2023-02-15T07:07:54.666" v="2" actId="20577"/>
+        <pc:sldMkLst>
+          <pc:docMk/>
+          <pc:sldMk cId="58256463" sldId="548"/>
+        </pc:sldMkLst>
+        <pc:spChg chg="mod">
+          <ac:chgData name="Gerth Stølting Brodal" userId="04ef4784-6591-4f86-a140-f5c3b108582a" providerId="ADAL" clId="{3A49286A-3992-4B37-8BB5-DA83FEA0A6BC}" dt="2023-02-15T07:07:54.666" v="2" actId="20577"/>
+          <ac:spMkLst>
+            <pc:docMk/>
+            <pc:sldMk cId="58256463" sldId="548"/>
+            <ac:spMk id="3" creationId="{00000000-0000-0000-0000-000000000000}"/>
+          </ac:spMkLst>
+        </pc:spChg>
+      </pc:sldChg>
+      <pc:sldChg chg="modSp mod">
+        <pc:chgData name="Gerth Stølting Brodal" userId="04ef4784-6591-4f86-a140-f5c3b108582a" providerId="ADAL" clId="{3A49286A-3992-4B37-8BB5-DA83FEA0A6BC}" dt="2023-02-15T07:56:10.301" v="219" actId="20577"/>
+        <pc:sldMkLst>
+          <pc:docMk/>
+          <pc:sldMk cId="3852152376" sldId="550"/>
+        </pc:sldMkLst>
+        <pc:graphicFrameChg chg="modGraphic">
+          <ac:chgData name="Gerth Stølting Brodal" userId="04ef4784-6591-4f86-a140-f5c3b108582a" providerId="ADAL" clId="{3A49286A-3992-4B37-8BB5-DA83FEA0A6BC}" dt="2023-02-15T07:56:10.301" v="219" actId="20577"/>
+          <ac:graphicFrameMkLst>
+            <pc:docMk/>
+            <pc:sldMk cId="3852152376" sldId="550"/>
+            <ac:graphicFrameMk id="6" creationId="{00000000-0000-0000-0000-000000000000}"/>
+          </ac:graphicFrameMkLst>
+        </pc:graphicFrameChg>
+      </pc:sldChg>
+      <pc:sldChg chg="modSp mod modNotesTx">
+        <pc:chgData name="Gerth Stølting Brodal" userId="04ef4784-6591-4f86-a140-f5c3b108582a" providerId="ADAL" clId="{3A49286A-3992-4B37-8BB5-DA83FEA0A6BC}" dt="2023-02-15T07:13:19.465" v="34" actId="313"/>
+        <pc:sldMkLst>
+          <pc:docMk/>
+          <pc:sldMk cId="2739811714" sldId="554"/>
+        </pc:sldMkLst>
+        <pc:graphicFrameChg chg="modGraphic">
+          <ac:chgData name="Gerth Stølting Brodal" userId="04ef4784-6591-4f86-a140-f5c3b108582a" providerId="ADAL" clId="{3A49286A-3992-4B37-8BB5-DA83FEA0A6BC}" dt="2023-02-15T07:13:19.465" v="34" actId="313"/>
+          <ac:graphicFrameMkLst>
+            <pc:docMk/>
+            <pc:sldMk cId="2739811714" sldId="554"/>
+            <ac:graphicFrameMk id="9" creationId="{00000000-0000-0000-0000-000000000000}"/>
+          </ac:graphicFrameMkLst>
+        </pc:graphicFrameChg>
+      </pc:sldChg>
+      <pc:sldChg chg="modSp mod modNotesTx">
+        <pc:chgData name="Gerth Stølting Brodal" userId="04ef4784-6591-4f86-a140-f5c3b108582a" providerId="ADAL" clId="{3A49286A-3992-4B37-8BB5-DA83FEA0A6BC}" dt="2023-02-15T07:40:12.317" v="108" actId="20577"/>
+        <pc:sldMkLst>
+          <pc:docMk/>
+          <pc:sldMk cId="1145811308" sldId="555"/>
+        </pc:sldMkLst>
+        <pc:spChg chg="mod">
+          <ac:chgData name="Gerth Stølting Brodal" userId="04ef4784-6591-4f86-a140-f5c3b108582a" providerId="ADAL" clId="{3A49286A-3992-4B37-8BB5-DA83FEA0A6BC}" dt="2023-02-15T07:36:07.663" v="52" actId="20577"/>
+          <ac:spMkLst>
+            <pc:docMk/>
+            <pc:sldMk cId="1145811308" sldId="555"/>
+            <ac:spMk id="3" creationId="{00000000-0000-0000-0000-000000000000}"/>
+          </ac:spMkLst>
+        </pc:spChg>
+      </pc:sldChg>
+      <pc:sldChg chg="modSp mod">
+        <pc:chgData name="Gerth Stølting Brodal" userId="04ef4784-6591-4f86-a140-f5c3b108582a" providerId="ADAL" clId="{3A49286A-3992-4B37-8BB5-DA83FEA0A6BC}" dt="2023-02-15T07:23:46.419" v="37" actId="313"/>
+        <pc:sldMkLst>
+          <pc:docMk/>
+          <pc:sldMk cId="2970082559" sldId="561"/>
+        </pc:sldMkLst>
+        <pc:graphicFrameChg chg="modGraphic">
+          <ac:chgData name="Gerth Stølting Brodal" userId="04ef4784-6591-4f86-a140-f5c3b108582a" providerId="ADAL" clId="{3A49286A-3992-4B37-8BB5-DA83FEA0A6BC}" dt="2023-02-15T07:23:46.419" v="37" actId="313"/>
+          <ac:graphicFrameMkLst>
+            <pc:docMk/>
+            <pc:sldMk cId="2970082559" sldId="561"/>
+            <ac:graphicFrameMk id="16" creationId="{00000000-0000-0000-0000-000000000000}"/>
+          </ac:graphicFrameMkLst>
+        </pc:graphicFrameChg>
+      </pc:sldChg>
+      <pc:sldChg chg="addSp modSp mod modAnim">
+        <pc:chgData name="Gerth Stølting Brodal" userId="04ef4784-6591-4f86-a140-f5c3b108582a" providerId="ADAL" clId="{3A49286A-3992-4B37-8BB5-DA83FEA0A6BC}" dt="2023-02-15T07:54:42.002" v="211"/>
+        <pc:sldMkLst>
+          <pc:docMk/>
+          <pc:sldMk cId="630244301" sldId="566"/>
+        </pc:sldMkLst>
+        <pc:spChg chg="mod">
+          <ac:chgData name="Gerth Stølting Brodal" userId="04ef4784-6591-4f86-a140-f5c3b108582a" providerId="ADAL" clId="{3A49286A-3992-4B37-8BB5-DA83FEA0A6BC}" dt="2023-02-15T07:54:19.957" v="209" actId="1037"/>
+          <ac:spMkLst>
+            <pc:docMk/>
+            <pc:sldMk cId="630244301" sldId="566"/>
+            <ac:spMk id="2" creationId="{00000000-0000-0000-0000-000000000000}"/>
+          </ac:spMkLst>
+        </pc:spChg>
+        <pc:spChg chg="add mod">
+          <ac:chgData name="Gerth Stølting Brodal" userId="04ef4784-6591-4f86-a140-f5c3b108582a" providerId="ADAL" clId="{3A49286A-3992-4B37-8BB5-DA83FEA0A6BC}" dt="2023-02-15T07:54:39.447" v="210" actId="164"/>
+          <ac:spMkLst>
+            <pc:docMk/>
+            <pc:sldMk cId="630244301" sldId="566"/>
+            <ac:spMk id="4" creationId="{D7E080DF-C0C5-20D2-33A0-8827EF54D731}"/>
+          </ac:spMkLst>
+        </pc:spChg>
+        <pc:grpChg chg="add mod">
+          <ac:chgData name="Gerth Stølting Brodal" userId="04ef4784-6591-4f86-a140-f5c3b108582a" providerId="ADAL" clId="{3A49286A-3992-4B37-8BB5-DA83FEA0A6BC}" dt="2023-02-15T07:54:39.447" v="210" actId="164"/>
+          <ac:grpSpMkLst>
+            <pc:docMk/>
+            <pc:sldMk cId="630244301" sldId="566"/>
+            <ac:grpSpMk id="10" creationId="{1B0019EB-33BE-97BA-7C06-038561597A77}"/>
+          </ac:grpSpMkLst>
+        </pc:grpChg>
+        <pc:picChg chg="add mod">
+          <ac:chgData name="Gerth Stølting Brodal" userId="04ef4784-6591-4f86-a140-f5c3b108582a" providerId="ADAL" clId="{3A49286A-3992-4B37-8BB5-DA83FEA0A6BC}" dt="2023-02-15T07:54:39.447" v="210" actId="164"/>
+          <ac:picMkLst>
+            <pc:docMk/>
+            <pc:sldMk cId="630244301" sldId="566"/>
+            <ac:picMk id="7" creationId="{CA096CE3-516F-E1E8-40C5-CB86C3E9C347}"/>
+          </ac:picMkLst>
+        </pc:picChg>
+      </pc:sldChg>
+    </pc:docChg>
+  </pc:docChgLst>
+  <pc:docChgLst>
     <pc:chgData name="Gerth Stølting Brodal" userId="04ef4784-6591-4f86-a140-f5c3b108582a" providerId="ADAL" clId="{B701DC40-6812-41B8-B173-57A8218FDEAC}"/>
     <pc:docChg chg="undo custSel modSld">
       <pc:chgData name="Gerth Stølting Brodal" userId="04ef4784-6591-4f86-a140-f5c3b108582a" providerId="ADAL" clId="{B701DC40-6812-41B8-B173-57A8218FDEAC}" dt="2021-02-17T11:31:35.212" v="503"/>
@@ -557,7 +710,7 @@
           <a:p>
             <a:fld id="{FB1A172F-81D4-4DC4-9113-1DBD56EC3646}" type="datetimeFigureOut">
               <a:rPr lang="en-US" smtClean="0"/>
-              <a:t>11/19/2022</a:t>
+              <a:t>2/15/2023</a:t>
             </a:fld>
             <a:endParaRPr lang="en-US"/>
           </a:p>
@@ -964,6 +1117,13 @@
               <a:rPr lang="en-US" dirty="0" err="1"/>
               <a:t>hashable</a:t>
             </a:r>
+            <a:endParaRPr lang="en-US" dirty="0"/>
+          </a:p>
+          <a:p>
+            <a:r>
+              <a:rPr lang="en-US" dirty="0"/>
+              <a:t>Each new Python execution selects a new hash function</a:t>
+            </a:r>
             <a:endParaRPr lang="da-DK" dirty="0"/>
           </a:p>
         </p:txBody>
@@ -1648,6 +1808,57 @@
               <a:rPr lang="en-US" b="0" baseline="0" dirty="0"/>
               <a:t> object, you need to convert to a list first then.</a:t>
             </a:r>
+          </a:p>
+          <a:p>
+            <a:endParaRPr lang="en-US" b="0" baseline="0" dirty="0"/>
+          </a:p>
+          <a:p>
+            <a:r>
+              <a:rPr lang="en-US" b="0" dirty="0"/>
+              <a:t>d = {'a':1, 'b':2}</a:t>
+            </a:r>
+          </a:p>
+          <a:p>
+            <a:r>
+              <a:rPr lang="en-US" b="0" dirty="0"/>
+              <a:t>k = </a:t>
+            </a:r>
+            <a:r>
+              <a:rPr lang="en-US" b="0" dirty="0" err="1"/>
+              <a:t>d.keys</a:t>
+            </a:r>
+            <a:r>
+              <a:rPr lang="en-US" b="0" dirty="0"/>
+              <a:t>()</a:t>
+            </a:r>
+          </a:p>
+          <a:p>
+            <a:r>
+              <a:rPr lang="en-US" b="0" dirty="0"/>
+              <a:t>d['c'] = 3</a:t>
+            </a:r>
+          </a:p>
+          <a:p>
+            <a:r>
+              <a:rPr lang="en-US" b="0" dirty="0"/>
+              <a:t>k</a:t>
+            </a:r>
+          </a:p>
+          <a:p>
+            <a:r>
+              <a:rPr lang="en-US" b="0" dirty="0"/>
+              <a:t>&gt;&gt;&gt; </a:t>
+            </a:r>
+            <a:r>
+              <a:rPr lang="en-US" b="0" dirty="0" err="1"/>
+              <a:t>dict_keys</a:t>
+            </a:r>
+            <a:r>
+              <a:rPr lang="en-US" b="0" dirty="0"/>
+              <a:t>(['a', 'b', 'c'])</a:t>
+            </a:r>
+          </a:p>
+          <a:p>
             <a:endParaRPr lang="en-US" b="0" dirty="0"/>
           </a:p>
         </p:txBody>
@@ -2643,7 +2854,7 @@
           <a:p>
             <a:fld id="{0560A9CD-0304-4E0B-9E82-E7E0115DE05B}" type="datetimeFigureOut">
               <a:rPr lang="en-US" smtClean="0"/>
-              <a:t>11/19/2022</a:t>
+              <a:t>2/15/2023</a:t>
             </a:fld>
             <a:endParaRPr lang="en-US"/>
           </a:p>
@@ -2811,7 +3022,7 @@
           <a:p>
             <a:fld id="{0560A9CD-0304-4E0B-9E82-E7E0115DE05B}" type="datetimeFigureOut">
               <a:rPr lang="en-US" smtClean="0"/>
-              <a:t>11/19/2022</a:t>
+              <a:t>2/15/2023</a:t>
             </a:fld>
             <a:endParaRPr lang="en-US"/>
           </a:p>
@@ -2989,7 +3200,7 @@
           <a:p>
             <a:fld id="{0560A9CD-0304-4E0B-9E82-E7E0115DE05B}" type="datetimeFigureOut">
               <a:rPr lang="en-US" smtClean="0"/>
-              <a:t>11/19/2022</a:t>
+              <a:t>2/15/2023</a:t>
             </a:fld>
             <a:endParaRPr lang="en-US"/>
           </a:p>
@@ -3166,7 +3377,7 @@
           <a:p>
             <a:fld id="{0560A9CD-0304-4E0B-9E82-E7E0115DE05B}" type="datetimeFigureOut">
               <a:rPr lang="en-US" smtClean="0"/>
-              <a:t>11/19/2022</a:t>
+              <a:t>2/15/2023</a:t>
             </a:fld>
             <a:endParaRPr lang="en-US"/>
           </a:p>
@@ -3411,7 +3622,7 @@
           <a:p>
             <a:fld id="{0560A9CD-0304-4E0B-9E82-E7E0115DE05B}" type="datetimeFigureOut">
               <a:rPr lang="en-US" smtClean="0"/>
-              <a:t>11/19/2022</a:t>
+              <a:t>2/15/2023</a:t>
             </a:fld>
             <a:endParaRPr lang="en-US"/>
           </a:p>
@@ -3640,7 +3851,7 @@
           <a:p>
             <a:fld id="{0560A9CD-0304-4E0B-9E82-E7E0115DE05B}" type="datetimeFigureOut">
               <a:rPr lang="en-US" smtClean="0"/>
-              <a:t>11/19/2022</a:t>
+              <a:t>2/15/2023</a:t>
             </a:fld>
             <a:endParaRPr lang="en-US"/>
           </a:p>
@@ -4004,7 +4215,7 @@
           <a:p>
             <a:fld id="{0560A9CD-0304-4E0B-9E82-E7E0115DE05B}" type="datetimeFigureOut">
               <a:rPr lang="en-US" smtClean="0"/>
-              <a:t>11/19/2022</a:t>
+              <a:t>2/15/2023</a:t>
             </a:fld>
             <a:endParaRPr lang="en-US"/>
           </a:p>
@@ -4121,7 +4332,7 @@
           <a:p>
             <a:fld id="{0560A9CD-0304-4E0B-9E82-E7E0115DE05B}" type="datetimeFigureOut">
               <a:rPr lang="en-US" smtClean="0"/>
-              <a:t>11/19/2022</a:t>
+              <a:t>2/15/2023</a:t>
             </a:fld>
             <a:endParaRPr lang="en-US"/>
           </a:p>
@@ -4216,7 +4427,7 @@
           <a:p>
             <a:fld id="{0560A9CD-0304-4E0B-9E82-E7E0115DE05B}" type="datetimeFigureOut">
               <a:rPr lang="en-US" smtClean="0"/>
-              <a:t>11/19/2022</a:t>
+              <a:t>2/15/2023</a:t>
             </a:fld>
             <a:endParaRPr lang="en-US"/>
           </a:p>
@@ -4491,7 +4702,7 @@
           <a:p>
             <a:fld id="{0560A9CD-0304-4E0B-9E82-E7E0115DE05B}" type="datetimeFigureOut">
               <a:rPr lang="en-US" smtClean="0"/>
-              <a:t>11/19/2022</a:t>
+              <a:t>2/15/2023</a:t>
             </a:fld>
             <a:endParaRPr lang="en-US"/>
           </a:p>
@@ -4743,7 +4954,7 @@
           <a:p>
             <a:fld id="{0560A9CD-0304-4E0B-9E82-E7E0115DE05B}" type="datetimeFigureOut">
               <a:rPr lang="en-US" smtClean="0"/>
-              <a:t>11/19/2022</a:t>
+              <a:t>2/15/2023</a:t>
             </a:fld>
             <a:endParaRPr lang="en-US"/>
           </a:p>
@@ -4954,7 +5165,7 @@
           <a:p>
             <a:fld id="{0560A9CD-0304-4E0B-9E82-E7E0115DE05B}" type="datetimeFigureOut">
               <a:rPr lang="en-US" smtClean="0"/>
-              <a:t>11/19/2022</a:t>
+              <a:t>2/15/2023</a:t>
             </a:fld>
             <a:endParaRPr lang="en-US"/>
           </a:p>
@@ -6027,7 +6238,7 @@
           <p:nvPr>
             <p:extLst>
               <p:ext uri="{D42A27DB-BD31-4B8C-83A1-F6EECF244321}">
-                <p14:modId xmlns:p14="http://schemas.microsoft.com/office/powerpoint/2010/main" val="4034325222"/>
+                <p14:modId xmlns:p14="http://schemas.microsoft.com/office/powerpoint/2010/main" val="3373263642"/>
               </p:ext>
             </p:extLst>
           </p:nvPr>
@@ -6579,9 +6790,10 @@
                         <a:t> set from </a:t>
                       </a:r>
                       <a:r>
-                        <a:rPr lang="da-DK" dirty="0"/>
-                        <a:t>list</a:t>
-                      </a:r>
+                        <a:rPr lang="da-DK"/>
+                        <a:t>sequence</a:t>
+                      </a:r>
+                      <a:endParaRPr lang="da-DK" dirty="0"/>
                     </a:p>
                   </a:txBody>
                   <a:tcPr marT="36000" marB="36000" anchor="ctr">
@@ -10115,7 +10327,7 @@
           <p:nvPr>
             <p:extLst>
               <p:ext uri="{D42A27DB-BD31-4B8C-83A1-F6EECF244321}">
-                <p14:modId xmlns:p14="http://schemas.microsoft.com/office/powerpoint/2010/main" val="4273871745"/>
+                <p14:modId xmlns:p14="http://schemas.microsoft.com/office/powerpoint/2010/main" val="4163633843"/>
               </p:ext>
             </p:extLst>
           </p:nvPr>
@@ -10409,7 +10621,7 @@
                           <a:latin typeface="Courier New" panose="02070309020205020404" pitchFamily="49" charset="0"/>
                           <a:cs typeface="Courier New" panose="02070309020205020404" pitchFamily="49" charset="0"/>
                         </a:rPr>
-                        <a:t>{('a',('b','c')),('a',('c','b')),('b',('a','c')),...,('c',('b','a’))}</a:t>
+                        <a:t>{('a',('b','c')),('a',('c','b')),('b',('a','c')),...,('c',('b','a'))}</a:t>
                       </a:r>
                     </a:p>
                     <a:p>
@@ -10554,7 +10766,7 @@
                           <a:latin typeface="Courier New" panose="02070309020205020404" pitchFamily="49" charset="0"/>
                           <a:cs typeface="Courier New" panose="02070309020205020404" pitchFamily="49" charset="0"/>
                         </a:rPr>
-                        <a:t>{('c',('b','a')),('c',('a','b')),('a',('c','b’)),...,('b',('a','c'))}</a:t>
+                        <a:t>{('c',('b','a')),('c',('a','b')),('a',('c','b')),...,('b',('a','c'))}</a:t>
                       </a:r>
                     </a:p>
                   </a:txBody>
@@ -10813,31 +11025,11 @@
                   </a:schemeClr>
                 </a:solidFill>
               </a:rPr>
-              <a:t>__</a:t>
-            </a:r>
-            <a:r>
-              <a:rPr lang="en-US" dirty="0" err="1">
-                <a:solidFill>
-                  <a:schemeClr val="accent1">
-                    <a:lumMod val="50000"/>
-                  </a:schemeClr>
-                </a:solidFill>
-              </a:rPr>
-              <a:t>eq</a:t>
-            </a:r>
-            <a:r>
-              <a:rPr lang="en-US" dirty="0">
-                <a:solidFill>
-                  <a:schemeClr val="accent1">
-                    <a:lumMod val="50000"/>
-                  </a:schemeClr>
-                </a:solidFill>
-              </a:rPr>
-              <a:t>__() </a:t>
+              <a:t>__eq__() </a:t>
             </a:r>
             <a:r>
               <a:rPr lang="en-US" dirty="0"/>
-              <a:t>method to check for equality with “==”.</a:t>
+              <a:t>method to check for equality with “==”</a:t>
             </a:r>
             <a:br>
               <a:rPr lang="en-US" dirty="0"/>
@@ -11094,15 +11286,7 @@
             </a:r>
             <a:r>
               <a:rPr lang="da-DK" dirty="0"/>
-              <a:t> </a:t>
-            </a:r>
-            <a:r>
-              <a:rPr lang="da-DK" dirty="0" err="1"/>
-              <a:t>like</a:t>
-            </a:r>
-            <a:r>
-              <a:rPr lang="da-DK" dirty="0"/>
-              <a:t> </a:t>
+              <a:t> like </a:t>
             </a:r>
             <a:r>
               <a:rPr lang="da-DK" dirty="0">
@@ -11171,7 +11355,7 @@
             </a:r>
             <a:r>
               <a:rPr lang="da-DK" dirty="0"/>
-              <a:t> in a set.</a:t>
+              <a:t> in a set</a:t>
             </a:r>
             <a:endParaRPr lang="en-US" dirty="0"/>
           </a:p>
@@ -14501,7 +14685,7 @@
         </p:nvSpPr>
         <p:spPr>
           <a:xfrm>
-            <a:off x="838200" y="221432"/>
+            <a:off x="282142" y="221432"/>
             <a:ext cx="10644051" cy="1325563"/>
           </a:xfrm>
         </p:spPr>
@@ -15554,6 +15738,164 @@
           </a:fontRef>
         </p:style>
       </p:cxnSp>
+      <p:grpSp>
+        <p:nvGrpSpPr>
+          <p:cNvPr id="10" name="Group 9">
+            <a:extLst>
+              <a:ext uri="{FF2B5EF4-FFF2-40B4-BE49-F238E27FC236}">
+                <a16:creationId xmlns:a16="http://schemas.microsoft.com/office/drawing/2014/main" id="{1B0019EB-33BE-97BA-7C06-038561597A77}"/>
+              </a:ext>
+            </a:extLst>
+          </p:cNvPr>
+          <p:cNvGrpSpPr/>
+          <p:nvPr/>
+        </p:nvGrpSpPr>
+        <p:grpSpPr>
+          <a:xfrm>
+            <a:off x="10407887" y="13330"/>
+            <a:ext cx="1992836" cy="1200329"/>
+            <a:chOff x="10407887" y="13330"/>
+            <a:chExt cx="1992836" cy="1200329"/>
+          </a:xfrm>
+        </p:grpSpPr>
+        <p:sp>
+          <p:nvSpPr>
+            <p:cNvPr id="4" name="TextBox 3">
+              <a:extLst>
+                <a:ext uri="{FF2B5EF4-FFF2-40B4-BE49-F238E27FC236}">
+                  <a16:creationId xmlns:a16="http://schemas.microsoft.com/office/drawing/2014/main" id="{D7E080DF-C0C5-20D2-33A0-8827EF54D731}"/>
+                </a:ext>
+              </a:extLst>
+            </p:cNvPr>
+            <p:cNvSpPr txBox="1"/>
+            <p:nvPr/>
+          </p:nvSpPr>
+          <p:spPr>
+            <a:xfrm>
+              <a:off x="10563778" y="13330"/>
+              <a:ext cx="1836945" cy="1200329"/>
+            </a:xfrm>
+            <a:prstGeom prst="rect">
+              <a:avLst/>
+            </a:prstGeom>
+            <a:noFill/>
+          </p:spPr>
+          <p:txBody>
+            <a:bodyPr wrap="square" rtlCol="0">
+              <a:spAutoFit/>
+            </a:bodyPr>
+            <a:lstStyle/>
+            <a:p>
+              <a:pPr algn="ctr">
+                <a:spcAft>
+                  <a:spcPts val="600"/>
+                </a:spcAft>
+              </a:pPr>
+              <a:r>
+                <a:rPr lang="da-DK" dirty="0" err="1">
+                  <a:solidFill>
+                    <a:srgbClr val="C00000"/>
+                  </a:solidFill>
+                </a:rPr>
+                <a:t>Since</a:t>
+              </a:r>
+              <a:br>
+                <a:rPr lang="da-DK" dirty="0">
+                  <a:solidFill>
+                    <a:srgbClr val="C00000"/>
+                  </a:solidFill>
+                </a:rPr>
+              </a:br>
+              <a:r>
+                <a:rPr lang="da-DK" dirty="0">
+                  <a:solidFill>
+                    <a:srgbClr val="C00000"/>
+                  </a:solidFill>
+                </a:rPr>
+                <a:t>Python 3.7 </a:t>
+              </a:r>
+              <a:r>
+                <a:rPr lang="da-DK" dirty="0">
+                  <a:solidFill>
+                    <a:srgbClr val="C00000"/>
+                  </a:solidFill>
+                  <a:latin typeface="Courier New" panose="02070309020205020404" pitchFamily="49" charset="0"/>
+                  <a:cs typeface="Courier New" panose="02070309020205020404" pitchFamily="49" charset="0"/>
+                </a:rPr>
+                <a:t>dataclass</a:t>
+              </a:r>
+              <a:br>
+                <a:rPr lang="da-DK" dirty="0">
+                  <a:solidFill>
+                    <a:srgbClr val="C00000"/>
+                  </a:solidFill>
+                </a:rPr>
+              </a:br>
+              <a:r>
+                <a:rPr lang="da-DK" dirty="0" err="1">
+                  <a:solidFill>
+                    <a:srgbClr val="C00000"/>
+                  </a:solidFill>
+                </a:rPr>
+                <a:t>better</a:t>
+              </a:r>
+              <a:r>
+                <a:rPr lang="da-DK" dirty="0">
+                  <a:solidFill>
+                    <a:srgbClr val="C00000"/>
+                  </a:solidFill>
+                </a:rPr>
+                <a:t> </a:t>
+              </a:r>
+              <a:r>
+                <a:rPr lang="da-DK" dirty="0" err="1">
+                  <a:solidFill>
+                    <a:srgbClr val="C00000"/>
+                  </a:solidFill>
+                </a:rPr>
+                <a:t>choice</a:t>
+              </a:r>
+              <a:endParaRPr lang="da-DK" dirty="0"/>
+            </a:p>
+          </p:txBody>
+        </p:sp>
+        <p:pic>
+          <p:nvPicPr>
+            <p:cNvPr id="7" name="Picture 6">
+              <a:extLst>
+                <a:ext uri="{FF2B5EF4-FFF2-40B4-BE49-F238E27FC236}">
+                  <a16:creationId xmlns:a16="http://schemas.microsoft.com/office/drawing/2014/main" id="{CA096CE3-516F-E1E8-40C5-CB86C3E9C347}"/>
+                </a:ext>
+              </a:extLst>
+            </p:cNvPr>
+            <p:cNvPicPr>
+              <a:picLocks noChangeAspect="1"/>
+            </p:cNvPicPr>
+            <p:nvPr/>
+          </p:nvPicPr>
+          <p:blipFill>
+            <a:blip r:embed="rId3" cstate="print">
+              <a:extLst>
+                <a:ext uri="{28A0092B-C50C-407E-A947-70E740481C1C}">
+                  <a14:useLocalDpi xmlns:a14="http://schemas.microsoft.com/office/drawing/2010/main" val="0"/>
+                </a:ext>
+              </a:extLst>
+            </a:blip>
+            <a:stretch>
+              <a:fillRect/>
+            </a:stretch>
+          </p:blipFill>
+          <p:spPr>
+            <a:xfrm>
+              <a:off x="10407887" y="155895"/>
+              <a:ext cx="487666" cy="405904"/>
+            </a:xfrm>
+            <a:prstGeom prst="rect">
+              <a:avLst/>
+            </a:prstGeom>
+          </p:spPr>
+        </p:pic>
+      </p:grpSp>
     </p:spTree>
     <p:extLst>
       <p:ext uri="{BB962C8B-B14F-4D97-AF65-F5344CB8AC3E}">
@@ -15564,6 +15906,89 @@
   <p:clrMapOvr>
     <a:masterClrMapping/>
   </p:clrMapOvr>
+  <p:timing>
+    <p:tnLst>
+      <p:par>
+        <p:cTn id="1" dur="indefinite" restart="never" nodeType="tmRoot">
+          <p:childTnLst>
+            <p:seq concurrent="1" nextAc="seek">
+              <p:cTn id="2" dur="indefinite" nodeType="mainSeq">
+                <p:childTnLst>
+                  <p:par>
+                    <p:cTn id="3" fill="hold">
+                      <p:stCondLst>
+                        <p:cond delay="indefinite"/>
+                      </p:stCondLst>
+                      <p:childTnLst>
+                        <p:par>
+                          <p:cTn id="4" fill="hold">
+                            <p:stCondLst>
+                              <p:cond delay="0"/>
+                            </p:stCondLst>
+                            <p:childTnLst>
+                              <p:par>
+                                <p:cTn id="5" presetID="10" presetClass="entr" presetSubtype="0" fill="hold" nodeType="clickEffect">
+                                  <p:stCondLst>
+                                    <p:cond delay="0"/>
+                                  </p:stCondLst>
+                                  <p:childTnLst>
+                                    <p:set>
+                                      <p:cBhvr>
+                                        <p:cTn id="6" dur="1" fill="hold">
+                                          <p:stCondLst>
+                                            <p:cond delay="0"/>
+                                          </p:stCondLst>
+                                        </p:cTn>
+                                        <p:tgtEl>
+                                          <p:spTgt spid="10"/>
+                                        </p:tgtEl>
+                                        <p:attrNameLst>
+                                          <p:attrName>style.visibility</p:attrName>
+                                        </p:attrNameLst>
+                                      </p:cBhvr>
+                                      <p:to>
+                                        <p:strVal val="visible"/>
+                                      </p:to>
+                                    </p:set>
+                                    <p:animEffect transition="in" filter="fade">
+                                      <p:cBhvr>
+                                        <p:cTn id="7" dur="500"/>
+                                        <p:tgtEl>
+                                          <p:spTgt spid="10"/>
+                                        </p:tgtEl>
+                                      </p:cBhvr>
+                                    </p:animEffect>
+                                  </p:childTnLst>
+                                </p:cTn>
+                              </p:par>
+                            </p:childTnLst>
+                          </p:cTn>
+                        </p:par>
+                      </p:childTnLst>
+                    </p:cTn>
+                  </p:par>
+                </p:childTnLst>
+              </p:cTn>
+              <p:prevCondLst>
+                <p:cond evt="onPrev" delay="0">
+                  <p:tgtEl>
+                    <p:sldTgt/>
+                  </p:tgtEl>
+                </p:cond>
+              </p:prevCondLst>
+              <p:nextCondLst>
+                <p:cond evt="onNext" delay="0">
+                  <p:tgtEl>
+                    <p:sldTgt/>
+                  </p:tgtEl>
+                </p:cond>
+              </p:nextCondLst>
+            </p:seq>
+          </p:childTnLst>
+        </p:cTn>
+      </p:par>
+    </p:tnLst>
+  </p:timing>
 </p:sld>
 </file>
 
@@ -17383,15 +17808,7 @@
             </a:r>
             <a:r>
               <a:rPr lang="da-DK" dirty="0"/>
-              <a:t>. </a:t>
-            </a:r>
-            <a:r>
-              <a:rPr lang="da-DK" dirty="0" err="1"/>
-              <a:t>Key</a:t>
-            </a:r>
-            <a:r>
-              <a:rPr lang="da-DK" dirty="0"/>
-              <a:t> must </a:t>
+              <a:t>. Key must </a:t>
             </a:r>
             <a:r>
               <a:rPr lang="da-DK" dirty="0" err="1"/>
@@ -17399,7 +17816,7 @@
             </a:r>
             <a:r>
               <a:rPr lang="da-DK" dirty="0"/>
-              <a:t> present </a:t>
+              <a:t> present, </a:t>
             </a:r>
             <a:r>
               <a:rPr lang="da-DK" dirty="0" err="1"/>
@@ -17423,7 +17840,7 @@
             </a:r>
             <a:r>
               <a:rPr lang="da-DK" dirty="0"/>
-              <a:t>. </a:t>
+              <a:t> </a:t>
             </a:r>
           </a:p>
           <a:p>
@@ -17522,7 +17939,15 @@
             </a:r>
             <a:r>
               <a:rPr lang="da-DK" dirty="0"/>
-              <a:t> if present.</a:t>
+              <a:t> </a:t>
+            </a:r>
+            <a:r>
+              <a:rPr lang="da-DK" dirty="0" err="1"/>
+              <a:t>if</a:t>
+            </a:r>
+            <a:r>
+              <a:rPr lang="da-DK" dirty="0"/>
+              <a:t> present</a:t>
             </a:r>
             <a:endParaRPr lang="da-DK" dirty="0">
               <a:latin typeface="Courier New" panose="02070309020205020404" pitchFamily="49" charset="0"/>
@@ -21044,7 +21469,7 @@
           <p:nvPr>
             <p:extLst>
               <p:ext uri="{D42A27DB-BD31-4B8C-83A1-F6EECF244321}">
-                <p14:modId xmlns:p14="http://schemas.microsoft.com/office/powerpoint/2010/main" val="912404070"/>
+                <p14:modId xmlns:p14="http://schemas.microsoft.com/office/powerpoint/2010/main" val="105213090"/>
               </p:ext>
             </p:extLst>
           </p:nvPr>
@@ -21690,7 +22115,7 @@
                           <a:latin typeface="Courier New" panose="02070309020205020404" pitchFamily="49" charset="0"/>
                           <a:cs typeface="Courier New" panose="02070309020205020404" pitchFamily="49" charset="0"/>
                         </a:rPr>
-                        <a:t>	print("Key", key, "has value", </a:t>
+                        <a:t>	print('Key', key, 'has value', </a:t>
                       </a:r>
                       <a:r>
                         <a:rPr lang="en-US" sz="1600" b="1" baseline="0" dirty="0" err="1">
@@ -27166,7 +27591,7 @@
           <p:nvPr>
             <p:extLst>
               <p:ext uri="{D42A27DB-BD31-4B8C-83A1-F6EECF244321}">
-                <p14:modId xmlns:p14="http://schemas.microsoft.com/office/powerpoint/2010/main" val="1687379835"/>
+                <p14:modId xmlns:p14="http://schemas.microsoft.com/office/powerpoint/2010/main" val="3785027373"/>
               </p:ext>
             </p:extLst>
           </p:nvPr>
@@ -27301,7 +27726,7 @@
                           <a:latin typeface="Courier New" panose="02070309020205020404" pitchFamily="49" charset="0"/>
                           <a:cs typeface="Courier New" panose="02070309020205020404" pitchFamily="49" charset="0"/>
                         </a:rPr>
-                        <a:t>d = {'d': 1, 'c': 2, 'b': 3, 'a':4}</a:t>
+                        <a:t>d = {'d': 1, 'c': 2, 'b': 3, 'a': 4}</a:t>
                       </a:r>
                     </a:p>
                     <a:p>
@@ -28192,7 +28617,7 @@
           <p:nvPr>
             <p:extLst>
               <p:ext uri="{D42A27DB-BD31-4B8C-83A1-F6EECF244321}">
-                <p14:modId xmlns:p14="http://schemas.microsoft.com/office/powerpoint/2010/main" val="2848112837"/>
+                <p14:modId xmlns:p14="http://schemas.microsoft.com/office/powerpoint/2010/main" val="1047587422"/>
               </p:ext>
             </p:extLst>
           </p:nvPr>
@@ -28410,10 +28835,81 @@
                       </a:pPr>
                       <a:r>
                         <a:rPr lang="pt-BR" sz="1800" b="1" baseline="0" dirty="0">
-                          <a:latin typeface="Courier New" panose="02070309020205020404" pitchFamily="49" charset="0"/>
-                          <a:cs typeface="Courier New" panose="02070309020205020404" pitchFamily="49" charset="0"/>
-                        </a:rPr>
-                        <a:t>{name: idx for idx, name in enumerate(names, start=1)}</a:t>
+                          <a:solidFill>
+                            <a:srgbClr val="C00000"/>
+                          </a:solidFill>
+                          <a:latin typeface="Courier New" panose="02070309020205020404" pitchFamily="49" charset="0"/>
+                          <a:cs typeface="Courier New" panose="02070309020205020404" pitchFamily="49" charset="0"/>
+                        </a:rPr>
+                        <a:t>{</a:t>
+                      </a:r>
+                      <a:r>
+                        <a:rPr lang="pt-BR" sz="1800" b="1" baseline="0" dirty="0">
+                          <a:latin typeface="Courier New" panose="02070309020205020404" pitchFamily="49" charset="0"/>
+                          <a:cs typeface="Courier New" panose="02070309020205020404" pitchFamily="49" charset="0"/>
+                        </a:rPr>
+                        <a:t>name</a:t>
+                      </a:r>
+                      <a:r>
+                        <a:rPr lang="pt-BR" sz="1800" b="1" baseline="0" dirty="0">
+                          <a:solidFill>
+                            <a:srgbClr val="C00000"/>
+                          </a:solidFill>
+                          <a:latin typeface="Courier New" panose="02070309020205020404" pitchFamily="49" charset="0"/>
+                          <a:cs typeface="Courier New" panose="02070309020205020404" pitchFamily="49" charset="0"/>
+                        </a:rPr>
+                        <a:t>:</a:t>
+                      </a:r>
+                      <a:r>
+                        <a:rPr lang="pt-BR" sz="1800" b="1" baseline="0" dirty="0">
+                          <a:latin typeface="Courier New" panose="02070309020205020404" pitchFamily="49" charset="0"/>
+                          <a:cs typeface="Courier New" panose="02070309020205020404" pitchFamily="49" charset="0"/>
+                        </a:rPr>
+                        <a:t> idx </a:t>
+                      </a:r>
+                      <a:r>
+                        <a:rPr lang="pt-BR" sz="1800" b="1" baseline="0" dirty="0">
+                          <a:solidFill>
+                            <a:srgbClr val="C00000"/>
+                          </a:solidFill>
+                          <a:latin typeface="Courier New" panose="02070309020205020404" pitchFamily="49" charset="0"/>
+                          <a:cs typeface="Courier New" panose="02070309020205020404" pitchFamily="49" charset="0"/>
+                        </a:rPr>
+                        <a:t>for</a:t>
+                      </a:r>
+                      <a:r>
+                        <a:rPr lang="pt-BR" sz="1800" b="1" baseline="0" dirty="0">
+                          <a:latin typeface="Courier New" panose="02070309020205020404" pitchFamily="49" charset="0"/>
+                          <a:cs typeface="Courier New" panose="02070309020205020404" pitchFamily="49" charset="0"/>
+                        </a:rPr>
+                        <a:t> idx, name </a:t>
+                      </a:r>
+                      <a:r>
+                        <a:rPr lang="pt-BR" sz="1800" b="1" baseline="0" dirty="0">
+                          <a:solidFill>
+                            <a:srgbClr val="C00000"/>
+                          </a:solidFill>
+                          <a:latin typeface="Courier New" panose="02070309020205020404" pitchFamily="49" charset="0"/>
+                          <a:cs typeface="Courier New" panose="02070309020205020404" pitchFamily="49" charset="0"/>
+                        </a:rPr>
+                        <a:t>in</a:t>
+                      </a:r>
+                      <a:r>
+                        <a:rPr lang="pt-BR" sz="1800" b="1" baseline="0" dirty="0">
+                          <a:latin typeface="Courier New" panose="02070309020205020404" pitchFamily="49" charset="0"/>
+                          <a:cs typeface="Courier New" panose="02070309020205020404" pitchFamily="49" charset="0"/>
+                        </a:rPr>
+                        <a:t> enumerate(names, start=1)</a:t>
+                      </a:r>
+                      <a:r>
+                        <a:rPr lang="pt-BR" sz="1800" b="1" baseline="0" dirty="0">
+                          <a:solidFill>
+                            <a:srgbClr val="C00000"/>
+                          </a:solidFill>
+                          <a:latin typeface="Courier New" panose="02070309020205020404" pitchFamily="49" charset="0"/>
+                          <a:cs typeface="Courier New" panose="02070309020205020404" pitchFamily="49" charset="0"/>
+                        </a:rPr>
+                        <a:t>}</a:t>
                       </a:r>
                     </a:p>
                     <a:p>
@@ -28428,16 +28924,12 @@
                         <a:buChar char="|"/>
                       </a:pPr>
                       <a:r>
-                        <a:rPr lang="pt-BR" sz="1800" b="1" baseline="0">
+                        <a:rPr lang="pt-BR" sz="1800" b="1" baseline="0" dirty="0">
                           <a:latin typeface="Courier New" panose="02070309020205020404" pitchFamily="49" charset="0"/>
                           <a:cs typeface="Courier New" panose="02070309020205020404" pitchFamily="49" charset="0"/>
                         </a:rPr>
                         <a:t>{'Mickey': 1, 'Donald': 2, 'Scrooge': 3}</a:t>
                       </a:r>
-                      <a:endParaRPr lang="pt-BR" sz="1800" b="1" baseline="0" dirty="0">
-                        <a:latin typeface="Courier New" panose="02070309020205020404" pitchFamily="49" charset="0"/>
-                        <a:cs typeface="Courier New" panose="02070309020205020404" pitchFamily="49" charset="0"/>
-                      </a:endParaRPr>
                     </a:p>
                   </a:txBody>
                   <a:tcPr>

</xml_diff>

<commit_message>
fixed palindrom exercise typo
</commit_message>
<xml_diff>
--- a/ipsa/slides/dictionaries.pptx
+++ b/ipsa/slides/dictionaries.pptx
@@ -362,7 +362,7 @@
   <pc:docChgLst>
     <pc:chgData name="Gerth Stølting Brodal" userId="04ef4784-6591-4f86-a140-f5c3b108582a" providerId="ADAL" clId="{3A49286A-3992-4B37-8BB5-DA83FEA0A6BC}"/>
     <pc:docChg chg="undo custSel modSld">
-      <pc:chgData name="Gerth Stølting Brodal" userId="04ef4784-6591-4f86-a140-f5c3b108582a" providerId="ADAL" clId="{3A49286A-3992-4B37-8BB5-DA83FEA0A6BC}" dt="2023-02-19T17:48:21.019" v="243" actId="20577"/>
+      <pc:chgData name="Gerth Stølting Brodal" userId="04ef4784-6591-4f86-a140-f5c3b108582a" providerId="ADAL" clId="{3A49286A-3992-4B37-8BB5-DA83FEA0A6BC}" dt="2023-02-20T07:48:51.581" v="249"/>
       <pc:docMkLst>
         <pc:docMk/>
       </pc:docMkLst>
@@ -412,13 +412,13 @@
         </pc:spChg>
       </pc:sldChg>
       <pc:sldChg chg="modSp mod modNotesTx">
-        <pc:chgData name="Gerth Stølting Brodal" userId="04ef4784-6591-4f86-a140-f5c3b108582a" providerId="ADAL" clId="{3A49286A-3992-4B37-8BB5-DA83FEA0A6BC}" dt="2023-02-19T17:36:19.328" v="242" actId="20577"/>
+        <pc:chgData name="Gerth Stølting Brodal" userId="04ef4784-6591-4f86-a140-f5c3b108582a" providerId="ADAL" clId="{3A49286A-3992-4B37-8BB5-DA83FEA0A6BC}" dt="2023-02-20T07:48:51.581" v="249"/>
         <pc:sldMkLst>
           <pc:docMk/>
           <pc:sldMk cId="3852152376" sldId="550"/>
         </pc:sldMkLst>
         <pc:graphicFrameChg chg="modGraphic">
-          <ac:chgData name="Gerth Stølting Brodal" userId="04ef4784-6591-4f86-a140-f5c3b108582a" providerId="ADAL" clId="{3A49286A-3992-4B37-8BB5-DA83FEA0A6BC}" dt="2023-02-15T07:56:10.301" v="219" actId="20577"/>
+          <ac:chgData name="Gerth Stølting Brodal" userId="04ef4784-6591-4f86-a140-f5c3b108582a" providerId="ADAL" clId="{3A49286A-3992-4B37-8BB5-DA83FEA0A6BC}" dt="2023-02-20T07:44:26.230" v="247" actId="20577"/>
           <ac:graphicFrameMkLst>
             <pc:docMk/>
             <pc:sldMk cId="3852152376" sldId="550"/>
@@ -2274,6 +2274,47 @@
             </a:r>
           </a:p>
           <a:p>
+            <a:endParaRPr lang="en-US" dirty="0"/>
+          </a:p>
+          <a:p>
+            <a:r>
+              <a:rPr lang="en-US" dirty="0" err="1"/>
+              <a:t>frozenset</a:t>
+            </a:r>
+            <a:r>
+              <a:rPr lang="en-US" dirty="0"/>
+              <a:t>([1,2]) | set([3,4])</a:t>
+            </a:r>
+          </a:p>
+          <a:p>
+            <a:r>
+              <a:rPr lang="en-US" dirty="0" err="1"/>
+              <a:t>frozenset</a:t>
+            </a:r>
+            <a:r>
+              <a:rPr lang="en-US" dirty="0"/>
+              <a:t>({1, 2, 3, 4})</a:t>
+            </a:r>
+          </a:p>
+          <a:p>
+            <a:r>
+              <a:rPr lang="en-US" dirty="0"/>
+              <a:t>set([3,4]) | </a:t>
+            </a:r>
+            <a:r>
+              <a:rPr lang="en-US" dirty="0" err="1"/>
+              <a:t>frozenset</a:t>
+            </a:r>
+            <a:r>
+              <a:rPr lang="en-US" dirty="0"/>
+              <a:t>([1,2])</a:t>
+            </a:r>
+          </a:p>
+          <a:p>
+            <a:r>
+              <a:rPr lang="en-US"/>
+              <a:t>{1, 2, 3, 4}</a:t>
+            </a:r>
             <a:endParaRPr lang="en-US" dirty="0"/>
           </a:p>
           <a:p>
@@ -6284,7 +6325,7 @@
           <p:nvPr>
             <p:extLst>
               <p:ext uri="{D42A27DB-BD31-4B8C-83A1-F6EECF244321}">
-                <p14:modId xmlns:p14="http://schemas.microsoft.com/office/powerpoint/2010/main" val="3373263642"/>
+                <p14:modId xmlns:p14="http://schemas.microsoft.com/office/powerpoint/2010/main" val="4275193753"/>
               </p:ext>
             </p:extLst>
           </p:nvPr>

</xml_diff>

<commit_message>
performance of "in" operator
</commit_message>
<xml_diff>
--- a/ipsa/slides/dictionaries.pptx
+++ b/ipsa/slides/dictionaries.pptx
@@ -5,7 +5,7 @@
     <p:sldMasterId id="2147483648" r:id="rId1"/>
   </p:sldMasterIdLst>
   <p:notesMasterIdLst>
-    <p:notesMasterId r:id="rId23"/>
+    <p:notesMasterId r:id="rId24"/>
   </p:notesMasterIdLst>
   <p:sldIdLst>
     <p:sldId id="476" r:id="rId2"/>
@@ -23,12 +23,13 @@
     <p:sldId id="546" r:id="rId14"/>
     <p:sldId id="555" r:id="rId15"/>
     <p:sldId id="551" r:id="rId16"/>
-    <p:sldId id="563" r:id="rId17"/>
-    <p:sldId id="565" r:id="rId18"/>
-    <p:sldId id="566" r:id="rId19"/>
-    <p:sldId id="567" r:id="rId20"/>
-    <p:sldId id="544" r:id="rId21"/>
-    <p:sldId id="557" r:id="rId22"/>
+    <p:sldId id="513" r:id="rId17"/>
+    <p:sldId id="563" r:id="rId18"/>
+    <p:sldId id="565" r:id="rId19"/>
+    <p:sldId id="566" r:id="rId20"/>
+    <p:sldId id="567" r:id="rId21"/>
+    <p:sldId id="544" r:id="rId22"/>
+    <p:sldId id="557" r:id="rId23"/>
   </p:sldIdLst>
   <p:sldSz cx="12192000" cy="6858000"/>
   <p:notesSz cx="6858000" cy="9144000"/>
@@ -138,13 +139,205 @@
 <file path=ppt/revisionInfo.xml><?xml version="1.0" encoding="utf-8"?>
 <p1510:revInfo xmlns:a="http://schemas.openxmlformats.org/drawingml/2006/main" xmlns:r="http://schemas.openxmlformats.org/officeDocument/2006/relationships" xmlns:p1510="http://schemas.microsoft.com/office/powerpoint/2015/10/main">
   <p1510:revLst>
-    <p1510:client id="{3A49286A-3992-4B37-8BB5-DA83FEA0A6BC}" v="3" dt="2023-02-15T07:54:42.002"/>
+    <p1510:client id="{32A0BADB-2EDA-40A0-B15A-8D58BACC3113}" v="7" dt="2023-07-15T12:37:48.766"/>
   </p1510:revLst>
 </p1510:revInfo>
 </file>
 
 <file path=ppt/changesInfos/changesInfo1.xml><?xml version="1.0" encoding="utf-8"?>
 <pc:chgInfo xmlns:a="http://schemas.openxmlformats.org/drawingml/2006/main" xmlns:r="http://schemas.openxmlformats.org/officeDocument/2006/relationships" xmlns:ac="http://schemas.microsoft.com/office/drawing/2013/main/command" xmlns:pc="http://schemas.microsoft.com/office/powerpoint/2013/main/command">
+  <pc:docChgLst>
+    <pc:chgData name="Gerth Stølting Brodal" userId="04ef4784-6591-4f86-a140-f5c3b108582a" providerId="ADAL" clId="{32A0BADB-2EDA-40A0-B15A-8D58BACC3113}"/>
+    <pc:docChg chg="undo custSel addSld modSld">
+      <pc:chgData name="Gerth Stølting Brodal" userId="04ef4784-6591-4f86-a140-f5c3b108582a" providerId="ADAL" clId="{32A0BADB-2EDA-40A0-B15A-8D58BACC3113}" dt="2023-07-15T12:39:46.204" v="340" actId="1076"/>
+      <pc:docMkLst>
+        <pc:docMk/>
+      </pc:docMkLst>
+      <pc:sldChg chg="addSp delSp modSp add mod">
+        <pc:chgData name="Gerth Stølting Brodal" userId="04ef4784-6591-4f86-a140-f5c3b108582a" providerId="ADAL" clId="{32A0BADB-2EDA-40A0-B15A-8D58BACC3113}" dt="2023-07-15T12:39:46.204" v="340" actId="1076"/>
+        <pc:sldMkLst>
+          <pc:docMk/>
+          <pc:sldMk cId="637895129" sldId="513"/>
+        </pc:sldMkLst>
+        <pc:spChg chg="mod">
+          <ac:chgData name="Gerth Stølting Brodal" userId="04ef4784-6591-4f86-a140-f5c3b108582a" providerId="ADAL" clId="{32A0BADB-2EDA-40A0-B15A-8D58BACC3113}" dt="2023-07-15T12:08:42.602" v="65" actId="1076"/>
+          <ac:spMkLst>
+            <pc:docMk/>
+            <pc:sldMk cId="637895129" sldId="513"/>
+            <ac:spMk id="6" creationId="{00000000-0000-0000-0000-000000000000}"/>
+          </ac:spMkLst>
+        </pc:spChg>
+        <pc:spChg chg="del">
+          <ac:chgData name="Gerth Stølting Brodal" userId="04ef4784-6591-4f86-a140-f5c3b108582a" providerId="ADAL" clId="{32A0BADB-2EDA-40A0-B15A-8D58BACC3113}" dt="2023-07-15T11:51:08.087" v="45" actId="478"/>
+          <ac:spMkLst>
+            <pc:docMk/>
+            <pc:sldMk cId="637895129" sldId="513"/>
+            <ac:spMk id="7" creationId="{00000000-0000-0000-0000-000000000000}"/>
+          </ac:spMkLst>
+        </pc:spChg>
+        <pc:spChg chg="mod">
+          <ac:chgData name="Gerth Stølting Brodal" userId="04ef4784-6591-4f86-a140-f5c3b108582a" providerId="ADAL" clId="{32A0BADB-2EDA-40A0-B15A-8D58BACC3113}" dt="2023-07-15T12:23:48.689" v="185" actId="1076"/>
+          <ac:spMkLst>
+            <pc:docMk/>
+            <pc:sldMk cId="637895129" sldId="513"/>
+            <ac:spMk id="9" creationId="{00000000-0000-0000-0000-000000000000}"/>
+          </ac:spMkLst>
+        </pc:spChg>
+        <pc:spChg chg="mod">
+          <ac:chgData name="Gerth Stølting Brodal" userId="04ef4784-6591-4f86-a140-f5c3b108582a" providerId="ADAL" clId="{32A0BADB-2EDA-40A0-B15A-8D58BACC3113}" dt="2023-07-15T12:37:11.308" v="281" actId="1035"/>
+          <ac:spMkLst>
+            <pc:docMk/>
+            <pc:sldMk cId="637895129" sldId="513"/>
+            <ac:spMk id="11" creationId="{00000000-0000-0000-0000-000000000000}"/>
+          </ac:spMkLst>
+        </pc:spChg>
+        <pc:spChg chg="add mod">
+          <ac:chgData name="Gerth Stølting Brodal" userId="04ef4784-6591-4f86-a140-f5c3b108582a" providerId="ADAL" clId="{32A0BADB-2EDA-40A0-B15A-8D58BACC3113}" dt="2023-07-15T12:39:41.762" v="339" actId="14100"/>
+          <ac:spMkLst>
+            <pc:docMk/>
+            <pc:sldMk cId="637895129" sldId="513"/>
+            <ac:spMk id="39" creationId="{ACD34319-F395-A2F2-21A5-0C7A1D6F137B}"/>
+          </ac:spMkLst>
+        </pc:spChg>
+        <pc:grpChg chg="del">
+          <ac:chgData name="Gerth Stølting Brodal" userId="04ef4784-6591-4f86-a140-f5c3b108582a" providerId="ADAL" clId="{32A0BADB-2EDA-40A0-B15A-8D58BACC3113}" dt="2023-07-15T12:08:19.020" v="61" actId="478"/>
+          <ac:grpSpMkLst>
+            <pc:docMk/>
+            <pc:sldMk cId="637895129" sldId="513"/>
+            <ac:grpSpMk id="14" creationId="{00000000-0000-0000-0000-000000000000}"/>
+          </ac:grpSpMkLst>
+        </pc:grpChg>
+        <pc:grpChg chg="del">
+          <ac:chgData name="Gerth Stølting Brodal" userId="04ef4784-6591-4f86-a140-f5c3b108582a" providerId="ADAL" clId="{32A0BADB-2EDA-40A0-B15A-8D58BACC3113}" dt="2023-07-15T12:08:19.020" v="61" actId="478"/>
+          <ac:grpSpMkLst>
+            <pc:docMk/>
+            <pc:sldMk cId="637895129" sldId="513"/>
+            <ac:grpSpMk id="18" creationId="{00000000-0000-0000-0000-000000000000}"/>
+          </ac:grpSpMkLst>
+        </pc:grpChg>
+        <pc:grpChg chg="del">
+          <ac:chgData name="Gerth Stølting Brodal" userId="04ef4784-6591-4f86-a140-f5c3b108582a" providerId="ADAL" clId="{32A0BADB-2EDA-40A0-B15A-8D58BACC3113}" dt="2023-07-15T12:08:19.020" v="61" actId="478"/>
+          <ac:grpSpMkLst>
+            <pc:docMk/>
+            <pc:sldMk cId="637895129" sldId="513"/>
+            <ac:grpSpMk id="22" creationId="{00000000-0000-0000-0000-000000000000}"/>
+          </ac:grpSpMkLst>
+        </pc:grpChg>
+        <pc:grpChg chg="add mod">
+          <ac:chgData name="Gerth Stølting Brodal" userId="04ef4784-6591-4f86-a140-f5c3b108582a" providerId="ADAL" clId="{32A0BADB-2EDA-40A0-B15A-8D58BACC3113}" dt="2023-07-15T12:23:54.878" v="186" actId="1076"/>
+          <ac:grpSpMkLst>
+            <pc:docMk/>
+            <pc:sldMk cId="637895129" sldId="513"/>
+            <ac:grpSpMk id="26" creationId="{E3C1A19D-FB28-1700-35F0-784951085ABA}"/>
+          </ac:grpSpMkLst>
+        </pc:grpChg>
+        <pc:grpChg chg="add mod">
+          <ac:chgData name="Gerth Stølting Brodal" userId="04ef4784-6591-4f86-a140-f5c3b108582a" providerId="ADAL" clId="{32A0BADB-2EDA-40A0-B15A-8D58BACC3113}" dt="2023-07-15T12:35:06.081" v="263" actId="1076"/>
+          <ac:grpSpMkLst>
+            <pc:docMk/>
+            <pc:sldMk cId="637895129" sldId="513"/>
+            <ac:grpSpMk id="29" creationId="{8FDA7B88-B8CF-2A93-2D59-BA63F35D6ED6}"/>
+          </ac:grpSpMkLst>
+        </pc:grpChg>
+        <pc:graphicFrameChg chg="mod modGraphic">
+          <ac:chgData name="Gerth Stølting Brodal" userId="04ef4784-6591-4f86-a140-f5c3b108582a" providerId="ADAL" clId="{32A0BADB-2EDA-40A0-B15A-8D58BACC3113}" dt="2023-07-15T12:37:36.901" v="282" actId="1076"/>
+          <ac:graphicFrameMkLst>
+            <pc:docMk/>
+            <pc:sldMk cId="637895129" sldId="513"/>
+            <ac:graphicFrameMk id="4" creationId="{00000000-0000-0000-0000-000000000000}"/>
+          </ac:graphicFrameMkLst>
+        </pc:graphicFrameChg>
+        <pc:picChg chg="add del mod ord">
+          <ac:chgData name="Gerth Stølting Brodal" userId="04ef4784-6591-4f86-a140-f5c3b108582a" providerId="ADAL" clId="{32A0BADB-2EDA-40A0-B15A-8D58BACC3113}" dt="2023-07-15T12:16:25.576" v="108" actId="478"/>
+          <ac:picMkLst>
+            <pc:docMk/>
+            <pc:sldMk cId="637895129" sldId="513"/>
+            <ac:picMk id="3" creationId="{70D15267-92F9-E093-1DC1-49EE8FFBC329}"/>
+          </ac:picMkLst>
+        </pc:picChg>
+        <pc:picChg chg="add del">
+          <ac:chgData name="Gerth Stølting Brodal" userId="04ef4784-6591-4f86-a140-f5c3b108582a" providerId="ADAL" clId="{32A0BADB-2EDA-40A0-B15A-8D58BACC3113}" dt="2023-07-15T11:50:07.879" v="34" actId="478"/>
+          <ac:picMkLst>
+            <pc:docMk/>
+            <pc:sldMk cId="637895129" sldId="513"/>
+            <ac:picMk id="5" creationId="{00000000-0000-0000-0000-000000000000}"/>
+          </ac:picMkLst>
+        </pc:picChg>
+        <pc:picChg chg="del mod">
+          <ac:chgData name="Gerth Stølting Brodal" userId="04ef4784-6591-4f86-a140-f5c3b108582a" providerId="ADAL" clId="{32A0BADB-2EDA-40A0-B15A-8D58BACC3113}" dt="2023-07-15T12:08:29.049" v="63" actId="478"/>
+          <ac:picMkLst>
+            <pc:docMk/>
+            <pc:sldMk cId="637895129" sldId="513"/>
+            <ac:picMk id="13" creationId="{00000000-0000-0000-0000-000000000000}"/>
+          </ac:picMkLst>
+        </pc:picChg>
+        <pc:picChg chg="add del mod ord">
+          <ac:chgData name="Gerth Stølting Brodal" userId="04ef4784-6591-4f86-a140-f5c3b108582a" providerId="ADAL" clId="{32A0BADB-2EDA-40A0-B15A-8D58BACC3113}" dt="2023-07-15T12:23:16.361" v="176" actId="478"/>
+          <ac:picMkLst>
+            <pc:docMk/>
+            <pc:sldMk cId="637895129" sldId="513"/>
+            <ac:picMk id="28" creationId="{10BCC1E6-0D85-851F-035F-996FC83899B0}"/>
+          </ac:picMkLst>
+        </pc:picChg>
+        <pc:picChg chg="add del mod">
+          <ac:chgData name="Gerth Stølting Brodal" userId="04ef4784-6591-4f86-a140-f5c3b108582a" providerId="ADAL" clId="{32A0BADB-2EDA-40A0-B15A-8D58BACC3113}" dt="2023-07-15T12:23:14.530" v="175" actId="478"/>
+          <ac:picMkLst>
+            <pc:docMk/>
+            <pc:sldMk cId="637895129" sldId="513"/>
+            <ac:picMk id="32" creationId="{0E5F171E-5ED5-B7A9-9094-A5A86D1BC5BD}"/>
+          </ac:picMkLst>
+        </pc:picChg>
+        <pc:picChg chg="add del mod ord">
+          <ac:chgData name="Gerth Stølting Brodal" userId="04ef4784-6591-4f86-a140-f5c3b108582a" providerId="ADAL" clId="{32A0BADB-2EDA-40A0-B15A-8D58BACC3113}" dt="2023-07-15T12:34:37.489" v="257" actId="478"/>
+          <ac:picMkLst>
+            <pc:docMk/>
+            <pc:sldMk cId="637895129" sldId="513"/>
+            <ac:picMk id="34" creationId="{0B1E8B60-8FC4-B7E7-A4F4-73DB1F3620E8}"/>
+          </ac:picMkLst>
+        </pc:picChg>
+        <pc:picChg chg="add mod ord">
+          <ac:chgData name="Gerth Stølting Brodal" userId="04ef4784-6591-4f86-a140-f5c3b108582a" providerId="ADAL" clId="{32A0BADB-2EDA-40A0-B15A-8D58BACC3113}" dt="2023-07-15T12:34:52.228" v="262" actId="167"/>
+          <ac:picMkLst>
+            <pc:docMk/>
+            <pc:sldMk cId="637895129" sldId="513"/>
+            <ac:picMk id="36" creationId="{16C84B83-BFE6-47C5-BD02-806A3BA394E1}"/>
+          </ac:picMkLst>
+        </pc:picChg>
+        <pc:picChg chg="add mod">
+          <ac:chgData name="Gerth Stølting Brodal" userId="04ef4784-6591-4f86-a140-f5c3b108582a" providerId="ADAL" clId="{32A0BADB-2EDA-40A0-B15A-8D58BACC3113}" dt="2023-07-15T12:39:46.204" v="340" actId="1076"/>
+          <ac:picMkLst>
+            <pc:docMk/>
+            <pc:sldMk cId="637895129" sldId="513"/>
+            <ac:picMk id="37" creationId="{18308946-9027-9C8F-1D78-27AF5CA9EF40}"/>
+          </ac:picMkLst>
+        </pc:picChg>
+        <pc:cxnChg chg="del">
+          <ac:chgData name="Gerth Stølting Brodal" userId="04ef4784-6591-4f86-a140-f5c3b108582a" providerId="ADAL" clId="{32A0BADB-2EDA-40A0-B15A-8D58BACC3113}" dt="2023-07-15T11:51:08.087" v="45" actId="478"/>
+          <ac:cxnSpMkLst>
+            <pc:docMk/>
+            <pc:sldMk cId="637895129" sldId="513"/>
+            <ac:cxnSpMk id="8" creationId="{00000000-0000-0000-0000-000000000000}"/>
+          </ac:cxnSpMkLst>
+        </pc:cxnChg>
+        <pc:cxnChg chg="mod">
+          <ac:chgData name="Gerth Stølting Brodal" userId="04ef4784-6591-4f86-a140-f5c3b108582a" providerId="ADAL" clId="{32A0BADB-2EDA-40A0-B15A-8D58BACC3113}" dt="2023-07-15T12:17:21.740" v="159" actId="14100"/>
+          <ac:cxnSpMkLst>
+            <pc:docMk/>
+            <pc:sldMk cId="637895129" sldId="513"/>
+            <ac:cxnSpMk id="10" creationId="{00000000-0000-0000-0000-000000000000}"/>
+          </ac:cxnSpMkLst>
+        </pc:cxnChg>
+        <pc:cxnChg chg="mod">
+          <ac:chgData name="Gerth Stølting Brodal" userId="04ef4784-6591-4f86-a140-f5c3b108582a" providerId="ADAL" clId="{32A0BADB-2EDA-40A0-B15A-8D58BACC3113}" dt="2023-07-15T12:30:57.573" v="251" actId="1076"/>
+          <ac:cxnSpMkLst>
+            <pc:docMk/>
+            <pc:sldMk cId="637895129" sldId="513"/>
+            <ac:cxnSpMk id="12" creationId="{00000000-0000-0000-0000-000000000000}"/>
+          </ac:cxnSpMkLst>
+        </pc:cxnChg>
+      </pc:sldChg>
+    </pc:docChg>
+  </pc:docChgLst>
   <pc:docChgLst>
     <pc:chgData name="Gerth Stølting Brodal" userId="04ef4784-6591-4f86-a140-f5c3b108582a" providerId="ADAL" clId="{AEFD98B7-9159-4FE3-84D8-FAE8F6B9861E}"/>
     <pc:docChg chg="undo custSel addSld modSld sldOrd">
@@ -718,7 +911,7 @@
           <a:p>
             <a:fld id="{FB1A172F-81D4-4DC4-9113-1DBD56EC3646}" type="datetimeFigureOut">
               <a:rPr lang="en-US" smtClean="0"/>
-              <a:t>2/19/2023</a:t>
+              <a:t>7/15/2023</a:t>
             </a:fld>
             <a:endParaRPr lang="en-US"/>
           </a:p>
@@ -1537,7 +1730,7 @@
           <a:p>
             <a:fld id="{CD563DD8-32AB-41BE-B1C6-8EAC45222ACE}" type="slidenum">
               <a:rPr lang="en-US" smtClean="0"/>
-              <a:t>18</a:t>
+              <a:t>19</a:t>
             </a:fld>
             <a:endParaRPr lang="en-US"/>
           </a:p>
@@ -1621,7 +1814,7 @@
           <a:p>
             <a:fld id="{CD563DD8-32AB-41BE-B1C6-8EAC45222ACE}" type="slidenum">
               <a:rPr lang="en-US" smtClean="0"/>
-              <a:t>19</a:t>
+              <a:t>20</a:t>
             </a:fld>
             <a:endParaRPr lang="en-US"/>
           </a:p>
@@ -2941,7 +3134,7 @@
           <a:p>
             <a:fld id="{0560A9CD-0304-4E0B-9E82-E7E0115DE05B}" type="datetimeFigureOut">
               <a:rPr lang="en-US" smtClean="0"/>
-              <a:t>2/19/2023</a:t>
+              <a:t>7/15/2023</a:t>
             </a:fld>
             <a:endParaRPr lang="en-US"/>
           </a:p>
@@ -3109,7 +3302,7 @@
           <a:p>
             <a:fld id="{0560A9CD-0304-4E0B-9E82-E7E0115DE05B}" type="datetimeFigureOut">
               <a:rPr lang="en-US" smtClean="0"/>
-              <a:t>2/19/2023</a:t>
+              <a:t>7/15/2023</a:t>
             </a:fld>
             <a:endParaRPr lang="en-US"/>
           </a:p>
@@ -3287,7 +3480,7 @@
           <a:p>
             <a:fld id="{0560A9CD-0304-4E0B-9E82-E7E0115DE05B}" type="datetimeFigureOut">
               <a:rPr lang="en-US" smtClean="0"/>
-              <a:t>2/19/2023</a:t>
+              <a:t>7/15/2023</a:t>
             </a:fld>
             <a:endParaRPr lang="en-US"/>
           </a:p>
@@ -3464,7 +3657,7 @@
           <a:p>
             <a:fld id="{0560A9CD-0304-4E0B-9E82-E7E0115DE05B}" type="datetimeFigureOut">
               <a:rPr lang="en-US" smtClean="0"/>
-              <a:t>2/19/2023</a:t>
+              <a:t>7/15/2023</a:t>
             </a:fld>
             <a:endParaRPr lang="en-US"/>
           </a:p>
@@ -3709,7 +3902,7 @@
           <a:p>
             <a:fld id="{0560A9CD-0304-4E0B-9E82-E7E0115DE05B}" type="datetimeFigureOut">
               <a:rPr lang="en-US" smtClean="0"/>
-              <a:t>2/19/2023</a:t>
+              <a:t>7/15/2023</a:t>
             </a:fld>
             <a:endParaRPr lang="en-US"/>
           </a:p>
@@ -3938,7 +4131,7 @@
           <a:p>
             <a:fld id="{0560A9CD-0304-4E0B-9E82-E7E0115DE05B}" type="datetimeFigureOut">
               <a:rPr lang="en-US" smtClean="0"/>
-              <a:t>2/19/2023</a:t>
+              <a:t>7/15/2023</a:t>
             </a:fld>
             <a:endParaRPr lang="en-US"/>
           </a:p>
@@ -4302,7 +4495,7 @@
           <a:p>
             <a:fld id="{0560A9CD-0304-4E0B-9E82-E7E0115DE05B}" type="datetimeFigureOut">
               <a:rPr lang="en-US" smtClean="0"/>
-              <a:t>2/19/2023</a:t>
+              <a:t>7/15/2023</a:t>
             </a:fld>
             <a:endParaRPr lang="en-US"/>
           </a:p>
@@ -4419,7 +4612,7 @@
           <a:p>
             <a:fld id="{0560A9CD-0304-4E0B-9E82-E7E0115DE05B}" type="datetimeFigureOut">
               <a:rPr lang="en-US" smtClean="0"/>
-              <a:t>2/19/2023</a:t>
+              <a:t>7/15/2023</a:t>
             </a:fld>
             <a:endParaRPr lang="en-US"/>
           </a:p>
@@ -4514,7 +4707,7 @@
           <a:p>
             <a:fld id="{0560A9CD-0304-4E0B-9E82-E7E0115DE05B}" type="datetimeFigureOut">
               <a:rPr lang="en-US" smtClean="0"/>
-              <a:t>2/19/2023</a:t>
+              <a:t>7/15/2023</a:t>
             </a:fld>
             <a:endParaRPr lang="en-US"/>
           </a:p>
@@ -4789,7 +4982,7 @@
           <a:p>
             <a:fld id="{0560A9CD-0304-4E0B-9E82-E7E0115DE05B}" type="datetimeFigureOut">
               <a:rPr lang="en-US" smtClean="0"/>
-              <a:t>2/19/2023</a:t>
+              <a:t>7/15/2023</a:t>
             </a:fld>
             <a:endParaRPr lang="en-US"/>
           </a:p>
@@ -5041,7 +5234,7 @@
           <a:p>
             <a:fld id="{0560A9CD-0304-4E0B-9E82-E7E0115DE05B}" type="datetimeFigureOut">
               <a:rPr lang="en-US" smtClean="0"/>
-              <a:t>2/19/2023</a:t>
+              <a:t>7/15/2023</a:t>
             </a:fld>
             <a:endParaRPr lang="en-US"/>
           </a:p>
@@ -5252,7 +5445,7 @@
           <a:p>
             <a:fld id="{0560A9CD-0304-4E0B-9E82-E7E0115DE05B}" type="datetimeFigureOut">
               <a:rPr lang="en-US" smtClean="0"/>
-              <a:t>2/19/2023</a:t>
+              <a:t>7/15/2023</a:t>
             </a:fld>
             <a:endParaRPr lang="en-US"/>
           </a:p>
@@ -13285,6 +13478,1410 @@
           <a:chExt cx="0" cy="0"/>
         </a:xfrm>
       </p:grpSpPr>
+      <p:pic>
+        <p:nvPicPr>
+          <p:cNvPr id="36" name="Picture 35">
+            <a:extLst>
+              <a:ext uri="{FF2B5EF4-FFF2-40B4-BE49-F238E27FC236}">
+                <a16:creationId xmlns:a16="http://schemas.microsoft.com/office/drawing/2014/main" id="{16C84B83-BFE6-47C5-BD02-806A3BA394E1}"/>
+              </a:ext>
+            </a:extLst>
+          </p:cNvPr>
+          <p:cNvPicPr>
+            <a:picLocks noChangeAspect="1"/>
+          </p:cNvPicPr>
+          <p:nvPr/>
+        </p:nvPicPr>
+        <p:blipFill>
+          <a:blip r:embed="rId2"/>
+          <a:stretch>
+            <a:fillRect/>
+          </a:stretch>
+        </p:blipFill>
+        <p:spPr>
+          <a:xfrm>
+            <a:off x="165233" y="837761"/>
+            <a:ext cx="5731742" cy="5952533"/>
+          </a:xfrm>
+          <a:prstGeom prst="rect">
+            <a:avLst/>
+          </a:prstGeom>
+        </p:spPr>
+      </p:pic>
+      <p:graphicFrame>
+        <p:nvGraphicFramePr>
+          <p:cNvPr id="4" name="Table 3"/>
+          <p:cNvGraphicFramePr>
+            <a:graphicFrameLocks noGrp="1"/>
+          </p:cNvGraphicFramePr>
+          <p:nvPr>
+            <p:extLst>
+              <p:ext uri="{D42A27DB-BD31-4B8C-83A1-F6EECF244321}">
+                <p14:modId xmlns:p14="http://schemas.microsoft.com/office/powerpoint/2010/main" val="4216984500"/>
+              </p:ext>
+            </p:extLst>
+          </p:nvPr>
+        </p:nvGraphicFramePr>
+        <p:xfrm>
+          <a:off x="6361988" y="151852"/>
+          <a:ext cx="5711201" cy="6050280"/>
+        </p:xfrm>
+        <a:graphic>
+          <a:graphicData uri="http://schemas.openxmlformats.org/drawingml/2006/table">
+            <a:tbl>
+              <a:tblPr firstRow="1" bandRow="1">
+                <a:tableStyleId>{5C22544A-7EE6-4342-B048-85BDC9FD1C3A}</a:tableStyleId>
+              </a:tblPr>
+              <a:tblGrid>
+                <a:gridCol w="5711201">
+                  <a:extLst>
+                    <a:ext uri="{9D8B030D-6E8A-4147-A177-3AD203B41FA5}">
+                      <a16:colId xmlns:a16="http://schemas.microsoft.com/office/drawing/2014/main" val="1873682825"/>
+                    </a:ext>
+                  </a:extLst>
+                </a:gridCol>
+              </a:tblGrid>
+              <a:tr h="252238">
+                <a:tc>
+                  <a:txBody>
+                    <a:bodyPr/>
+                    <a:lstStyle/>
+                    <a:p>
+                      <a:r>
+                        <a:rPr lang="da-DK" sz="1200" b="1" dirty="0">
+                          <a:latin typeface="Courier New" panose="02070309020205020404" pitchFamily="49" charset="0"/>
+                          <a:cs typeface="Courier New" panose="02070309020205020404" pitchFamily="49" charset="0"/>
+                        </a:rPr>
+                        <a:t>in.py</a:t>
+                      </a:r>
+                    </a:p>
+                  </a:txBody>
+                  <a:tcPr anchor="ctr">
+                    <a:lnL w="6350" cap="flat" cmpd="sng" algn="ctr">
+                      <a:solidFill>
+                        <a:schemeClr val="tx1"/>
+                      </a:solidFill>
+                      <a:prstDash val="solid"/>
+                      <a:round/>
+                      <a:headEnd type="none" w="med" len="med"/>
+                      <a:tailEnd type="none" w="med" len="med"/>
+                    </a:lnL>
+                    <a:lnR w="6350" cap="flat" cmpd="sng" algn="ctr">
+                      <a:solidFill>
+                        <a:schemeClr val="tx1"/>
+                      </a:solidFill>
+                      <a:prstDash val="solid"/>
+                      <a:round/>
+                      <a:headEnd type="none" w="med" len="med"/>
+                      <a:tailEnd type="none" w="med" len="med"/>
+                    </a:lnR>
+                    <a:lnT w="6350" cap="flat" cmpd="sng" algn="ctr">
+                      <a:solidFill>
+                        <a:schemeClr val="tx1"/>
+                      </a:solidFill>
+                      <a:prstDash val="solid"/>
+                      <a:round/>
+                      <a:headEnd type="none" w="med" len="med"/>
+                      <a:tailEnd type="none" w="med" len="med"/>
+                    </a:lnT>
+                    <a:lnB w="6350" cap="flat" cmpd="sng" algn="ctr">
+                      <a:solidFill>
+                        <a:schemeClr val="tx1"/>
+                      </a:solidFill>
+                      <a:prstDash val="solid"/>
+                      <a:round/>
+                      <a:headEnd type="none" w="med" len="med"/>
+                      <a:tailEnd type="none" w="med" len="med"/>
+                    </a:lnB>
+                    <a:lnTlToBr w="12700" cmpd="sng">
+                      <a:noFill/>
+                      <a:prstDash val="solid"/>
+                    </a:lnTlToBr>
+                    <a:lnBlToTr w="12700" cmpd="sng">
+                      <a:noFill/>
+                      <a:prstDash val="solid"/>
+                    </a:lnBlToTr>
+                    <a:solidFill>
+                      <a:srgbClr val="C00000"/>
+                    </a:solidFill>
+                  </a:tcPr>
+                </a:tc>
+                <a:extLst>
+                  <a:ext uri="{0D108BD9-81ED-4DB2-BD59-A6C34878D82A}">
+                    <a16:rowId xmlns:a16="http://schemas.microsoft.com/office/drawing/2014/main" val="3330819881"/>
+                  </a:ext>
+                </a:extLst>
+              </a:tr>
+              <a:tr h="2101987">
+                <a:tc>
+                  <a:txBody>
+                    <a:bodyPr/>
+                    <a:lstStyle/>
+                    <a:p>
+                      <a:r>
+                        <a:rPr lang="en-US" sz="1200" b="1" dirty="0">
+                          <a:latin typeface="Courier New" panose="02070309020205020404" pitchFamily="49" charset="0"/>
+                          <a:cs typeface="Courier New" panose="02070309020205020404" pitchFamily="49" charset="0"/>
+                        </a:rPr>
+                        <a:t>from random import shuffle, choices</a:t>
+                      </a:r>
+                    </a:p>
+                    <a:p>
+                      <a:r>
+                        <a:rPr lang="en-US" sz="1200" b="1" dirty="0">
+                          <a:latin typeface="Courier New" panose="02070309020205020404" pitchFamily="49" charset="0"/>
+                          <a:cs typeface="Courier New" panose="02070309020205020404" pitchFamily="49" charset="0"/>
+                        </a:rPr>
+                        <a:t>from time import time</a:t>
+                      </a:r>
+                    </a:p>
+                    <a:p>
+                      <a:pPr>
+                        <a:spcAft>
+                          <a:spcPts val="600"/>
+                        </a:spcAft>
+                      </a:pPr>
+                      <a:r>
+                        <a:rPr lang="en-US" sz="1200" b="1" dirty="0">
+                          <a:latin typeface="Courier New" panose="02070309020205020404" pitchFamily="49" charset="0"/>
+                          <a:cs typeface="Courier New" panose="02070309020205020404" pitchFamily="49" charset="0"/>
+                        </a:rPr>
+                        <a:t>import </a:t>
+                      </a:r>
+                      <a:r>
+                        <a:rPr lang="en-US" sz="1200" b="1" dirty="0" err="1">
+                          <a:latin typeface="Courier New" panose="02070309020205020404" pitchFamily="49" charset="0"/>
+                          <a:cs typeface="Courier New" panose="02070309020205020404" pitchFamily="49" charset="0"/>
+                        </a:rPr>
+                        <a:t>matplotlib.pyplot</a:t>
+                      </a:r>
+                      <a:r>
+                        <a:rPr lang="en-US" sz="1200" b="1" dirty="0">
+                          <a:latin typeface="Courier New" panose="02070309020205020404" pitchFamily="49" charset="0"/>
+                          <a:cs typeface="Courier New" panose="02070309020205020404" pitchFamily="49" charset="0"/>
+                        </a:rPr>
+                        <a:t> as </a:t>
+                      </a:r>
+                      <a:r>
+                        <a:rPr lang="en-US" sz="1200" b="1" dirty="0" err="1">
+                          <a:latin typeface="Courier New" panose="02070309020205020404" pitchFamily="49" charset="0"/>
+                          <a:cs typeface="Courier New" panose="02070309020205020404" pitchFamily="49" charset="0"/>
+                        </a:rPr>
+                        <a:t>plt</a:t>
+                      </a:r>
+                      <a:endParaRPr lang="en-US" sz="1200" b="1" dirty="0">
+                        <a:latin typeface="Courier New" panose="02070309020205020404" pitchFamily="49" charset="0"/>
+                        <a:cs typeface="Courier New" panose="02070309020205020404" pitchFamily="49" charset="0"/>
+                      </a:endParaRPr>
+                    </a:p>
+                    <a:p>
+                      <a:r>
+                        <a:rPr lang="en-US" sz="1200" b="1" dirty="0" err="1">
+                          <a:solidFill>
+                            <a:srgbClr val="3383BA"/>
+                          </a:solidFill>
+                          <a:latin typeface="Courier New" panose="02070309020205020404" pitchFamily="49" charset="0"/>
+                          <a:cs typeface="Courier New" panose="02070309020205020404" pitchFamily="49" charset="0"/>
+                        </a:rPr>
+                        <a:t>time_L</a:t>
+                      </a:r>
+                      <a:r>
+                        <a:rPr lang="en-US" sz="1200" b="1" dirty="0">
+                          <a:latin typeface="Courier New" panose="02070309020205020404" pitchFamily="49" charset="0"/>
+                          <a:cs typeface="Courier New" panose="02070309020205020404" pitchFamily="49" charset="0"/>
+                        </a:rPr>
+                        <a:t> = []</a:t>
+                      </a:r>
+                    </a:p>
+                    <a:p>
+                      <a:r>
+                        <a:rPr lang="en-US" sz="1200" b="1" dirty="0" err="1">
+                          <a:solidFill>
+                            <a:srgbClr val="FF7E0B"/>
+                          </a:solidFill>
+                          <a:latin typeface="Courier New" panose="02070309020205020404" pitchFamily="49" charset="0"/>
+                          <a:cs typeface="Courier New" panose="02070309020205020404" pitchFamily="49" charset="0"/>
+                        </a:rPr>
+                        <a:t>time_S</a:t>
+                      </a:r>
+                      <a:r>
+                        <a:rPr lang="en-US" sz="1200" b="1" dirty="0">
+                          <a:solidFill>
+                            <a:srgbClr val="FF7E0B"/>
+                          </a:solidFill>
+                          <a:latin typeface="Courier New" panose="02070309020205020404" pitchFamily="49" charset="0"/>
+                          <a:cs typeface="Courier New" panose="02070309020205020404" pitchFamily="49" charset="0"/>
+                        </a:rPr>
+                        <a:t> </a:t>
+                      </a:r>
+                      <a:r>
+                        <a:rPr lang="en-US" sz="1200" b="1" dirty="0">
+                          <a:latin typeface="Courier New" panose="02070309020205020404" pitchFamily="49" charset="0"/>
+                          <a:cs typeface="Courier New" panose="02070309020205020404" pitchFamily="49" charset="0"/>
+                        </a:rPr>
+                        <a:t>= []</a:t>
+                      </a:r>
+                    </a:p>
+                    <a:p>
+                      <a:pPr>
+                        <a:spcAft>
+                          <a:spcPts val="600"/>
+                        </a:spcAft>
+                      </a:pPr>
+                      <a:r>
+                        <a:rPr lang="en-US" sz="1200" b="1" dirty="0" err="1">
+                          <a:solidFill>
+                            <a:srgbClr val="249D24"/>
+                          </a:solidFill>
+                          <a:latin typeface="Courier New" panose="02070309020205020404" pitchFamily="49" charset="0"/>
+                          <a:cs typeface="Courier New" panose="02070309020205020404" pitchFamily="49" charset="0"/>
+                        </a:rPr>
+                        <a:t>time_D</a:t>
+                      </a:r>
+                      <a:r>
+                        <a:rPr lang="en-US" sz="1200" b="1" dirty="0">
+                          <a:solidFill>
+                            <a:srgbClr val="249D24"/>
+                          </a:solidFill>
+                          <a:latin typeface="Courier New" panose="02070309020205020404" pitchFamily="49" charset="0"/>
+                          <a:cs typeface="Courier New" panose="02070309020205020404" pitchFamily="49" charset="0"/>
+                        </a:rPr>
+                        <a:t> </a:t>
+                      </a:r>
+                      <a:r>
+                        <a:rPr lang="en-US" sz="1200" b="1" dirty="0">
+                          <a:latin typeface="Courier New" panose="02070309020205020404" pitchFamily="49" charset="0"/>
+                          <a:cs typeface="Courier New" panose="02070309020205020404" pitchFamily="49" charset="0"/>
+                        </a:rPr>
+                        <a:t>= []</a:t>
+                      </a:r>
+                    </a:p>
+                    <a:p>
+                      <a:pPr>
+                        <a:spcAft>
+                          <a:spcPts val="600"/>
+                        </a:spcAft>
+                      </a:pPr>
+                      <a:r>
+                        <a:rPr lang="en-US" sz="1200" b="1" dirty="0">
+                          <a:latin typeface="Courier New" panose="02070309020205020404" pitchFamily="49" charset="0"/>
+                          <a:cs typeface="Courier New" panose="02070309020205020404" pitchFamily="49" charset="0"/>
+                        </a:rPr>
+                        <a:t>ns = [1, *range(100, 2001, 100)]</a:t>
+                      </a:r>
+                    </a:p>
+                    <a:p>
+                      <a:r>
+                        <a:rPr lang="en-US" sz="1200" b="1" dirty="0">
+                          <a:latin typeface="Courier New" panose="02070309020205020404" pitchFamily="49" charset="0"/>
+                          <a:cs typeface="Courier New" panose="02070309020205020404" pitchFamily="49" charset="0"/>
+                        </a:rPr>
+                        <a:t>for n in ns:</a:t>
+                      </a:r>
+                    </a:p>
+                    <a:p>
+                      <a:r>
+                        <a:rPr lang="en-US" sz="1200" b="1" dirty="0">
+                          <a:latin typeface="Courier New" panose="02070309020205020404" pitchFamily="49" charset="0"/>
+                          <a:cs typeface="Courier New" panose="02070309020205020404" pitchFamily="49" charset="0"/>
+                        </a:rPr>
+                        <a:t>    print(f'{n = }')</a:t>
+                      </a:r>
+                    </a:p>
+                    <a:p>
+                      <a:r>
+                        <a:rPr lang="en-US" sz="1200" b="1" dirty="0">
+                          <a:latin typeface="Courier New" panose="02070309020205020404" pitchFamily="49" charset="0"/>
+                          <a:cs typeface="Courier New" panose="02070309020205020404" pitchFamily="49" charset="0"/>
+                        </a:rPr>
+                        <a:t>    </a:t>
+                      </a:r>
+                      <a:r>
+                        <a:rPr lang="en-US" sz="1200" b="1" dirty="0">
+                          <a:solidFill>
+                            <a:srgbClr val="3383BA"/>
+                          </a:solidFill>
+                          <a:latin typeface="Courier New" panose="02070309020205020404" pitchFamily="49" charset="0"/>
+                          <a:cs typeface="Courier New" panose="02070309020205020404" pitchFamily="49" charset="0"/>
+                        </a:rPr>
+                        <a:t>L</a:t>
+                      </a:r>
+                      <a:r>
+                        <a:rPr lang="en-US" sz="1200" b="1" dirty="0">
+                          <a:latin typeface="Courier New" panose="02070309020205020404" pitchFamily="49" charset="0"/>
+                          <a:cs typeface="Courier New" panose="02070309020205020404" pitchFamily="49" charset="0"/>
+                        </a:rPr>
+                        <a:t> = list(range(n))</a:t>
+                      </a:r>
+                    </a:p>
+                    <a:p>
+                      <a:r>
+                        <a:rPr lang="en-US" sz="1200" b="1" dirty="0">
+                          <a:latin typeface="Courier New" panose="02070309020205020404" pitchFamily="49" charset="0"/>
+                          <a:cs typeface="Courier New" panose="02070309020205020404" pitchFamily="49" charset="0"/>
+                        </a:rPr>
+                        <a:t>    shuffle(</a:t>
+                      </a:r>
+                      <a:r>
+                        <a:rPr lang="en-US" sz="1200" b="1" dirty="0">
+                          <a:solidFill>
+                            <a:srgbClr val="3383BA"/>
+                          </a:solidFill>
+                          <a:latin typeface="Courier New" panose="02070309020205020404" pitchFamily="49" charset="0"/>
+                          <a:cs typeface="Courier New" panose="02070309020205020404" pitchFamily="49" charset="0"/>
+                        </a:rPr>
+                        <a:t>L</a:t>
+                      </a:r>
+                      <a:r>
+                        <a:rPr lang="en-US" sz="1200" b="1" dirty="0">
+                          <a:latin typeface="Courier New" panose="02070309020205020404" pitchFamily="49" charset="0"/>
+                          <a:cs typeface="Courier New" panose="02070309020205020404" pitchFamily="49" charset="0"/>
+                        </a:rPr>
+                        <a:t>)</a:t>
+                      </a:r>
+                    </a:p>
+                    <a:p>
+                      <a:r>
+                        <a:rPr lang="en-US" sz="1200" b="1" dirty="0">
+                          <a:latin typeface="Courier New" panose="02070309020205020404" pitchFamily="49" charset="0"/>
+                          <a:cs typeface="Courier New" panose="02070309020205020404" pitchFamily="49" charset="0"/>
+                        </a:rPr>
+                        <a:t>    </a:t>
+                      </a:r>
+                      <a:r>
+                        <a:rPr lang="en-US" sz="1200" b="1" dirty="0">
+                          <a:solidFill>
+                            <a:srgbClr val="FFC000"/>
+                          </a:solidFill>
+                          <a:latin typeface="Courier New" panose="02070309020205020404" pitchFamily="49" charset="0"/>
+                          <a:cs typeface="Courier New" panose="02070309020205020404" pitchFamily="49" charset="0"/>
+                        </a:rPr>
+                        <a:t>S</a:t>
+                      </a:r>
+                      <a:r>
+                        <a:rPr lang="en-US" sz="1200" b="1" dirty="0">
+                          <a:latin typeface="Courier New" panose="02070309020205020404" pitchFamily="49" charset="0"/>
+                          <a:cs typeface="Courier New" panose="02070309020205020404" pitchFamily="49" charset="0"/>
+                        </a:rPr>
+                        <a:t> = set(</a:t>
+                      </a:r>
+                      <a:r>
+                        <a:rPr lang="en-US" sz="1200" b="1" dirty="0">
+                          <a:solidFill>
+                            <a:srgbClr val="3383BA"/>
+                          </a:solidFill>
+                          <a:latin typeface="Courier New" panose="02070309020205020404" pitchFamily="49" charset="0"/>
+                          <a:cs typeface="Courier New" panose="02070309020205020404" pitchFamily="49" charset="0"/>
+                        </a:rPr>
+                        <a:t>L</a:t>
+                      </a:r>
+                      <a:r>
+                        <a:rPr lang="en-US" sz="1200" b="1" dirty="0">
+                          <a:latin typeface="Courier New" panose="02070309020205020404" pitchFamily="49" charset="0"/>
+                          <a:cs typeface="Courier New" panose="02070309020205020404" pitchFamily="49" charset="0"/>
+                        </a:rPr>
+                        <a:t>)</a:t>
+                      </a:r>
+                    </a:p>
+                    <a:p>
+                      <a:pPr>
+                        <a:spcAft>
+                          <a:spcPts val="600"/>
+                        </a:spcAft>
+                      </a:pPr>
+                      <a:r>
+                        <a:rPr lang="en-US" sz="1200" b="1" dirty="0">
+                          <a:latin typeface="Courier New" panose="02070309020205020404" pitchFamily="49" charset="0"/>
+                          <a:cs typeface="Courier New" panose="02070309020205020404" pitchFamily="49" charset="0"/>
+                        </a:rPr>
+                        <a:t>    </a:t>
+                      </a:r>
+                      <a:r>
+                        <a:rPr lang="en-US" sz="1200" b="1" dirty="0">
+                          <a:solidFill>
+                            <a:srgbClr val="249D24"/>
+                          </a:solidFill>
+                          <a:latin typeface="Courier New" panose="02070309020205020404" pitchFamily="49" charset="0"/>
+                          <a:cs typeface="Courier New" panose="02070309020205020404" pitchFamily="49" charset="0"/>
+                        </a:rPr>
+                        <a:t>D</a:t>
+                      </a:r>
+                      <a:r>
+                        <a:rPr lang="en-US" sz="1200" b="1" dirty="0">
+                          <a:latin typeface="Courier New" panose="02070309020205020404" pitchFamily="49" charset="0"/>
+                          <a:cs typeface="Courier New" panose="02070309020205020404" pitchFamily="49" charset="0"/>
+                        </a:rPr>
+                        <a:t> = {value: 42 for value in </a:t>
+                      </a:r>
+                      <a:r>
+                        <a:rPr lang="en-US" sz="1200" b="1" dirty="0">
+                          <a:solidFill>
+                            <a:srgbClr val="3383BA"/>
+                          </a:solidFill>
+                          <a:latin typeface="Courier New" panose="02070309020205020404" pitchFamily="49" charset="0"/>
+                          <a:cs typeface="Courier New" panose="02070309020205020404" pitchFamily="49" charset="0"/>
+                        </a:rPr>
+                        <a:t>L</a:t>
+                      </a:r>
+                      <a:r>
+                        <a:rPr lang="en-US" sz="1200" b="1" dirty="0">
+                          <a:latin typeface="Courier New" panose="02070309020205020404" pitchFamily="49" charset="0"/>
+                          <a:cs typeface="Courier New" panose="02070309020205020404" pitchFamily="49" charset="0"/>
+                        </a:rPr>
+                        <a:t>}</a:t>
+                      </a:r>
+                    </a:p>
+                    <a:p>
+                      <a:r>
+                        <a:rPr lang="en-US" sz="1200" b="1" dirty="0">
+                          <a:latin typeface="Courier New" panose="02070309020205020404" pitchFamily="49" charset="0"/>
+                          <a:cs typeface="Courier New" panose="02070309020205020404" pitchFamily="49" charset="0"/>
+                        </a:rPr>
+                        <a:t>    queries = choices(</a:t>
+                      </a:r>
+                      <a:r>
+                        <a:rPr lang="en-US" sz="1200" b="1" dirty="0">
+                          <a:solidFill>
+                            <a:srgbClr val="3383BA"/>
+                          </a:solidFill>
+                          <a:latin typeface="Courier New" panose="02070309020205020404" pitchFamily="49" charset="0"/>
+                          <a:cs typeface="Courier New" panose="02070309020205020404" pitchFamily="49" charset="0"/>
+                        </a:rPr>
+                        <a:t>L</a:t>
+                      </a:r>
+                      <a:r>
+                        <a:rPr lang="en-US" sz="1200" b="1" dirty="0">
+                          <a:latin typeface="Courier New" panose="02070309020205020404" pitchFamily="49" charset="0"/>
+                          <a:cs typeface="Courier New" panose="02070309020205020404" pitchFamily="49" charset="0"/>
+                        </a:rPr>
+                        <a:t>, k=1_000_000)</a:t>
+                      </a:r>
+                    </a:p>
+                    <a:p>
+                      <a:r>
+                        <a:rPr lang="en-US" sz="1200" b="1" dirty="0">
+                          <a:latin typeface="Courier New" panose="02070309020205020404" pitchFamily="49" charset="0"/>
+                          <a:cs typeface="Courier New" panose="02070309020205020404" pitchFamily="49" charset="0"/>
+                        </a:rPr>
+                        <a:t>    for X, times in [(</a:t>
+                      </a:r>
+                      <a:r>
+                        <a:rPr lang="en-US" sz="1200" b="1" dirty="0">
+                          <a:solidFill>
+                            <a:srgbClr val="3383BA"/>
+                          </a:solidFill>
+                          <a:latin typeface="Courier New" panose="02070309020205020404" pitchFamily="49" charset="0"/>
+                          <a:cs typeface="Courier New" panose="02070309020205020404" pitchFamily="49" charset="0"/>
+                        </a:rPr>
+                        <a:t>L</a:t>
+                      </a:r>
+                      <a:r>
+                        <a:rPr lang="en-US" sz="1200" b="1" dirty="0">
+                          <a:latin typeface="Courier New" panose="02070309020205020404" pitchFamily="49" charset="0"/>
+                          <a:cs typeface="Courier New" panose="02070309020205020404" pitchFamily="49" charset="0"/>
+                        </a:rPr>
+                        <a:t>, </a:t>
+                      </a:r>
+                      <a:r>
+                        <a:rPr lang="en-US" sz="1200" b="1" dirty="0" err="1">
+                          <a:solidFill>
+                            <a:srgbClr val="3383BA"/>
+                          </a:solidFill>
+                          <a:latin typeface="Courier New" panose="02070309020205020404" pitchFamily="49" charset="0"/>
+                          <a:cs typeface="Courier New" panose="02070309020205020404" pitchFamily="49" charset="0"/>
+                        </a:rPr>
+                        <a:t>time_L</a:t>
+                      </a:r>
+                      <a:r>
+                        <a:rPr lang="en-US" sz="1200" b="1" dirty="0">
+                          <a:latin typeface="Courier New" panose="02070309020205020404" pitchFamily="49" charset="0"/>
+                          <a:cs typeface="Courier New" panose="02070309020205020404" pitchFamily="49" charset="0"/>
+                        </a:rPr>
+                        <a:t>), (</a:t>
+                      </a:r>
+                      <a:r>
+                        <a:rPr lang="en-US" sz="1200" b="1" dirty="0">
+                          <a:solidFill>
+                            <a:srgbClr val="FFC000"/>
+                          </a:solidFill>
+                          <a:latin typeface="Courier New" panose="02070309020205020404" pitchFamily="49" charset="0"/>
+                          <a:cs typeface="Courier New" panose="02070309020205020404" pitchFamily="49" charset="0"/>
+                        </a:rPr>
+                        <a:t>S</a:t>
+                      </a:r>
+                      <a:r>
+                        <a:rPr lang="en-US" sz="1200" b="1" dirty="0">
+                          <a:latin typeface="Courier New" panose="02070309020205020404" pitchFamily="49" charset="0"/>
+                          <a:cs typeface="Courier New" panose="02070309020205020404" pitchFamily="49" charset="0"/>
+                        </a:rPr>
+                        <a:t>, </a:t>
+                      </a:r>
+                      <a:r>
+                        <a:rPr lang="en-US" sz="1200" b="1" dirty="0" err="1">
+                          <a:solidFill>
+                            <a:srgbClr val="FFC000"/>
+                          </a:solidFill>
+                          <a:latin typeface="Courier New" panose="02070309020205020404" pitchFamily="49" charset="0"/>
+                          <a:cs typeface="Courier New" panose="02070309020205020404" pitchFamily="49" charset="0"/>
+                        </a:rPr>
+                        <a:t>time_S</a:t>
+                      </a:r>
+                      <a:r>
+                        <a:rPr lang="en-US" sz="1200" b="1" dirty="0">
+                          <a:latin typeface="Courier New" panose="02070309020205020404" pitchFamily="49" charset="0"/>
+                          <a:cs typeface="Courier New" panose="02070309020205020404" pitchFamily="49" charset="0"/>
+                        </a:rPr>
+                        <a:t>), (</a:t>
+                      </a:r>
+                      <a:r>
+                        <a:rPr lang="en-US" sz="1200" b="1" dirty="0">
+                          <a:solidFill>
+                            <a:srgbClr val="249D24"/>
+                          </a:solidFill>
+                          <a:latin typeface="Courier New" panose="02070309020205020404" pitchFamily="49" charset="0"/>
+                          <a:cs typeface="Courier New" panose="02070309020205020404" pitchFamily="49" charset="0"/>
+                        </a:rPr>
+                        <a:t>D</a:t>
+                      </a:r>
+                      <a:r>
+                        <a:rPr lang="en-US" sz="1200" b="1" dirty="0">
+                          <a:latin typeface="Courier New" panose="02070309020205020404" pitchFamily="49" charset="0"/>
+                          <a:cs typeface="Courier New" panose="02070309020205020404" pitchFamily="49" charset="0"/>
+                        </a:rPr>
+                        <a:t>, </a:t>
+                      </a:r>
+                      <a:r>
+                        <a:rPr lang="en-US" sz="1200" b="1" dirty="0" err="1">
+                          <a:solidFill>
+                            <a:srgbClr val="249D24"/>
+                          </a:solidFill>
+                          <a:latin typeface="Courier New" panose="02070309020205020404" pitchFamily="49" charset="0"/>
+                          <a:cs typeface="Courier New" panose="02070309020205020404" pitchFamily="49" charset="0"/>
+                        </a:rPr>
+                        <a:t>time_D</a:t>
+                      </a:r>
+                      <a:r>
+                        <a:rPr lang="en-US" sz="1200" b="1" dirty="0">
+                          <a:latin typeface="Courier New" panose="02070309020205020404" pitchFamily="49" charset="0"/>
+                          <a:cs typeface="Courier New" panose="02070309020205020404" pitchFamily="49" charset="0"/>
+                        </a:rPr>
+                        <a:t>)]:</a:t>
+                      </a:r>
+                    </a:p>
+                    <a:p>
+                      <a:r>
+                        <a:rPr lang="en-US" sz="1200" b="1" dirty="0">
+                          <a:latin typeface="Courier New" panose="02070309020205020404" pitchFamily="49" charset="0"/>
+                          <a:cs typeface="Courier New" panose="02070309020205020404" pitchFamily="49" charset="0"/>
+                        </a:rPr>
+                        <a:t>        count = 0</a:t>
+                      </a:r>
+                    </a:p>
+                    <a:p>
+                      <a:r>
+                        <a:rPr lang="en-US" sz="1200" b="1" dirty="0">
+                          <a:latin typeface="Courier New" panose="02070309020205020404" pitchFamily="49" charset="0"/>
+                          <a:cs typeface="Courier New" panose="02070309020205020404" pitchFamily="49" charset="0"/>
+                        </a:rPr>
+                        <a:t>        start = time()</a:t>
+                      </a:r>
+                    </a:p>
+                    <a:p>
+                      <a:r>
+                        <a:rPr lang="en-US" sz="1200" b="1" dirty="0">
+                          <a:latin typeface="Courier New" panose="02070309020205020404" pitchFamily="49" charset="0"/>
+                          <a:cs typeface="Courier New" panose="02070309020205020404" pitchFamily="49" charset="0"/>
+                        </a:rPr>
+                        <a:t>        for q in queries:</a:t>
+                      </a:r>
+                    </a:p>
+                    <a:p>
+                      <a:r>
+                        <a:rPr lang="en-US" sz="1200" b="1" dirty="0">
+                          <a:latin typeface="Courier New" panose="02070309020205020404" pitchFamily="49" charset="0"/>
+                          <a:cs typeface="Courier New" panose="02070309020205020404" pitchFamily="49" charset="0"/>
+                        </a:rPr>
+                        <a:t>            if q </a:t>
+                      </a:r>
+                      <a:r>
+                        <a:rPr lang="en-US" sz="1200" b="1" dirty="0">
+                          <a:solidFill>
+                            <a:srgbClr val="C00000"/>
+                          </a:solidFill>
+                          <a:latin typeface="Courier New" panose="02070309020205020404" pitchFamily="49" charset="0"/>
+                          <a:cs typeface="Courier New" panose="02070309020205020404" pitchFamily="49" charset="0"/>
+                        </a:rPr>
+                        <a:t>in</a:t>
+                      </a:r>
+                      <a:r>
+                        <a:rPr lang="en-US" sz="1200" b="1" dirty="0">
+                          <a:latin typeface="Courier New" panose="02070309020205020404" pitchFamily="49" charset="0"/>
+                          <a:cs typeface="Courier New" panose="02070309020205020404" pitchFamily="49" charset="0"/>
+                        </a:rPr>
+                        <a:t> X:</a:t>
+                      </a:r>
+                    </a:p>
+                    <a:p>
+                      <a:r>
+                        <a:rPr lang="en-US" sz="1200" b="1" dirty="0">
+                          <a:latin typeface="Courier New" panose="02070309020205020404" pitchFamily="49" charset="0"/>
+                          <a:cs typeface="Courier New" panose="02070309020205020404" pitchFamily="49" charset="0"/>
+                        </a:rPr>
+                        <a:t>                count +=1    </a:t>
+                      </a:r>
+                    </a:p>
+                    <a:p>
+                      <a:r>
+                        <a:rPr lang="en-US" sz="1200" b="1" dirty="0">
+                          <a:latin typeface="Courier New" panose="02070309020205020404" pitchFamily="49" charset="0"/>
+                          <a:cs typeface="Courier New" panose="02070309020205020404" pitchFamily="49" charset="0"/>
+                        </a:rPr>
+                        <a:t>        end = time()</a:t>
+                      </a:r>
+                    </a:p>
+                    <a:p>
+                      <a:pPr>
+                        <a:spcAft>
+                          <a:spcPts val="600"/>
+                        </a:spcAft>
+                      </a:pPr>
+                      <a:r>
+                        <a:rPr lang="en-US" sz="1200" b="1" dirty="0">
+                          <a:latin typeface="Courier New" panose="02070309020205020404" pitchFamily="49" charset="0"/>
+                          <a:cs typeface="Courier New" panose="02070309020205020404" pitchFamily="49" charset="0"/>
+                        </a:rPr>
+                        <a:t>        </a:t>
+                      </a:r>
+                      <a:r>
+                        <a:rPr lang="en-US" sz="1200" b="1" dirty="0" err="1">
+                          <a:latin typeface="Courier New" panose="02070309020205020404" pitchFamily="49" charset="0"/>
+                          <a:cs typeface="Courier New" panose="02070309020205020404" pitchFamily="49" charset="0"/>
+                        </a:rPr>
+                        <a:t>times.append</a:t>
+                      </a:r>
+                      <a:r>
+                        <a:rPr lang="en-US" sz="1200" b="1" dirty="0">
+                          <a:latin typeface="Courier New" panose="02070309020205020404" pitchFamily="49" charset="0"/>
+                          <a:cs typeface="Courier New" panose="02070309020205020404" pitchFamily="49" charset="0"/>
+                        </a:rPr>
+                        <a:t>((end - start) / </a:t>
+                      </a:r>
+                      <a:r>
+                        <a:rPr lang="en-US" sz="1200" b="1" dirty="0" err="1">
+                          <a:latin typeface="Courier New" panose="02070309020205020404" pitchFamily="49" charset="0"/>
+                          <a:cs typeface="Courier New" panose="02070309020205020404" pitchFamily="49" charset="0"/>
+                        </a:rPr>
+                        <a:t>len</a:t>
+                      </a:r>
+                      <a:r>
+                        <a:rPr lang="en-US" sz="1200" b="1" dirty="0">
+                          <a:latin typeface="Courier New" panose="02070309020205020404" pitchFamily="49" charset="0"/>
+                          <a:cs typeface="Courier New" panose="02070309020205020404" pitchFamily="49" charset="0"/>
+                        </a:rPr>
+                        <a:t>(queries))</a:t>
+                      </a:r>
+                    </a:p>
+                    <a:p>
+                      <a:r>
+                        <a:rPr lang="en-US" sz="1200" b="1" dirty="0" err="1">
+                          <a:latin typeface="Courier New" panose="02070309020205020404" pitchFamily="49" charset="0"/>
+                          <a:cs typeface="Courier New" panose="02070309020205020404" pitchFamily="49" charset="0"/>
+                        </a:rPr>
+                        <a:t>plt.plot</a:t>
+                      </a:r>
+                      <a:r>
+                        <a:rPr lang="en-US" sz="1200" b="1" dirty="0">
+                          <a:latin typeface="Courier New" panose="02070309020205020404" pitchFamily="49" charset="0"/>
+                          <a:cs typeface="Courier New" panose="02070309020205020404" pitchFamily="49" charset="0"/>
+                        </a:rPr>
+                        <a:t>(ns, </a:t>
+                      </a:r>
+                      <a:r>
+                        <a:rPr lang="en-US" sz="1200" b="1" dirty="0" err="1">
+                          <a:solidFill>
+                            <a:srgbClr val="3383BA"/>
+                          </a:solidFill>
+                          <a:latin typeface="Courier New" panose="02070309020205020404" pitchFamily="49" charset="0"/>
+                          <a:cs typeface="Courier New" panose="02070309020205020404" pitchFamily="49" charset="0"/>
+                        </a:rPr>
+                        <a:t>time_L</a:t>
+                      </a:r>
+                      <a:r>
+                        <a:rPr lang="en-US" sz="1200" b="1" dirty="0">
+                          <a:latin typeface="Courier New" panose="02070309020205020404" pitchFamily="49" charset="0"/>
+                          <a:cs typeface="Courier New" panose="02070309020205020404" pitchFamily="49" charset="0"/>
+                        </a:rPr>
+                        <a:t>, '.-', label='list')</a:t>
+                      </a:r>
+                    </a:p>
+                    <a:p>
+                      <a:r>
+                        <a:rPr lang="en-US" sz="1200" b="1" dirty="0" err="1">
+                          <a:latin typeface="Courier New" panose="02070309020205020404" pitchFamily="49" charset="0"/>
+                          <a:cs typeface="Courier New" panose="02070309020205020404" pitchFamily="49" charset="0"/>
+                        </a:rPr>
+                        <a:t>plt.plot</a:t>
+                      </a:r>
+                      <a:r>
+                        <a:rPr lang="en-US" sz="1200" b="1" dirty="0">
+                          <a:latin typeface="Courier New" panose="02070309020205020404" pitchFamily="49" charset="0"/>
+                          <a:cs typeface="Courier New" panose="02070309020205020404" pitchFamily="49" charset="0"/>
+                        </a:rPr>
+                        <a:t>(ns, </a:t>
+                      </a:r>
+                      <a:r>
+                        <a:rPr lang="en-US" sz="1200" b="1" dirty="0" err="1">
+                          <a:solidFill>
+                            <a:srgbClr val="FFC000"/>
+                          </a:solidFill>
+                          <a:latin typeface="Courier New" panose="02070309020205020404" pitchFamily="49" charset="0"/>
+                          <a:cs typeface="Courier New" panose="02070309020205020404" pitchFamily="49" charset="0"/>
+                        </a:rPr>
+                        <a:t>time_S</a:t>
+                      </a:r>
+                      <a:r>
+                        <a:rPr lang="en-US" sz="1200" b="1" dirty="0">
+                          <a:latin typeface="Courier New" panose="02070309020205020404" pitchFamily="49" charset="0"/>
+                          <a:cs typeface="Courier New" panose="02070309020205020404" pitchFamily="49" charset="0"/>
+                        </a:rPr>
+                        <a:t>, '.-', label='set')</a:t>
+                      </a:r>
+                    </a:p>
+                    <a:p>
+                      <a:r>
+                        <a:rPr lang="en-US" sz="1200" b="1" dirty="0" err="1">
+                          <a:latin typeface="Courier New" panose="02070309020205020404" pitchFamily="49" charset="0"/>
+                          <a:cs typeface="Courier New" panose="02070309020205020404" pitchFamily="49" charset="0"/>
+                        </a:rPr>
+                        <a:t>plt.plot</a:t>
+                      </a:r>
+                      <a:r>
+                        <a:rPr lang="en-US" sz="1200" b="1" dirty="0">
+                          <a:latin typeface="Courier New" panose="02070309020205020404" pitchFamily="49" charset="0"/>
+                          <a:cs typeface="Courier New" panose="02070309020205020404" pitchFamily="49" charset="0"/>
+                        </a:rPr>
+                        <a:t>(ns, </a:t>
+                      </a:r>
+                      <a:r>
+                        <a:rPr lang="en-US" sz="1200" b="1" dirty="0" err="1">
+                          <a:solidFill>
+                            <a:srgbClr val="249D24"/>
+                          </a:solidFill>
+                          <a:latin typeface="Courier New" panose="02070309020205020404" pitchFamily="49" charset="0"/>
+                          <a:cs typeface="Courier New" panose="02070309020205020404" pitchFamily="49" charset="0"/>
+                        </a:rPr>
+                        <a:t>time_D</a:t>
+                      </a:r>
+                      <a:r>
+                        <a:rPr lang="en-US" sz="1200" b="1" dirty="0">
+                          <a:latin typeface="Courier New" panose="02070309020205020404" pitchFamily="49" charset="0"/>
+                          <a:cs typeface="Courier New" panose="02070309020205020404" pitchFamily="49" charset="0"/>
+                        </a:rPr>
+                        <a:t>, '.-', label='</a:t>
+                      </a:r>
+                      <a:r>
+                        <a:rPr lang="en-US" sz="1200" b="1" dirty="0" err="1">
+                          <a:latin typeface="Courier New" panose="02070309020205020404" pitchFamily="49" charset="0"/>
+                          <a:cs typeface="Courier New" panose="02070309020205020404" pitchFamily="49" charset="0"/>
+                        </a:rPr>
+                        <a:t>dict</a:t>
+                      </a:r>
+                      <a:r>
+                        <a:rPr lang="en-US" sz="1200" b="1" dirty="0">
+                          <a:latin typeface="Courier New" panose="02070309020205020404" pitchFamily="49" charset="0"/>
+                          <a:cs typeface="Courier New" panose="02070309020205020404" pitchFamily="49" charset="0"/>
+                        </a:rPr>
+                        <a:t>')</a:t>
+                      </a:r>
+                    </a:p>
+                    <a:p>
+                      <a:r>
+                        <a:rPr lang="en-US" sz="1200" b="1" dirty="0" err="1">
+                          <a:latin typeface="Courier New" panose="02070309020205020404" pitchFamily="49" charset="0"/>
+                          <a:cs typeface="Courier New" panose="02070309020205020404" pitchFamily="49" charset="0"/>
+                        </a:rPr>
+                        <a:t>plt.xlabel</a:t>
+                      </a:r>
+                      <a:r>
+                        <a:rPr lang="en-US" sz="1200" b="1" dirty="0">
+                          <a:latin typeface="Courier New" panose="02070309020205020404" pitchFamily="49" charset="0"/>
+                          <a:cs typeface="Courier New" panose="02070309020205020404" pitchFamily="49" charset="0"/>
+                        </a:rPr>
+                        <a:t>('Size of list/set/</a:t>
+                      </a:r>
+                      <a:r>
+                        <a:rPr lang="en-US" sz="1200" b="1" dirty="0" err="1">
+                          <a:latin typeface="Courier New" panose="02070309020205020404" pitchFamily="49" charset="0"/>
+                          <a:cs typeface="Courier New" panose="02070309020205020404" pitchFamily="49" charset="0"/>
+                        </a:rPr>
+                        <a:t>dict</a:t>
+                      </a:r>
+                      <a:r>
+                        <a:rPr lang="en-US" sz="1200" b="1" dirty="0">
+                          <a:latin typeface="Courier New" panose="02070309020205020404" pitchFamily="49" charset="0"/>
+                          <a:cs typeface="Courier New" panose="02070309020205020404" pitchFamily="49" charset="0"/>
+                        </a:rPr>
+                        <a:t> (n)')</a:t>
+                      </a:r>
+                    </a:p>
+                    <a:p>
+                      <a:r>
+                        <a:rPr lang="en-US" sz="1200" b="1" dirty="0" err="1">
+                          <a:latin typeface="Courier New" panose="02070309020205020404" pitchFamily="49" charset="0"/>
+                          <a:cs typeface="Courier New" panose="02070309020205020404" pitchFamily="49" charset="0"/>
+                        </a:rPr>
+                        <a:t>plt.ylabel</a:t>
+                      </a:r>
+                      <a:r>
+                        <a:rPr lang="en-US" sz="1200" b="1" dirty="0">
+                          <a:latin typeface="Courier New" panose="02070309020205020404" pitchFamily="49" charset="0"/>
+                          <a:cs typeface="Courier New" panose="02070309020205020404" pitchFamily="49" charset="0"/>
+                        </a:rPr>
+                        <a:t>("Average query time for 'in' (seconds)")</a:t>
+                      </a:r>
+                    </a:p>
+                    <a:p>
+                      <a:r>
+                        <a:rPr lang="en-US" sz="1200" b="1" dirty="0" err="1">
+                          <a:latin typeface="Courier New" panose="02070309020205020404" pitchFamily="49" charset="0"/>
+                          <a:cs typeface="Courier New" panose="02070309020205020404" pitchFamily="49" charset="0"/>
+                        </a:rPr>
+                        <a:t>plt.legend</a:t>
+                      </a:r>
+                      <a:r>
+                        <a:rPr lang="en-US" sz="1200" b="1" dirty="0">
+                          <a:latin typeface="Courier New" panose="02070309020205020404" pitchFamily="49" charset="0"/>
+                          <a:cs typeface="Courier New" panose="02070309020205020404" pitchFamily="49" charset="0"/>
+                        </a:rPr>
+                        <a:t>()</a:t>
+                      </a:r>
+                    </a:p>
+                    <a:p>
+                      <a:r>
+                        <a:rPr lang="en-US" sz="1200" b="1" dirty="0" err="1">
+                          <a:latin typeface="Courier New" panose="02070309020205020404" pitchFamily="49" charset="0"/>
+                          <a:cs typeface="Courier New" panose="02070309020205020404" pitchFamily="49" charset="0"/>
+                        </a:rPr>
+                        <a:t>plt.show</a:t>
+                      </a:r>
+                      <a:r>
+                        <a:rPr lang="en-US" sz="1200" b="1" dirty="0">
+                          <a:latin typeface="Courier New" panose="02070309020205020404" pitchFamily="49" charset="0"/>
+                          <a:cs typeface="Courier New" panose="02070309020205020404" pitchFamily="49" charset="0"/>
+                        </a:rPr>
+                        <a:t>()</a:t>
+                      </a:r>
+                    </a:p>
+                  </a:txBody>
+                  <a:tcPr>
+                    <a:lnL w="6350" cap="flat" cmpd="sng" algn="ctr">
+                      <a:solidFill>
+                        <a:schemeClr val="tx1"/>
+                      </a:solidFill>
+                      <a:prstDash val="solid"/>
+                      <a:round/>
+                      <a:headEnd type="none" w="med" len="med"/>
+                      <a:tailEnd type="none" w="med" len="med"/>
+                    </a:lnL>
+                    <a:lnR w="6350" cap="flat" cmpd="sng" algn="ctr">
+                      <a:solidFill>
+                        <a:schemeClr val="tx1"/>
+                      </a:solidFill>
+                      <a:prstDash val="solid"/>
+                      <a:round/>
+                      <a:headEnd type="none" w="med" len="med"/>
+                      <a:tailEnd type="none" w="med" len="med"/>
+                    </a:lnR>
+                    <a:lnT w="6350" cap="flat" cmpd="sng" algn="ctr">
+                      <a:solidFill>
+                        <a:schemeClr val="tx1"/>
+                      </a:solidFill>
+                      <a:prstDash val="solid"/>
+                      <a:round/>
+                      <a:headEnd type="none" w="med" len="med"/>
+                      <a:tailEnd type="none" w="med" len="med"/>
+                    </a:lnT>
+                    <a:lnB w="6350" cap="flat" cmpd="sng" algn="ctr">
+                      <a:solidFill>
+                        <a:schemeClr val="tx1"/>
+                      </a:solidFill>
+                      <a:prstDash val="solid"/>
+                      <a:round/>
+                      <a:headEnd type="none" w="med" len="med"/>
+                      <a:tailEnd type="none" w="med" len="med"/>
+                    </a:lnB>
+                    <a:lnTlToBr w="12700" cmpd="sng">
+                      <a:noFill/>
+                      <a:prstDash val="solid"/>
+                    </a:lnTlToBr>
+                    <a:lnBlToTr w="12700" cmpd="sng">
+                      <a:noFill/>
+                      <a:prstDash val="solid"/>
+                    </a:lnBlToTr>
+                    <a:solidFill>
+                      <a:schemeClr val="accent5">
+                        <a:lumMod val="20000"/>
+                        <a:lumOff val="80000"/>
+                      </a:schemeClr>
+                    </a:solidFill>
+                  </a:tcPr>
+                </a:tc>
+                <a:extLst>
+                  <a:ext uri="{0D108BD9-81ED-4DB2-BD59-A6C34878D82A}">
+                    <a16:rowId xmlns:a16="http://schemas.microsoft.com/office/drawing/2014/main" val="4112970457"/>
+                  </a:ext>
+                </a:extLst>
+              </a:tr>
+            </a:tbl>
+          </a:graphicData>
+        </a:graphic>
+      </p:graphicFrame>
+      <p:sp>
+        <p:nvSpPr>
+          <p:cNvPr id="6" name="Title 1"/>
+          <p:cNvSpPr>
+            <a:spLocks noGrp="1"/>
+          </p:cNvSpPr>
+          <p:nvPr>
+            <p:ph type="title"/>
+          </p:nvPr>
+        </p:nvSpPr>
+        <p:spPr>
+          <a:xfrm>
+            <a:off x="264227" y="151852"/>
+            <a:ext cx="5293424" cy="685909"/>
+          </a:xfrm>
+        </p:spPr>
+        <p:txBody>
+          <a:bodyPr>
+            <a:normAutofit fontScale="90000"/>
+          </a:bodyPr>
+          <a:lstStyle/>
+          <a:p>
+            <a:r>
+              <a:rPr lang="en-US" dirty="0"/>
+              <a:t>Membership queries  </a:t>
+            </a:r>
+            <a:r>
+              <a:rPr lang="en-US" dirty="0">
+                <a:latin typeface="Courier New" panose="02070309020205020404" pitchFamily="49" charset="0"/>
+                <a:cs typeface="Courier New" panose="02070309020205020404" pitchFamily="49" charset="0"/>
+              </a:rPr>
+              <a:t>in</a:t>
+            </a:r>
+          </a:p>
+        </p:txBody>
+      </p:sp>
+      <p:grpSp>
+        <p:nvGrpSpPr>
+          <p:cNvPr id="26" name="Group 25">
+            <a:extLst>
+              <a:ext uri="{FF2B5EF4-FFF2-40B4-BE49-F238E27FC236}">
+                <a16:creationId xmlns:a16="http://schemas.microsoft.com/office/drawing/2014/main" id="{E3C1A19D-FB28-1700-35F0-784951085ABA}"/>
+              </a:ext>
+            </a:extLst>
+          </p:cNvPr>
+          <p:cNvGrpSpPr/>
+          <p:nvPr/>
+        </p:nvGrpSpPr>
+        <p:grpSpPr>
+          <a:xfrm>
+            <a:off x="2974411" y="4675084"/>
+            <a:ext cx="2398104" cy="1224328"/>
+            <a:chOff x="2699112" y="4475843"/>
+            <a:chExt cx="2398104" cy="1224328"/>
+          </a:xfrm>
+        </p:grpSpPr>
+        <p:sp>
+          <p:nvSpPr>
+            <p:cNvPr id="9" name="TextBox 8"/>
+            <p:cNvSpPr txBox="1"/>
+            <p:nvPr/>
+          </p:nvSpPr>
+          <p:spPr>
+            <a:xfrm>
+              <a:off x="2699112" y="4475843"/>
+              <a:ext cx="2398104" cy="923330"/>
+            </a:xfrm>
+            <a:prstGeom prst="rect">
+              <a:avLst/>
+            </a:prstGeom>
+            <a:noFill/>
+          </p:spPr>
+          <p:txBody>
+            <a:bodyPr wrap="square" rtlCol="0">
+              <a:spAutoFit/>
+            </a:bodyPr>
+            <a:lstStyle/>
+            <a:p>
+              <a:pPr algn="ctr"/>
+              <a:r>
+                <a:rPr lang="en-US" dirty="0">
+                  <a:solidFill>
+                    <a:srgbClr val="C00000"/>
+                  </a:solidFill>
+                </a:rPr>
+                <a:t>Sets and dictionaries constant time </a:t>
+              </a:r>
+              <a:r>
+                <a:rPr lang="en-US" dirty="0">
+                  <a:solidFill>
+                    <a:srgbClr val="C00000"/>
+                  </a:solidFill>
+                  <a:latin typeface="Courier New" panose="02070309020205020404" pitchFamily="49" charset="0"/>
+                  <a:cs typeface="Courier New" panose="02070309020205020404" pitchFamily="49" charset="0"/>
+                </a:rPr>
+                <a:t>in</a:t>
+              </a:r>
+            </a:p>
+            <a:p>
+              <a:pPr algn="ctr"/>
+              <a:r>
+                <a:rPr lang="en-US" dirty="0">
+                  <a:solidFill>
+                    <a:srgbClr val="C00000"/>
+                  </a:solidFill>
+                </a:rPr>
+                <a:t>≈ 1∙10</a:t>
+              </a:r>
+              <a:r>
+                <a:rPr lang="en-US" baseline="30000" dirty="0">
+                  <a:solidFill>
+                    <a:srgbClr val="C00000"/>
+                  </a:solidFill>
+                </a:rPr>
+                <a:t>-7 </a:t>
+              </a:r>
+              <a:r>
+                <a:rPr lang="en-US" dirty="0">
+                  <a:solidFill>
+                    <a:srgbClr val="C00000"/>
+                  </a:solidFill>
+                </a:rPr>
+                <a:t>sec</a:t>
+              </a:r>
+            </a:p>
+          </p:txBody>
+        </p:sp>
+        <p:cxnSp>
+          <p:nvCxnSpPr>
+            <p:cNvPr id="10" name="Straight Arrow Connector 9"/>
+            <p:cNvCxnSpPr>
+              <a:cxnSpLocks/>
+            </p:cNvCxnSpPr>
+            <p:nvPr/>
+          </p:nvCxnSpPr>
+          <p:spPr>
+            <a:xfrm>
+              <a:off x="3898164" y="5416360"/>
+              <a:ext cx="0" cy="283811"/>
+            </a:xfrm>
+            <a:prstGeom prst="straightConnector1">
+              <a:avLst/>
+            </a:prstGeom>
+            <a:ln>
+              <a:solidFill>
+                <a:srgbClr val="C00000"/>
+              </a:solidFill>
+              <a:tailEnd type="triangle"/>
+            </a:ln>
+          </p:spPr>
+          <p:style>
+            <a:lnRef idx="1">
+              <a:schemeClr val="accent1"/>
+            </a:lnRef>
+            <a:fillRef idx="0">
+              <a:schemeClr val="accent1"/>
+            </a:fillRef>
+            <a:effectRef idx="0">
+              <a:schemeClr val="accent1"/>
+            </a:effectRef>
+            <a:fontRef idx="minor">
+              <a:schemeClr val="tx1"/>
+            </a:fontRef>
+          </p:style>
+        </p:cxnSp>
+      </p:grpSp>
+      <p:grpSp>
+        <p:nvGrpSpPr>
+          <p:cNvPr id="29" name="Group 28">
+            <a:extLst>
+              <a:ext uri="{FF2B5EF4-FFF2-40B4-BE49-F238E27FC236}">
+                <a16:creationId xmlns:a16="http://schemas.microsoft.com/office/drawing/2014/main" id="{8FDA7B88-B8CF-2A93-2D59-BA63F35D6ED6}"/>
+              </a:ext>
+            </a:extLst>
+          </p:cNvPr>
+          <p:cNvGrpSpPr/>
+          <p:nvPr/>
+        </p:nvGrpSpPr>
+        <p:grpSpPr>
+          <a:xfrm>
+            <a:off x="2205761" y="1346594"/>
+            <a:ext cx="2600340" cy="1145072"/>
+            <a:chOff x="4857007" y="1508966"/>
+            <a:chExt cx="1567543" cy="1145072"/>
+          </a:xfrm>
+        </p:grpSpPr>
+        <p:sp>
+          <p:nvSpPr>
+            <p:cNvPr id="11" name="TextBox 10"/>
+            <p:cNvSpPr txBox="1"/>
+            <p:nvPr/>
+          </p:nvSpPr>
+          <p:spPr>
+            <a:xfrm>
+              <a:off x="4857007" y="1508966"/>
+              <a:ext cx="1567543" cy="923330"/>
+            </a:xfrm>
+            <a:prstGeom prst="rect">
+              <a:avLst/>
+            </a:prstGeom>
+            <a:noFill/>
+          </p:spPr>
+          <p:txBody>
+            <a:bodyPr wrap="square" rtlCol="0">
+              <a:spAutoFit/>
+            </a:bodyPr>
+            <a:lstStyle/>
+            <a:p>
+              <a:pPr algn="ctr"/>
+              <a:r>
+                <a:rPr lang="en-US" dirty="0">
+                  <a:solidFill>
+                    <a:srgbClr val="C00000"/>
+                  </a:solidFill>
+                </a:rPr>
+                <a:t>Lists</a:t>
+              </a:r>
+            </a:p>
+            <a:p>
+              <a:pPr algn="ctr"/>
+              <a:r>
+                <a:rPr lang="en-US" dirty="0">
+                  <a:solidFill>
+                    <a:srgbClr val="C00000"/>
+                  </a:solidFill>
+                </a:rPr>
+                <a:t>linear time </a:t>
+              </a:r>
+              <a:r>
+                <a:rPr lang="en-US" dirty="0">
+                  <a:solidFill>
+                    <a:srgbClr val="C00000"/>
+                  </a:solidFill>
+                  <a:latin typeface="Courier New" panose="02070309020205020404" pitchFamily="49" charset="0"/>
+                  <a:cs typeface="Courier New" panose="02070309020205020404" pitchFamily="49" charset="0"/>
+                </a:rPr>
+                <a:t>in</a:t>
+              </a:r>
+            </a:p>
+            <a:p>
+              <a:pPr algn="ctr"/>
+              <a:r>
+                <a:rPr lang="en-US" dirty="0">
+                  <a:solidFill>
+                    <a:srgbClr val="C00000"/>
+                  </a:solidFill>
+                </a:rPr>
+                <a:t>≈ 3∙10</a:t>
+              </a:r>
+              <a:r>
+                <a:rPr lang="en-US" baseline="30000" dirty="0">
+                  <a:solidFill>
+                    <a:srgbClr val="C00000"/>
+                  </a:solidFill>
+                </a:rPr>
+                <a:t>-9</a:t>
+              </a:r>
+              <a:r>
+                <a:rPr lang="en-US" dirty="0">
+                  <a:solidFill>
+                    <a:srgbClr val="C00000"/>
+                  </a:solidFill>
+                </a:rPr>
+                <a:t> ∙ n</a:t>
+              </a:r>
+              <a:endParaRPr lang="en-US" baseline="30000" dirty="0">
+                <a:solidFill>
+                  <a:srgbClr val="C00000"/>
+                </a:solidFill>
+              </a:endParaRPr>
+            </a:p>
+          </p:txBody>
+        </p:sp>
+        <p:cxnSp>
+          <p:nvCxnSpPr>
+            <p:cNvPr id="12" name="Straight Arrow Connector 11"/>
+            <p:cNvCxnSpPr/>
+            <p:nvPr/>
+          </p:nvCxnSpPr>
+          <p:spPr>
+            <a:xfrm>
+              <a:off x="5769980" y="2403874"/>
+              <a:ext cx="269175" cy="250164"/>
+            </a:xfrm>
+            <a:prstGeom prst="straightConnector1">
+              <a:avLst/>
+            </a:prstGeom>
+            <a:ln>
+              <a:solidFill>
+                <a:srgbClr val="C00000"/>
+              </a:solidFill>
+              <a:tailEnd type="triangle"/>
+            </a:ln>
+          </p:spPr>
+          <p:style>
+            <a:lnRef idx="1">
+              <a:schemeClr val="accent1"/>
+            </a:lnRef>
+            <a:fillRef idx="0">
+              <a:schemeClr val="accent1"/>
+            </a:fillRef>
+            <a:effectRef idx="0">
+              <a:schemeClr val="accent1"/>
+            </a:effectRef>
+            <a:fontRef idx="minor">
+              <a:schemeClr val="tx1"/>
+            </a:fontRef>
+          </p:style>
+        </p:cxnSp>
+      </p:grpSp>
+      <p:pic>
+        <p:nvPicPr>
+          <p:cNvPr id="37" name="Picture 36">
+            <a:extLst>
+              <a:ext uri="{FF2B5EF4-FFF2-40B4-BE49-F238E27FC236}">
+                <a16:creationId xmlns:a16="http://schemas.microsoft.com/office/drawing/2014/main" id="{18308946-9027-9C8F-1D78-27AF5CA9EF40}"/>
+              </a:ext>
+            </a:extLst>
+          </p:cNvPr>
+          <p:cNvPicPr>
+            <a:picLocks noChangeAspect="1"/>
+          </p:cNvPicPr>
+          <p:nvPr/>
+        </p:nvPicPr>
+        <p:blipFill>
+          <a:blip r:embed="rId3" cstate="print">
+            <a:extLst>
+              <a:ext uri="{28A0092B-C50C-407E-A947-70E740481C1C}">
+                <a14:useLocalDpi xmlns:a14="http://schemas.microsoft.com/office/drawing/2010/main" val="0"/>
+              </a:ext>
+            </a:extLst>
+          </a:blip>
+          <a:stretch>
+            <a:fillRect/>
+          </a:stretch>
+        </p:blipFill>
+        <p:spPr>
+          <a:xfrm>
+            <a:off x="6442835" y="6319657"/>
+            <a:ext cx="487666" cy="405904"/>
+          </a:xfrm>
+          <a:prstGeom prst="rect">
+            <a:avLst/>
+          </a:prstGeom>
+        </p:spPr>
+      </p:pic>
+      <p:sp>
+        <p:nvSpPr>
+          <p:cNvPr id="39" name="TextBox 38">
+            <a:extLst>
+              <a:ext uri="{FF2B5EF4-FFF2-40B4-BE49-F238E27FC236}">
+                <a16:creationId xmlns:a16="http://schemas.microsoft.com/office/drawing/2014/main" id="{ACD34319-F395-A2F2-21A5-0C7A1D6F137B}"/>
+              </a:ext>
+            </a:extLst>
+          </p:cNvPr>
+          <p:cNvSpPr txBox="1"/>
+          <p:nvPr/>
+        </p:nvSpPr>
+        <p:spPr>
+          <a:xfrm>
+            <a:off x="6960093" y="6291777"/>
+            <a:ext cx="5231907" cy="461665"/>
+          </a:xfrm>
+          <a:prstGeom prst="rect">
+            <a:avLst/>
+          </a:prstGeom>
+          <a:noFill/>
+        </p:spPr>
+        <p:txBody>
+          <a:bodyPr wrap="square">
+            <a:spAutoFit/>
+          </a:bodyPr>
+          <a:lstStyle/>
+          <a:p>
+            <a:r>
+              <a:rPr lang="da-DK" sz="2400" dirty="0" err="1"/>
+              <a:t>Avoid</a:t>
+            </a:r>
+            <a:r>
+              <a:rPr lang="da-DK" sz="2400" dirty="0"/>
+              <a:t> </a:t>
+            </a:r>
+            <a:r>
+              <a:rPr lang="da-DK" sz="2400" dirty="0" err="1"/>
+              <a:t>using</a:t>
+            </a:r>
+            <a:r>
+              <a:rPr lang="da-DK" sz="2400" dirty="0"/>
+              <a:t> </a:t>
+            </a:r>
+            <a:r>
+              <a:rPr lang="da-DK" sz="2400" b="1" dirty="0">
+                <a:solidFill>
+                  <a:srgbClr val="C00000"/>
+                </a:solidFill>
+                <a:latin typeface="Courier New" panose="02070309020205020404" pitchFamily="49" charset="0"/>
+                <a:cs typeface="Courier New" panose="02070309020205020404" pitchFamily="49" charset="0"/>
+              </a:rPr>
+              <a:t>in</a:t>
+            </a:r>
+            <a:r>
+              <a:rPr lang="da-DK" sz="2400" dirty="0"/>
+              <a:t> </a:t>
+            </a:r>
+            <a:r>
+              <a:rPr lang="da-DK" sz="2400" dirty="0" err="1"/>
+              <a:t>repeatedly</a:t>
+            </a:r>
+            <a:r>
+              <a:rPr lang="da-DK" sz="2400" dirty="0"/>
+              <a:t> on long lists</a:t>
+            </a:r>
+            <a:endParaRPr lang="en-US" sz="2400" dirty="0"/>
+          </a:p>
+        </p:txBody>
+      </p:sp>
+    </p:spTree>
+    <p:extLst>
+      <p:ext uri="{BB962C8B-B14F-4D97-AF65-F5344CB8AC3E}">
+        <p14:creationId xmlns:p14="http://schemas.microsoft.com/office/powerpoint/2010/main" val="637895129"/>
+      </p:ext>
+    </p:extLst>
+  </p:cSld>
+  <p:clrMapOvr>
+    <a:masterClrMapping/>
+  </p:clrMapOvr>
+</p:sld>
+</file>
+
+<file path=ppt/slides/slide17.xml><?xml version="1.0" encoding="utf-8"?>
+<p:sld xmlns:a="http://schemas.openxmlformats.org/drawingml/2006/main" xmlns:r="http://schemas.openxmlformats.org/officeDocument/2006/relationships" xmlns:p="http://schemas.openxmlformats.org/presentationml/2006/main">
+  <p:cSld>
+    <p:spTree>
+      <p:nvGrpSpPr>
+        <p:cNvPr id="1" name=""/>
+        <p:cNvGrpSpPr/>
+        <p:nvPr/>
+      </p:nvGrpSpPr>
+      <p:grpSpPr>
+        <a:xfrm>
+          <a:off x="0" y="0"/>
+          <a:ext cx="0" cy="0"/>
+          <a:chOff x="0" y="0"/>
+          <a:chExt cx="0" cy="0"/>
+        </a:xfrm>
+      </p:grpSpPr>
       <p:sp>
         <p:nvSpPr>
           <p:cNvPr id="2" name="Title 1"/>
@@ -13723,7 +15320,7 @@
 </p:sld>
 </file>
 
-<file path=ppt/slides/slide17.xml><?xml version="1.0" encoding="utf-8"?>
+<file path=ppt/slides/slide18.xml><?xml version="1.0" encoding="utf-8"?>
 <p:sld xmlns:a="http://schemas.openxmlformats.org/drawingml/2006/main" xmlns:r="http://schemas.openxmlformats.org/officeDocument/2006/relationships" xmlns:p="http://schemas.openxmlformats.org/presentationml/2006/main">
   <p:cSld>
     <p:spTree>
@@ -14743,7 +16340,7 @@
 </p:sld>
 </file>
 
-<file path=ppt/slides/slide18.xml><?xml version="1.0" encoding="utf-8"?>
+<file path=ppt/slides/slide19.xml><?xml version="1.0" encoding="utf-8"?>
 <p:sld xmlns:a="http://schemas.openxmlformats.org/drawingml/2006/main" xmlns:r="http://schemas.openxmlformats.org/officeDocument/2006/relationships" xmlns:p="http://schemas.openxmlformats.org/presentationml/2006/main">
   <p:cSld>
     <p:spTree>
@@ -16098,1387 +17695,6 @@
 </p:sld>
 </file>
 
-<file path=ppt/slides/slide19.xml><?xml version="1.0" encoding="utf-8"?>
-<p:sld xmlns:a="http://schemas.openxmlformats.org/drawingml/2006/main" xmlns:r="http://schemas.openxmlformats.org/officeDocument/2006/relationships" xmlns:p="http://schemas.openxmlformats.org/presentationml/2006/main">
-  <p:cSld>
-    <p:spTree>
-      <p:nvGrpSpPr>
-        <p:cNvPr id="1" name=""/>
-        <p:cNvGrpSpPr/>
-        <p:nvPr/>
-      </p:nvGrpSpPr>
-      <p:grpSpPr>
-        <a:xfrm>
-          <a:off x="0" y="0"/>
-          <a:ext cx="0" cy="0"/>
-          <a:chOff x="0" y="0"/>
-          <a:chExt cx="0" cy="0"/>
-        </a:xfrm>
-      </p:grpSpPr>
-      <p:sp>
-        <p:nvSpPr>
-          <p:cNvPr id="2" name="Title 1"/>
-          <p:cNvSpPr>
-            <a:spLocks noGrp="1"/>
-          </p:cNvSpPr>
-          <p:nvPr>
-            <p:ph type="title"/>
-          </p:nvPr>
-        </p:nvSpPr>
-        <p:spPr>
-          <a:xfrm>
-            <a:off x="838200" y="221432"/>
-            <a:ext cx="10644051" cy="1325563"/>
-          </a:xfrm>
-        </p:spPr>
-        <p:txBody>
-          <a:bodyPr/>
-          <a:lstStyle/>
-          <a:p>
-            <a:r>
-              <a:rPr lang="da-DK" dirty="0" err="1">
-                <a:latin typeface="Courier New" panose="02070309020205020404" pitchFamily="49" charset="0"/>
-                <a:cs typeface="Courier New" panose="02070309020205020404" pitchFamily="49" charset="0"/>
-              </a:rPr>
-              <a:t>Counter</a:t>
-            </a:r>
-            <a:r>
-              <a:rPr lang="da-DK" dirty="0">
-                <a:latin typeface="+mn-lt"/>
-                <a:cs typeface="Courier New" panose="02070309020205020404" pitchFamily="49" charset="0"/>
-              </a:rPr>
-              <a:t> – </a:t>
-            </a:r>
-            <a:r>
-              <a:rPr lang="da-DK" dirty="0" err="1">
-                <a:latin typeface="+mn-lt"/>
-                <a:cs typeface="Courier New" panose="02070309020205020404" pitchFamily="49" charset="0"/>
-              </a:rPr>
-              <a:t>dictionaries</a:t>
-            </a:r>
-            <a:r>
-              <a:rPr lang="da-DK" dirty="0">
-                <a:latin typeface="+mn-lt"/>
-                <a:cs typeface="Courier New" panose="02070309020205020404" pitchFamily="49" charset="0"/>
-              </a:rPr>
-              <a:t> for </a:t>
-            </a:r>
-            <a:r>
-              <a:rPr lang="da-DK" dirty="0" err="1">
-                <a:latin typeface="+mn-lt"/>
-                <a:cs typeface="Courier New" panose="02070309020205020404" pitchFamily="49" charset="0"/>
-              </a:rPr>
-              <a:t>counting</a:t>
-            </a:r>
-            <a:endParaRPr lang="en-US" dirty="0">
-              <a:latin typeface="+mn-lt"/>
-              <a:cs typeface="Courier New" panose="02070309020205020404" pitchFamily="49" charset="0"/>
-            </a:endParaRPr>
-          </a:p>
-        </p:txBody>
-      </p:sp>
-      <p:graphicFrame>
-        <p:nvGraphicFramePr>
-          <p:cNvPr id="5" name="Table 4"/>
-          <p:cNvGraphicFramePr>
-            <a:graphicFrameLocks noGrp="1"/>
-          </p:cNvGraphicFramePr>
-          <p:nvPr>
-            <p:extLst>
-              <p:ext uri="{D42A27DB-BD31-4B8C-83A1-F6EECF244321}">
-                <p14:modId xmlns:p14="http://schemas.microsoft.com/office/powerpoint/2010/main" val="4073213014"/>
-              </p:ext>
-            </p:extLst>
-          </p:nvPr>
-        </p:nvGraphicFramePr>
-        <p:xfrm>
-          <a:off x="237308" y="1546995"/>
-          <a:ext cx="11717383" cy="4922520"/>
-        </p:xfrm>
-        <a:graphic>
-          <a:graphicData uri="http://schemas.openxmlformats.org/drawingml/2006/table">
-            <a:tbl>
-              <a:tblPr firstRow="1" bandRow="1">
-                <a:tableStyleId>{5C22544A-7EE6-4342-B048-85BDC9FD1C3A}</a:tableStyleId>
-              </a:tblPr>
-              <a:tblGrid>
-                <a:gridCol w="11717383">
-                  <a:extLst>
-                    <a:ext uri="{9D8B030D-6E8A-4147-A177-3AD203B41FA5}">
-                      <a16:colId xmlns:a16="http://schemas.microsoft.com/office/drawing/2014/main" val="1873682825"/>
-                    </a:ext>
-                  </a:extLst>
-                </a:gridCol>
-              </a:tblGrid>
-              <a:tr h="213807">
-                <a:tc>
-                  <a:txBody>
-                    <a:bodyPr/>
-                    <a:lstStyle/>
-                    <a:p>
-                      <a:r>
-                        <a:rPr lang="da-DK" sz="1800" b="1" dirty="0" err="1">
-                          <a:latin typeface="Courier New" panose="02070309020205020404" pitchFamily="49" charset="0"/>
-                          <a:cs typeface="Courier New" panose="02070309020205020404" pitchFamily="49" charset="0"/>
-                        </a:rPr>
-                        <a:t>Python</a:t>
-                      </a:r>
-                      <a:r>
-                        <a:rPr lang="da-DK" sz="1800" b="1" dirty="0">
-                          <a:latin typeface="Courier New" panose="02070309020205020404" pitchFamily="49" charset="0"/>
-                          <a:cs typeface="Courier New" panose="02070309020205020404" pitchFamily="49" charset="0"/>
-                        </a:rPr>
-                        <a:t> </a:t>
-                      </a:r>
-                      <a:r>
-                        <a:rPr lang="da-DK" sz="1800" b="1" dirty="0" err="1">
-                          <a:latin typeface="Courier New" panose="02070309020205020404" pitchFamily="49" charset="0"/>
-                          <a:cs typeface="Courier New" panose="02070309020205020404" pitchFamily="49" charset="0"/>
-                        </a:rPr>
-                        <a:t>shell</a:t>
-                      </a:r>
-                      <a:endParaRPr lang="da-DK" sz="1800" b="1" dirty="0">
-                        <a:latin typeface="Courier New" panose="02070309020205020404" pitchFamily="49" charset="0"/>
-                        <a:cs typeface="Courier New" panose="02070309020205020404" pitchFamily="49" charset="0"/>
-                      </a:endParaRPr>
-                    </a:p>
-                  </a:txBody>
-                  <a:tcPr anchor="ctr">
-                    <a:lnL w="6350" cap="flat" cmpd="sng" algn="ctr">
-                      <a:solidFill>
-                        <a:schemeClr val="tx1"/>
-                      </a:solidFill>
-                      <a:prstDash val="solid"/>
-                      <a:round/>
-                      <a:headEnd type="none" w="med" len="med"/>
-                      <a:tailEnd type="none" w="med" len="med"/>
-                    </a:lnL>
-                    <a:lnR w="6350" cap="flat" cmpd="sng" algn="ctr">
-                      <a:solidFill>
-                        <a:schemeClr val="tx1"/>
-                      </a:solidFill>
-                      <a:prstDash val="solid"/>
-                      <a:round/>
-                      <a:headEnd type="none" w="med" len="med"/>
-                      <a:tailEnd type="none" w="med" len="med"/>
-                    </a:lnR>
-                    <a:lnT w="6350" cap="flat" cmpd="sng" algn="ctr">
-                      <a:solidFill>
-                        <a:schemeClr val="tx1"/>
-                      </a:solidFill>
-                      <a:prstDash val="solid"/>
-                      <a:round/>
-                      <a:headEnd type="none" w="med" len="med"/>
-                      <a:tailEnd type="none" w="med" len="med"/>
-                    </a:lnT>
-                    <a:lnB w="6350" cap="flat" cmpd="sng" algn="ctr">
-                      <a:solidFill>
-                        <a:schemeClr val="tx1"/>
-                      </a:solidFill>
-                      <a:prstDash val="solid"/>
-                      <a:round/>
-                      <a:headEnd type="none" w="med" len="med"/>
-                      <a:tailEnd type="none" w="med" len="med"/>
-                    </a:lnB>
-                    <a:lnTlToBr w="12700" cmpd="sng">
-                      <a:noFill/>
-                      <a:prstDash val="solid"/>
-                    </a:lnTlToBr>
-                    <a:lnBlToTr w="12700" cmpd="sng">
-                      <a:noFill/>
-                      <a:prstDash val="solid"/>
-                    </a:lnBlToTr>
-                    <a:solidFill>
-                      <a:srgbClr val="C00000"/>
-                    </a:solidFill>
-                  </a:tcPr>
-                </a:tc>
-                <a:extLst>
-                  <a:ext uri="{0D108BD9-81ED-4DB2-BD59-A6C34878D82A}">
-                    <a16:rowId xmlns:a16="http://schemas.microsoft.com/office/drawing/2014/main" val="3330819881"/>
-                  </a:ext>
-                </a:extLst>
-              </a:tr>
-              <a:tr h="2364992">
-                <a:tc>
-                  <a:txBody>
-                    <a:bodyPr/>
-                    <a:lstStyle/>
-                    <a:p>
-                      <a:pPr marL="266700" indent="-266700">
-                        <a:buClr>
-                          <a:srgbClr val="C00000"/>
-                        </a:buClr>
-                        <a:buSzPct val="100000"/>
-                        <a:buFont typeface="Courier New" panose="02070309020205020404" pitchFamily="49" charset="0"/>
-                        <a:buChar char="&gt;"/>
-                      </a:pPr>
-                      <a:r>
-                        <a:rPr lang="pt-BR" sz="1800" b="1" baseline="0" dirty="0">
-                          <a:latin typeface="Courier New" panose="02070309020205020404" pitchFamily="49" charset="0"/>
-                          <a:cs typeface="Courier New" panose="02070309020205020404" pitchFamily="49" charset="0"/>
-                        </a:rPr>
-                        <a:t>from </a:t>
-                      </a:r>
-                      <a:r>
-                        <a:rPr lang="pt-BR" sz="1800" b="1" baseline="0" dirty="0">
-                          <a:solidFill>
-                            <a:srgbClr val="C00000"/>
-                          </a:solidFill>
-                          <a:latin typeface="Courier New" panose="02070309020205020404" pitchFamily="49" charset="0"/>
-                          <a:cs typeface="Courier New" panose="02070309020205020404" pitchFamily="49" charset="0"/>
-                        </a:rPr>
-                        <a:t>collections</a:t>
-                      </a:r>
-                      <a:r>
-                        <a:rPr lang="pt-BR" sz="1800" b="1" baseline="0" dirty="0">
-                          <a:latin typeface="Courier New" panose="02070309020205020404" pitchFamily="49" charset="0"/>
-                          <a:cs typeface="Courier New" panose="02070309020205020404" pitchFamily="49" charset="0"/>
-                        </a:rPr>
-                        <a:t> import </a:t>
-                      </a:r>
-                      <a:r>
-                        <a:rPr lang="pt-BR" sz="1800" b="1" baseline="0" dirty="0">
-                          <a:solidFill>
-                            <a:srgbClr val="C00000"/>
-                          </a:solidFill>
-                          <a:latin typeface="Courier New" panose="02070309020205020404" pitchFamily="49" charset="0"/>
-                          <a:cs typeface="Courier New" panose="02070309020205020404" pitchFamily="49" charset="0"/>
-                        </a:rPr>
-                        <a:t>Counter</a:t>
-                      </a:r>
-                    </a:p>
-                    <a:p>
-                      <a:pPr marL="266700" indent="-266700">
-                        <a:buClr>
-                          <a:srgbClr val="C00000"/>
-                        </a:buClr>
-                        <a:buSzPct val="100000"/>
-                        <a:buFont typeface="Courier New" panose="02070309020205020404" pitchFamily="49" charset="0"/>
-                        <a:buChar char="&gt;"/>
-                      </a:pPr>
-                      <a:r>
-                        <a:rPr lang="pt-BR" sz="1800" b="1" baseline="0" dirty="0">
-                          <a:solidFill>
-                            <a:schemeClr val="tx1"/>
-                          </a:solidFill>
-                          <a:latin typeface="Courier New" panose="02070309020205020404" pitchFamily="49" charset="0"/>
-                          <a:cs typeface="Courier New" panose="02070309020205020404" pitchFamily="49" charset="0"/>
-                        </a:rPr>
-                        <a:t>fq = </a:t>
-                      </a:r>
-                      <a:r>
-                        <a:rPr lang="pt-BR" sz="1800" b="1" baseline="0" dirty="0">
-                          <a:solidFill>
-                            <a:srgbClr val="C00000"/>
-                          </a:solidFill>
-                          <a:latin typeface="Courier New" panose="02070309020205020404" pitchFamily="49" charset="0"/>
-                          <a:cs typeface="Courier New" panose="02070309020205020404" pitchFamily="49" charset="0"/>
-                        </a:rPr>
-                        <a:t>Counter</a:t>
-                      </a:r>
-                      <a:r>
-                        <a:rPr lang="pt-BR" sz="1800" b="1" baseline="0" dirty="0">
-                          <a:latin typeface="Courier New" panose="02070309020205020404" pitchFamily="49" charset="0"/>
-                          <a:cs typeface="Courier New" panose="02070309020205020404" pitchFamily="49" charset="0"/>
-                        </a:rPr>
-                        <a:t>('abracadabra')  </a:t>
-                      </a:r>
-                      <a:r>
-                        <a:rPr lang="pt-BR" sz="1800" b="1" baseline="0" dirty="0">
-                          <a:solidFill>
-                            <a:schemeClr val="bg1">
-                              <a:lumMod val="50000"/>
-                            </a:schemeClr>
-                          </a:solidFill>
-                          <a:latin typeface="Courier New" panose="02070309020205020404" pitchFamily="49" charset="0"/>
-                          <a:cs typeface="Courier New" panose="02070309020205020404" pitchFamily="49" charset="0"/>
-                        </a:rPr>
-                        <a:t># create new counter from a sequence</a:t>
-                      </a:r>
-                    </a:p>
-                    <a:p>
-                      <a:pPr marL="266700" indent="-266700">
-                        <a:buClr>
-                          <a:srgbClr val="C00000"/>
-                        </a:buClr>
-                        <a:buSzPct val="100000"/>
-                        <a:buFont typeface="Courier New" panose="02070309020205020404" pitchFamily="49" charset="0"/>
-                        <a:buChar char="&gt;"/>
-                      </a:pPr>
-                      <a:r>
-                        <a:rPr lang="pt-BR" sz="1800" b="1" baseline="0" dirty="0">
-                          <a:solidFill>
-                            <a:schemeClr val="tx1"/>
-                          </a:solidFill>
-                          <a:latin typeface="Courier New" panose="02070309020205020404" pitchFamily="49" charset="0"/>
-                          <a:cs typeface="Courier New" panose="02070309020205020404" pitchFamily="49" charset="0"/>
-                        </a:rPr>
-                        <a:t>fq</a:t>
-                      </a:r>
-                    </a:p>
-                    <a:p>
-                      <a:pPr marL="266700" marR="0" lvl="0" indent="-266700" algn="l" defTabSz="914400" rtl="0" eaLnBrk="1" fontAlgn="auto" latinLnBrk="0" hangingPunct="1">
-                        <a:lnSpc>
-                          <a:spcPct val="100000"/>
-                        </a:lnSpc>
-                        <a:spcBef>
-                          <a:spcPts val="0"/>
-                        </a:spcBef>
-                        <a:spcAft>
-                          <a:spcPts val="0"/>
-                        </a:spcAft>
-                        <a:buClr>
-                          <a:schemeClr val="accent1">
-                            <a:lumMod val="50000"/>
-                          </a:schemeClr>
-                        </a:buClr>
-                        <a:buSzPct val="120000"/>
-                        <a:buFont typeface="Courier New" panose="02070309020205020404" pitchFamily="49" charset="0"/>
-                        <a:buChar char="|"/>
-                        <a:tabLst/>
-                        <a:defRPr/>
-                      </a:pPr>
-                      <a:r>
-                        <a:rPr lang="pt-BR" sz="1800" b="1" baseline="0" dirty="0">
-                          <a:solidFill>
-                            <a:srgbClr val="C00000"/>
-                          </a:solidFill>
-                          <a:latin typeface="Courier New" panose="02070309020205020404" pitchFamily="49" charset="0"/>
-                          <a:cs typeface="Courier New" panose="02070309020205020404" pitchFamily="49" charset="0"/>
-                        </a:rPr>
-                        <a:t>Counter</a:t>
-                      </a:r>
-                      <a:r>
-                        <a:rPr lang="pt-BR" sz="1800" b="1" baseline="0" dirty="0">
-                          <a:latin typeface="Courier New" panose="02070309020205020404" pitchFamily="49" charset="0"/>
-                          <a:cs typeface="Courier New" panose="02070309020205020404" pitchFamily="49" charset="0"/>
-                        </a:rPr>
-                        <a:t>({'a': 5, 'b': 2, 'r': 2, 'c': 1, 'd': 1})</a:t>
-                      </a:r>
-                      <a:r>
-                        <a:rPr lang="pt-BR" sz="1800" b="1" baseline="0" dirty="0">
-                          <a:solidFill>
-                            <a:schemeClr val="bg1">
-                              <a:lumMod val="50000"/>
-                            </a:schemeClr>
-                          </a:solidFill>
-                          <a:latin typeface="Courier New" panose="02070309020205020404" pitchFamily="49" charset="0"/>
-                          <a:cs typeface="Courier New" panose="02070309020205020404" pitchFamily="49" charset="0"/>
-                        </a:rPr>
-                        <a:t>  # frequencies of the letters</a:t>
-                      </a:r>
-                    </a:p>
-                    <a:p>
-                      <a:pPr marL="266700" indent="-266700">
-                        <a:buClr>
-                          <a:srgbClr val="C00000"/>
-                        </a:buClr>
-                        <a:buSzPct val="100000"/>
-                        <a:buFont typeface="Courier New" panose="02070309020205020404" pitchFamily="49" charset="0"/>
-                        <a:buChar char="&gt;"/>
-                      </a:pPr>
-                      <a:r>
-                        <a:rPr lang="en-US" sz="1800" b="1" baseline="0" dirty="0" err="1">
-                          <a:latin typeface="Courier New" panose="02070309020205020404" pitchFamily="49" charset="0"/>
-                          <a:cs typeface="Courier New" panose="02070309020205020404" pitchFamily="49" charset="0"/>
-                        </a:rPr>
-                        <a:t>fq</a:t>
-                      </a:r>
-                      <a:r>
-                        <a:rPr lang="en-US" sz="1800" b="1" baseline="0" dirty="0">
-                          <a:latin typeface="Courier New" panose="02070309020205020404" pitchFamily="49" charset="0"/>
-                          <a:cs typeface="Courier New" panose="02070309020205020404" pitchFamily="49" charset="0"/>
-                        </a:rPr>
-                        <a:t>['a']</a:t>
-                      </a:r>
-                      <a:endParaRPr lang="pt-BR" sz="1800" b="1" baseline="0" dirty="0">
-                        <a:solidFill>
-                          <a:schemeClr val="bg1">
-                            <a:lumMod val="50000"/>
-                          </a:schemeClr>
-                        </a:solidFill>
-                        <a:latin typeface="Courier New" panose="02070309020205020404" pitchFamily="49" charset="0"/>
-                        <a:cs typeface="Courier New" panose="02070309020205020404" pitchFamily="49" charset="0"/>
-                      </a:endParaRPr>
-                    </a:p>
-                    <a:p>
-                      <a:pPr marL="266700" marR="0" lvl="0" indent="-266700" algn="l" defTabSz="914400" rtl="0" eaLnBrk="1" fontAlgn="auto" latinLnBrk="0" hangingPunct="1">
-                        <a:lnSpc>
-                          <a:spcPct val="100000"/>
-                        </a:lnSpc>
-                        <a:spcBef>
-                          <a:spcPts val="0"/>
-                        </a:spcBef>
-                        <a:spcAft>
-                          <a:spcPts val="0"/>
-                        </a:spcAft>
-                        <a:buClr>
-                          <a:schemeClr val="accent1">
-                            <a:lumMod val="50000"/>
-                          </a:schemeClr>
-                        </a:buClr>
-                        <a:buSzPct val="120000"/>
-                        <a:buFont typeface="Courier New" panose="02070309020205020404" pitchFamily="49" charset="0"/>
-                        <a:buChar char="|"/>
-                        <a:tabLst/>
-                        <a:defRPr/>
-                      </a:pPr>
-                      <a:r>
-                        <a:rPr lang="pt-BR" sz="1800" b="1" baseline="0" dirty="0">
-                          <a:latin typeface="Courier New" panose="02070309020205020404" pitchFamily="49" charset="0"/>
-                          <a:cs typeface="Courier New" panose="02070309020205020404" pitchFamily="49" charset="0"/>
-                        </a:rPr>
-                        <a:t>5</a:t>
-                      </a:r>
-                    </a:p>
-                    <a:p>
-                      <a:pPr marL="266700" indent="-266700">
-                        <a:buClr>
-                          <a:srgbClr val="C00000"/>
-                        </a:buClr>
-                        <a:buSzPct val="100000"/>
-                        <a:buFont typeface="Courier New" panose="02070309020205020404" pitchFamily="49" charset="0"/>
-                        <a:buChar char="&gt;"/>
-                      </a:pPr>
-                      <a:r>
-                        <a:rPr lang="en-US" sz="1800" b="1" baseline="0" dirty="0" err="1">
-                          <a:latin typeface="Courier New" panose="02070309020205020404" pitchFamily="49" charset="0"/>
-                          <a:cs typeface="Courier New" panose="02070309020205020404" pitchFamily="49" charset="0"/>
-                        </a:rPr>
-                        <a:t>fq.most_common</a:t>
-                      </a:r>
-                      <a:r>
-                        <a:rPr lang="en-US" sz="1800" b="1" baseline="0" dirty="0">
-                          <a:latin typeface="Courier New" panose="02070309020205020404" pitchFamily="49" charset="0"/>
-                          <a:cs typeface="Courier New" panose="02070309020205020404" pitchFamily="49" charset="0"/>
-                        </a:rPr>
-                        <a:t>(3)</a:t>
-                      </a:r>
-                    </a:p>
-                    <a:p>
-                      <a:pPr marL="266700" marR="0" lvl="0" indent="-266700" algn="l" defTabSz="914400" rtl="0" eaLnBrk="1" fontAlgn="auto" latinLnBrk="0" hangingPunct="1">
-                        <a:lnSpc>
-                          <a:spcPct val="100000"/>
-                        </a:lnSpc>
-                        <a:spcBef>
-                          <a:spcPts val="0"/>
-                        </a:spcBef>
-                        <a:spcAft>
-                          <a:spcPts val="0"/>
-                        </a:spcAft>
-                        <a:buClr>
-                          <a:schemeClr val="accent1">
-                            <a:lumMod val="50000"/>
-                          </a:schemeClr>
-                        </a:buClr>
-                        <a:buSzPct val="120000"/>
-                        <a:buFont typeface="Courier New" panose="02070309020205020404" pitchFamily="49" charset="0"/>
-                        <a:buChar char="|"/>
-                        <a:tabLst/>
-                        <a:defRPr/>
-                      </a:pPr>
-                      <a:r>
-                        <a:rPr lang="en-US" sz="1800" b="1" baseline="0" dirty="0">
-                          <a:latin typeface="Courier New" panose="02070309020205020404" pitchFamily="49" charset="0"/>
-                          <a:cs typeface="Courier New" panose="02070309020205020404" pitchFamily="49" charset="0"/>
-                        </a:rPr>
-                        <a:t>[('a', 5), ('b', 2), ('r', 2)]</a:t>
-                      </a:r>
-                      <a:endParaRPr lang="pt-BR" sz="1800" b="1" baseline="0" dirty="0">
-                        <a:latin typeface="Courier New" panose="02070309020205020404" pitchFamily="49" charset="0"/>
-                        <a:cs typeface="Courier New" panose="02070309020205020404" pitchFamily="49" charset="0"/>
-                      </a:endParaRPr>
-                    </a:p>
-                    <a:p>
-                      <a:pPr marL="266700" indent="-266700">
-                        <a:buClr>
-                          <a:srgbClr val="C00000"/>
-                        </a:buClr>
-                        <a:buSzPct val="100000"/>
-                        <a:buFont typeface="Courier New" panose="02070309020205020404" pitchFamily="49" charset="0"/>
-                        <a:buChar char="&gt;"/>
-                      </a:pPr>
-                      <a:r>
-                        <a:rPr lang="en-US" sz="1800" b="1" baseline="0" dirty="0">
-                          <a:latin typeface="Courier New" panose="02070309020205020404" pitchFamily="49" charset="0"/>
-                          <a:cs typeface="Courier New" panose="02070309020205020404" pitchFamily="49" charset="0"/>
-                        </a:rPr>
-                        <a:t>f</a:t>
-                      </a:r>
-                      <a:r>
-                        <a:rPr lang="da-DK" sz="1800" b="1" baseline="0" dirty="0">
-                          <a:latin typeface="Courier New" panose="02070309020205020404" pitchFamily="49" charset="0"/>
-                          <a:cs typeface="Courier New" panose="02070309020205020404" pitchFamily="49" charset="0"/>
-                        </a:rPr>
-                        <a:t>q['x'] += 5  </a:t>
-                      </a:r>
-                      <a:r>
-                        <a:rPr lang="da-DK" sz="1800" b="1" baseline="0" dirty="0">
-                          <a:solidFill>
-                            <a:schemeClr val="bg1">
-                              <a:lumMod val="50000"/>
-                            </a:schemeClr>
-                          </a:solidFill>
-                          <a:latin typeface="Courier New" panose="02070309020205020404" pitchFamily="49" charset="0"/>
-                          <a:cs typeface="Courier New" panose="02070309020205020404" pitchFamily="49" charset="0"/>
-                        </a:rPr>
-                        <a:t># </a:t>
-                      </a:r>
-                      <a:r>
-                        <a:rPr lang="da-DK" sz="1800" b="1" baseline="0" dirty="0" err="1">
-                          <a:solidFill>
-                            <a:schemeClr val="bg1">
-                              <a:lumMod val="50000"/>
-                            </a:schemeClr>
-                          </a:solidFill>
-                          <a:latin typeface="Courier New" panose="02070309020205020404" pitchFamily="49" charset="0"/>
-                          <a:cs typeface="Courier New" panose="02070309020205020404" pitchFamily="49" charset="0"/>
-                        </a:rPr>
-                        <a:t>increase</a:t>
-                      </a:r>
-                      <a:r>
-                        <a:rPr lang="da-DK" sz="1800" b="1" baseline="0" dirty="0">
-                          <a:solidFill>
-                            <a:schemeClr val="bg1">
-                              <a:lumMod val="50000"/>
-                            </a:schemeClr>
-                          </a:solidFill>
-                          <a:latin typeface="Courier New" panose="02070309020205020404" pitchFamily="49" charset="0"/>
-                          <a:cs typeface="Courier New" panose="02070309020205020404" pitchFamily="49" charset="0"/>
-                        </a:rPr>
-                        <a:t> </a:t>
-                      </a:r>
-                      <a:r>
-                        <a:rPr lang="da-DK" sz="1800" b="1" baseline="0" dirty="0" err="1">
-                          <a:solidFill>
-                            <a:schemeClr val="bg1">
-                              <a:lumMod val="50000"/>
-                            </a:schemeClr>
-                          </a:solidFill>
-                          <a:latin typeface="Courier New" panose="02070309020205020404" pitchFamily="49" charset="0"/>
-                          <a:cs typeface="Courier New" panose="02070309020205020404" pitchFamily="49" charset="0"/>
-                        </a:rPr>
-                        <a:t>count</a:t>
-                      </a:r>
-                      <a:r>
-                        <a:rPr lang="da-DK" sz="1800" b="1" baseline="0" dirty="0">
-                          <a:solidFill>
-                            <a:schemeClr val="bg1">
-                              <a:lumMod val="50000"/>
-                            </a:schemeClr>
-                          </a:solidFill>
-                          <a:latin typeface="Courier New" panose="02070309020205020404" pitchFamily="49" charset="0"/>
-                          <a:cs typeface="Courier New" panose="02070309020205020404" pitchFamily="49" charset="0"/>
-                        </a:rPr>
-                        <a:t> of 'x', </a:t>
-                      </a:r>
-                      <a:r>
-                        <a:rPr lang="da-DK" sz="1800" b="1" baseline="0" dirty="0" err="1">
-                          <a:solidFill>
-                            <a:schemeClr val="bg1">
-                              <a:lumMod val="50000"/>
-                            </a:schemeClr>
-                          </a:solidFill>
-                          <a:latin typeface="Courier New" panose="02070309020205020404" pitchFamily="49" charset="0"/>
-                          <a:cs typeface="Courier New" panose="02070309020205020404" pitchFamily="49" charset="0"/>
-                        </a:rPr>
-                        <a:t>also</a:t>
-                      </a:r>
-                      <a:r>
-                        <a:rPr lang="da-DK" sz="1800" b="1" baseline="0" dirty="0">
-                          <a:solidFill>
-                            <a:schemeClr val="bg1">
-                              <a:lumMod val="50000"/>
-                            </a:schemeClr>
-                          </a:solidFill>
-                          <a:latin typeface="Courier New" panose="02070309020205020404" pitchFamily="49" charset="0"/>
-                          <a:cs typeface="Courier New" panose="02070309020205020404" pitchFamily="49" charset="0"/>
-                        </a:rPr>
-                        <a:t> valid if 'x' not in </a:t>
-                      </a:r>
-                      <a:r>
-                        <a:rPr lang="da-DK" sz="1800" b="1" baseline="0" dirty="0" err="1">
-                          <a:solidFill>
-                            <a:schemeClr val="bg1">
-                              <a:lumMod val="50000"/>
-                            </a:schemeClr>
-                          </a:solidFill>
-                          <a:latin typeface="Courier New" panose="02070309020205020404" pitchFamily="49" charset="0"/>
-                          <a:cs typeface="Courier New" panose="02070309020205020404" pitchFamily="49" charset="0"/>
-                        </a:rPr>
-                        <a:t>Counter</a:t>
-                      </a:r>
-                      <a:r>
-                        <a:rPr lang="da-DK" sz="1800" b="1" baseline="0" dirty="0">
-                          <a:solidFill>
-                            <a:schemeClr val="bg1">
-                              <a:lumMod val="50000"/>
-                            </a:schemeClr>
-                          </a:solidFill>
-                          <a:latin typeface="Courier New" panose="02070309020205020404" pitchFamily="49" charset="0"/>
-                          <a:cs typeface="Courier New" panose="02070309020205020404" pitchFamily="49" charset="0"/>
-                        </a:rPr>
-                        <a:t> </a:t>
-                      </a:r>
-                      <a:r>
-                        <a:rPr lang="da-DK" sz="1800" b="1" baseline="0" dirty="0" err="1">
-                          <a:solidFill>
-                            <a:schemeClr val="bg1">
-                              <a:lumMod val="50000"/>
-                            </a:schemeClr>
-                          </a:solidFill>
-                          <a:latin typeface="Courier New" panose="02070309020205020404" pitchFamily="49" charset="0"/>
-                          <a:cs typeface="Courier New" panose="02070309020205020404" pitchFamily="49" charset="0"/>
-                        </a:rPr>
-                        <a:t>yet</a:t>
-                      </a:r>
-                      <a:endParaRPr lang="da-DK" sz="1800" b="1" baseline="0" dirty="0">
-                        <a:solidFill>
-                          <a:schemeClr val="tx1"/>
-                        </a:solidFill>
-                        <a:latin typeface="Courier New" panose="02070309020205020404" pitchFamily="49" charset="0"/>
-                        <a:cs typeface="Courier New" panose="02070309020205020404" pitchFamily="49" charset="0"/>
-                      </a:endParaRPr>
-                    </a:p>
-                    <a:p>
-                      <a:pPr marL="266700" indent="-266700">
-                        <a:buClr>
-                          <a:srgbClr val="C00000"/>
-                        </a:buClr>
-                        <a:buSzPct val="100000"/>
-                        <a:buFont typeface="Courier New" panose="02070309020205020404" pitchFamily="49" charset="0"/>
-                        <a:buChar char="&gt;"/>
-                      </a:pPr>
-                      <a:r>
-                        <a:rPr lang="pt-BR" sz="1800" b="1" baseline="0" dirty="0">
-                          <a:solidFill>
-                            <a:srgbClr val="C00000"/>
-                          </a:solidFill>
-                          <a:latin typeface="Courier New" panose="02070309020205020404" pitchFamily="49" charset="0"/>
-                          <a:cs typeface="Courier New" panose="02070309020205020404" pitchFamily="49" charset="0"/>
-                        </a:rPr>
-                        <a:t>Counter</a:t>
-                      </a:r>
-                      <a:r>
-                        <a:rPr lang="pt-BR" sz="1800" b="1" baseline="0" dirty="0">
-                          <a:solidFill>
-                            <a:schemeClr val="tx1"/>
-                          </a:solidFill>
-                          <a:latin typeface="Courier New" panose="02070309020205020404" pitchFamily="49" charset="0"/>
-                          <a:cs typeface="Courier New" panose="02070309020205020404" pitchFamily="49" charset="0"/>
-                        </a:rPr>
-                        <a:t>('aaabbbcc') </a:t>
-                      </a:r>
-                      <a:r>
-                        <a:rPr lang="pt-BR" sz="1800" b="1" baseline="0" dirty="0">
-                          <a:solidFill>
-                            <a:srgbClr val="C00000"/>
-                          </a:solidFill>
-                          <a:latin typeface="Courier New" panose="02070309020205020404" pitchFamily="49" charset="0"/>
-                          <a:cs typeface="Courier New" panose="02070309020205020404" pitchFamily="49" charset="0"/>
-                        </a:rPr>
-                        <a:t>-</a:t>
-                      </a:r>
-                      <a:r>
-                        <a:rPr lang="pt-BR" sz="1800" b="1" baseline="0" dirty="0">
-                          <a:solidFill>
-                            <a:schemeClr val="tx1"/>
-                          </a:solidFill>
-                          <a:latin typeface="Courier New" panose="02070309020205020404" pitchFamily="49" charset="0"/>
-                          <a:cs typeface="Courier New" panose="02070309020205020404" pitchFamily="49" charset="0"/>
-                        </a:rPr>
-                        <a:t> </a:t>
-                      </a:r>
-                      <a:r>
-                        <a:rPr lang="pt-BR" sz="1800" b="1" baseline="0" dirty="0">
-                          <a:solidFill>
-                            <a:srgbClr val="C00000"/>
-                          </a:solidFill>
-                          <a:latin typeface="Courier New" panose="02070309020205020404" pitchFamily="49" charset="0"/>
-                          <a:cs typeface="Courier New" panose="02070309020205020404" pitchFamily="49" charset="0"/>
-                        </a:rPr>
-                        <a:t>Counter</a:t>
-                      </a:r>
-                      <a:r>
-                        <a:rPr lang="pt-BR" sz="1800" b="1" baseline="0" dirty="0">
-                          <a:solidFill>
-                            <a:schemeClr val="tx1"/>
-                          </a:solidFill>
-                          <a:latin typeface="Courier New" panose="02070309020205020404" pitchFamily="49" charset="0"/>
-                          <a:cs typeface="Courier New" panose="02070309020205020404" pitchFamily="49" charset="0"/>
-                        </a:rPr>
-                        <a:t>('aabdd')  </a:t>
-                      </a:r>
-                      <a:r>
-                        <a:rPr lang="pt-BR" sz="1800" b="1" baseline="0" dirty="0">
-                          <a:solidFill>
-                            <a:schemeClr val="bg1">
-                              <a:lumMod val="50000"/>
-                            </a:schemeClr>
-                          </a:solidFill>
-                          <a:latin typeface="Courier New" panose="02070309020205020404" pitchFamily="49" charset="0"/>
-                          <a:cs typeface="Courier New" panose="02070309020205020404" pitchFamily="49" charset="0"/>
-                        </a:rPr>
-                        <a:t># counters can be subtracted</a:t>
-                      </a:r>
-                      <a:endParaRPr lang="en-US" sz="1800" b="1" baseline="0" dirty="0">
-                        <a:solidFill>
-                          <a:schemeClr val="bg1">
-                            <a:lumMod val="50000"/>
-                          </a:schemeClr>
-                        </a:solidFill>
-                        <a:latin typeface="Courier New" panose="02070309020205020404" pitchFamily="49" charset="0"/>
-                        <a:cs typeface="Courier New" panose="02070309020205020404" pitchFamily="49" charset="0"/>
-                      </a:endParaRPr>
-                    </a:p>
-                    <a:p>
-                      <a:pPr marL="266700" marR="0" lvl="0" indent="-266700" algn="l" defTabSz="914400" rtl="0" eaLnBrk="1" fontAlgn="auto" latinLnBrk="0" hangingPunct="1">
-                        <a:lnSpc>
-                          <a:spcPct val="100000"/>
-                        </a:lnSpc>
-                        <a:spcBef>
-                          <a:spcPts val="0"/>
-                        </a:spcBef>
-                        <a:spcAft>
-                          <a:spcPts val="0"/>
-                        </a:spcAft>
-                        <a:buClr>
-                          <a:schemeClr val="accent1">
-                            <a:lumMod val="50000"/>
-                          </a:schemeClr>
-                        </a:buClr>
-                        <a:buSzPct val="120000"/>
-                        <a:buFont typeface="Courier New" panose="02070309020205020404" pitchFamily="49" charset="0"/>
-                        <a:buChar char="|"/>
-                        <a:tabLst/>
-                        <a:defRPr/>
-                      </a:pPr>
-                      <a:r>
-                        <a:rPr lang="pt-BR" sz="1800" b="1" baseline="0" dirty="0">
-                          <a:solidFill>
-                            <a:srgbClr val="C00000"/>
-                          </a:solidFill>
-                          <a:latin typeface="Courier New" panose="02070309020205020404" pitchFamily="49" charset="0"/>
-                          <a:cs typeface="Courier New" panose="02070309020205020404" pitchFamily="49" charset="0"/>
-                        </a:rPr>
-                        <a:t>Counter</a:t>
-                      </a:r>
-                      <a:r>
-                        <a:rPr lang="pt-BR" sz="1800" b="1" baseline="0" dirty="0">
-                          <a:solidFill>
-                            <a:schemeClr val="tx1"/>
-                          </a:solidFill>
-                          <a:latin typeface="Courier New" panose="02070309020205020404" pitchFamily="49" charset="0"/>
-                          <a:cs typeface="Courier New" panose="02070309020205020404" pitchFamily="49" charset="0"/>
-                        </a:rPr>
-                        <a:t>({'b': 2, 'c': 2, 'a': 1})</a:t>
-                      </a:r>
-                    </a:p>
-                    <a:p>
-                      <a:pPr marL="266700" indent="-266700">
-                        <a:buClr>
-                          <a:srgbClr val="C00000"/>
-                        </a:buClr>
-                        <a:buSzPct val="100000"/>
-                        <a:buFont typeface="Courier New" panose="02070309020205020404" pitchFamily="49" charset="0"/>
-                        <a:buChar char="&gt;"/>
-                      </a:pPr>
-                      <a:r>
-                        <a:rPr lang="en-US" sz="1800" b="1" baseline="0" dirty="0">
-                          <a:solidFill>
-                            <a:srgbClr val="C00000"/>
-                          </a:solidFill>
-                          <a:latin typeface="Courier New" panose="02070309020205020404" pitchFamily="49" charset="0"/>
-                          <a:cs typeface="Courier New" panose="02070309020205020404" pitchFamily="49" charset="0"/>
-                        </a:rPr>
-                        <a:t>Counter</a:t>
-                      </a:r>
-                      <a:r>
-                        <a:rPr lang="en-US" sz="1800" b="1" baseline="0" dirty="0">
-                          <a:solidFill>
-                            <a:schemeClr val="tx1"/>
-                          </a:solidFill>
-                          <a:latin typeface="Courier New" panose="02070309020205020404" pitchFamily="49" charset="0"/>
-                          <a:cs typeface="Courier New" panose="02070309020205020404" pitchFamily="49" charset="0"/>
-                        </a:rPr>
-                        <a:t>([1, 2, 1, 3, 4, 5]) </a:t>
-                      </a:r>
-                      <a:r>
-                        <a:rPr lang="en-US" sz="1800" b="1" baseline="0" dirty="0">
-                          <a:solidFill>
-                            <a:srgbClr val="C00000"/>
-                          </a:solidFill>
-                          <a:latin typeface="Courier New" panose="02070309020205020404" pitchFamily="49" charset="0"/>
-                          <a:cs typeface="Courier New" panose="02070309020205020404" pitchFamily="49" charset="0"/>
-                        </a:rPr>
-                        <a:t>+</a:t>
-                      </a:r>
-                      <a:r>
-                        <a:rPr lang="en-US" sz="1800" b="1" baseline="0" dirty="0">
-                          <a:solidFill>
-                            <a:schemeClr val="tx1"/>
-                          </a:solidFill>
-                          <a:latin typeface="Courier New" panose="02070309020205020404" pitchFamily="49" charset="0"/>
-                          <a:cs typeface="Courier New" panose="02070309020205020404" pitchFamily="49" charset="0"/>
-                        </a:rPr>
-                        <a:t> </a:t>
-                      </a:r>
-                      <a:r>
-                        <a:rPr lang="en-US" sz="1800" b="1" baseline="0" dirty="0">
-                          <a:solidFill>
-                            <a:srgbClr val="C00000"/>
-                          </a:solidFill>
-                          <a:latin typeface="Courier New" panose="02070309020205020404" pitchFamily="49" charset="0"/>
-                          <a:cs typeface="Courier New" panose="02070309020205020404" pitchFamily="49" charset="0"/>
-                        </a:rPr>
-                        <a:t>Counter</a:t>
-                      </a:r>
-                      <a:r>
-                        <a:rPr lang="en-US" sz="1800" b="1" baseline="0" dirty="0">
-                          <a:solidFill>
-                            <a:schemeClr val="tx1"/>
-                          </a:solidFill>
-                          <a:latin typeface="Courier New" panose="02070309020205020404" pitchFamily="49" charset="0"/>
-                          <a:cs typeface="Courier New" panose="02070309020205020404" pitchFamily="49" charset="0"/>
-                        </a:rPr>
-                        <a:t>([3, 3, 3])  </a:t>
-                      </a:r>
-                      <a:r>
-                        <a:rPr lang="pt-BR" sz="1800" b="1" baseline="0" dirty="0">
-                          <a:solidFill>
-                            <a:schemeClr val="bg1">
-                              <a:lumMod val="50000"/>
-                            </a:schemeClr>
-                          </a:solidFill>
-                          <a:latin typeface="Courier New" panose="02070309020205020404" pitchFamily="49" charset="0"/>
-                          <a:cs typeface="Courier New" panose="02070309020205020404" pitchFamily="49" charset="0"/>
-                        </a:rPr>
-                        <a:t># counters can be added</a:t>
-                      </a:r>
-                      <a:endParaRPr lang="en-US" sz="1800" b="1" baseline="0" dirty="0">
-                        <a:solidFill>
-                          <a:schemeClr val="bg1">
-                            <a:lumMod val="50000"/>
-                          </a:schemeClr>
-                        </a:solidFill>
-                        <a:latin typeface="Courier New" panose="02070309020205020404" pitchFamily="49" charset="0"/>
-                        <a:cs typeface="Courier New" panose="02070309020205020404" pitchFamily="49" charset="0"/>
-                      </a:endParaRPr>
-                    </a:p>
-                    <a:p>
-                      <a:pPr marL="266700" marR="0" lvl="0" indent="-266700" algn="l" defTabSz="914400" rtl="0" eaLnBrk="1" fontAlgn="auto" latinLnBrk="0" hangingPunct="1">
-                        <a:lnSpc>
-                          <a:spcPct val="100000"/>
-                        </a:lnSpc>
-                        <a:spcBef>
-                          <a:spcPts val="0"/>
-                        </a:spcBef>
-                        <a:spcAft>
-                          <a:spcPts val="600"/>
-                        </a:spcAft>
-                        <a:buClr>
-                          <a:schemeClr val="accent1">
-                            <a:lumMod val="50000"/>
-                          </a:schemeClr>
-                        </a:buClr>
-                        <a:buSzPct val="120000"/>
-                        <a:buFont typeface="Courier New" panose="02070309020205020404" pitchFamily="49" charset="0"/>
-                        <a:buChar char="|"/>
-                        <a:tabLst/>
-                        <a:defRPr/>
-                      </a:pPr>
-                      <a:r>
-                        <a:rPr lang="pt-BR" sz="1800" b="1" baseline="0" dirty="0">
-                          <a:solidFill>
-                            <a:srgbClr val="C00000"/>
-                          </a:solidFill>
-                          <a:latin typeface="Courier New" panose="02070309020205020404" pitchFamily="49" charset="0"/>
-                          <a:cs typeface="Courier New" panose="02070309020205020404" pitchFamily="49" charset="0"/>
-                        </a:rPr>
-                        <a:t>Counter</a:t>
-                      </a:r>
-                      <a:r>
-                        <a:rPr lang="pt-BR" sz="1800" b="1" baseline="0" dirty="0">
-                          <a:solidFill>
-                            <a:srgbClr val="000000"/>
-                          </a:solidFill>
-                          <a:latin typeface="Courier New" panose="02070309020205020404" pitchFamily="49" charset="0"/>
-                          <a:cs typeface="Courier New" panose="02070309020205020404" pitchFamily="49" charset="0"/>
-                        </a:rPr>
-                        <a:t>(</a:t>
-                      </a:r>
-                      <a:r>
-                        <a:rPr lang="pt-BR" sz="1800" b="1" baseline="0" dirty="0">
-                          <a:solidFill>
-                            <a:schemeClr val="tx1"/>
-                          </a:solidFill>
-                          <a:latin typeface="Courier New" panose="02070309020205020404" pitchFamily="49" charset="0"/>
-                          <a:cs typeface="Courier New" panose="02070309020205020404" pitchFamily="49" charset="0"/>
-                        </a:rPr>
-                        <a:t>{3: 4, 1: 2, 2: 1, 4: 1, 5: 1})</a:t>
-                      </a:r>
-                    </a:p>
-                    <a:p>
-                      <a:pPr marL="266700" indent="-266700">
-                        <a:buClr>
-                          <a:srgbClr val="C00000"/>
-                        </a:buClr>
-                        <a:buSzPct val="100000"/>
-                        <a:buFont typeface="Courier New" panose="02070309020205020404" pitchFamily="49" charset="0"/>
-                        <a:buChar char="&gt;"/>
-                      </a:pPr>
-                      <a:r>
-                        <a:rPr lang="en-US" sz="1800" b="1" baseline="0" dirty="0">
-                          <a:solidFill>
-                            <a:schemeClr val="tx1"/>
-                          </a:solidFill>
-                          <a:latin typeface="Courier New" panose="02070309020205020404" pitchFamily="49" charset="0"/>
-                          <a:cs typeface="Courier New" panose="02070309020205020404" pitchFamily="49" charset="0"/>
-                        </a:rPr>
-                        <a:t>T = '</a:t>
-                      </a:r>
-                      <a:r>
-                        <a:rPr lang="en-US" sz="1800" b="1" baseline="0" dirty="0" err="1">
-                          <a:solidFill>
-                            <a:schemeClr val="tx1"/>
-                          </a:solidFill>
-                          <a:latin typeface="Courier New" panose="02070309020205020404" pitchFamily="49" charset="0"/>
-                          <a:cs typeface="Courier New" panose="02070309020205020404" pitchFamily="49" charset="0"/>
-                        </a:rPr>
-                        <a:t>AfD</a:t>
-                      </a:r>
-                      <a:r>
-                        <a:rPr lang="en-US" sz="1800" b="1" baseline="0" dirty="0">
-                          <a:solidFill>
-                            <a:schemeClr val="tx1"/>
-                          </a:solidFill>
-                          <a:latin typeface="Courier New" panose="02070309020205020404" pitchFamily="49" charset="0"/>
-                          <a:cs typeface="Courier New" panose="02070309020205020404" pitchFamily="49" charset="0"/>
-                        </a:rPr>
-                        <a:t> </a:t>
-                      </a:r>
-                      <a:r>
-                        <a:rPr lang="en-US" sz="1800" b="1" baseline="0" dirty="0" err="1">
-                          <a:solidFill>
-                            <a:schemeClr val="tx1"/>
-                          </a:solidFill>
-                          <a:latin typeface="Courier New" panose="02070309020205020404" pitchFamily="49" charset="0"/>
-                          <a:cs typeface="Courier New" panose="02070309020205020404" pitchFamily="49" charset="0"/>
-                        </a:rPr>
-                        <a:t>adsf</a:t>
-                      </a:r>
-                      <a:r>
-                        <a:rPr lang="en-US" sz="1800" b="1" baseline="0" dirty="0">
-                          <a:solidFill>
-                            <a:schemeClr val="tx1"/>
-                          </a:solidFill>
-                          <a:latin typeface="Courier New" panose="02070309020205020404" pitchFamily="49" charset="0"/>
-                          <a:cs typeface="Courier New" panose="02070309020205020404" pitchFamily="49" charset="0"/>
-                        </a:rPr>
-                        <a:t> </a:t>
-                      </a:r>
-                      <a:r>
-                        <a:rPr lang="en-US" sz="1800" b="1" baseline="0" dirty="0" err="1">
-                          <a:solidFill>
-                            <a:schemeClr val="tx1"/>
-                          </a:solidFill>
-                          <a:latin typeface="Courier New" panose="02070309020205020404" pitchFamily="49" charset="0"/>
-                          <a:cs typeface="Courier New" panose="02070309020205020404" pitchFamily="49" charset="0"/>
-                        </a:rPr>
-                        <a:t>dsa</a:t>
-                      </a:r>
-                      <a:r>
-                        <a:rPr lang="en-US" sz="1800" b="1" baseline="0" dirty="0">
-                          <a:solidFill>
-                            <a:schemeClr val="tx1"/>
-                          </a:solidFill>
-                          <a:latin typeface="Courier New" panose="02070309020205020404" pitchFamily="49" charset="0"/>
-                          <a:cs typeface="Courier New" panose="02070309020205020404" pitchFamily="49" charset="0"/>
-                        </a:rPr>
-                        <a:t> f </a:t>
-                      </a:r>
-                      <a:r>
-                        <a:rPr lang="en-US" sz="1800" b="1" baseline="0" dirty="0" err="1">
-                          <a:solidFill>
-                            <a:schemeClr val="tx1"/>
-                          </a:solidFill>
-                          <a:latin typeface="Courier New" panose="02070309020205020404" pitchFamily="49" charset="0"/>
-                          <a:cs typeface="Courier New" panose="02070309020205020404" pitchFamily="49" charset="0"/>
-                        </a:rPr>
-                        <a:t>dsaf</a:t>
-                      </a:r>
-                      <a:r>
-                        <a:rPr lang="en-US" sz="1800" b="1" baseline="0" dirty="0">
-                          <a:solidFill>
-                            <a:schemeClr val="tx1"/>
-                          </a:solidFill>
-                          <a:latin typeface="Courier New" panose="02070309020205020404" pitchFamily="49" charset="0"/>
-                          <a:cs typeface="Courier New" panose="02070309020205020404" pitchFamily="49" charset="0"/>
-                        </a:rPr>
-                        <a:t> </a:t>
-                      </a:r>
-                      <a:r>
-                        <a:rPr lang="en-US" sz="1800" b="1" baseline="0" dirty="0" err="1">
-                          <a:solidFill>
-                            <a:schemeClr val="tx1"/>
-                          </a:solidFill>
-                          <a:latin typeface="Courier New" panose="02070309020205020404" pitchFamily="49" charset="0"/>
-                          <a:cs typeface="Courier New" panose="02070309020205020404" pitchFamily="49" charset="0"/>
-                        </a:rPr>
-                        <a:t>daf</a:t>
-                      </a:r>
-                      <a:r>
-                        <a:rPr lang="en-US" sz="1800" b="1" baseline="0" dirty="0">
-                          <a:solidFill>
-                            <a:schemeClr val="tx1"/>
-                          </a:solidFill>
-                          <a:latin typeface="Courier New" panose="02070309020205020404" pitchFamily="49" charset="0"/>
-                          <a:cs typeface="Courier New" panose="02070309020205020404" pitchFamily="49" charset="0"/>
-                        </a:rPr>
-                        <a:t> </a:t>
-                      </a:r>
-                      <a:r>
-                        <a:rPr lang="en-US" sz="1800" b="1" baseline="0" dirty="0" err="1">
-                          <a:solidFill>
-                            <a:schemeClr val="tx1"/>
-                          </a:solidFill>
-                          <a:latin typeface="Courier New" panose="02070309020205020404" pitchFamily="49" charset="0"/>
-                          <a:cs typeface="Courier New" panose="02070309020205020404" pitchFamily="49" charset="0"/>
-                        </a:rPr>
-                        <a:t>dsaf</a:t>
-                      </a:r>
-                      <a:r>
-                        <a:rPr lang="en-US" sz="1800" b="1" baseline="0" dirty="0">
-                          <a:solidFill>
-                            <a:schemeClr val="tx1"/>
-                          </a:solidFill>
-                          <a:latin typeface="Courier New" panose="02070309020205020404" pitchFamily="49" charset="0"/>
-                          <a:cs typeface="Courier New" panose="02070309020205020404" pitchFamily="49" charset="0"/>
-                        </a:rPr>
-                        <a:t> DSA </a:t>
-                      </a:r>
-                      <a:r>
-                        <a:rPr lang="en-US" sz="1800" b="1" baseline="0" dirty="0" err="1">
-                          <a:solidFill>
-                            <a:schemeClr val="tx1"/>
-                          </a:solidFill>
-                          <a:latin typeface="Courier New" panose="02070309020205020404" pitchFamily="49" charset="0"/>
-                          <a:cs typeface="Courier New" panose="02070309020205020404" pitchFamily="49" charset="0"/>
-                        </a:rPr>
-                        <a:t>fda</a:t>
-                      </a:r>
-                      <a:r>
-                        <a:rPr lang="en-US" sz="1800" b="1" baseline="0" dirty="0">
-                          <a:solidFill>
-                            <a:schemeClr val="tx1"/>
-                          </a:solidFill>
-                          <a:latin typeface="Courier New" panose="02070309020205020404" pitchFamily="49" charset="0"/>
-                          <a:cs typeface="Courier New" panose="02070309020205020404" pitchFamily="49" charset="0"/>
-                        </a:rPr>
-                        <a:t> f SA </a:t>
-                      </a:r>
-                      <a:r>
-                        <a:rPr lang="en-US" sz="1800" b="1" baseline="0" dirty="0" err="1">
-                          <a:solidFill>
-                            <a:schemeClr val="tx1"/>
-                          </a:solidFill>
-                          <a:latin typeface="Courier New" panose="02070309020205020404" pitchFamily="49" charset="0"/>
-                          <a:cs typeface="Courier New" panose="02070309020205020404" pitchFamily="49" charset="0"/>
-                        </a:rPr>
-                        <a:t>dsa</a:t>
-                      </a:r>
-                      <a:r>
-                        <a:rPr lang="en-US" sz="1800" b="1" baseline="0" dirty="0">
-                          <a:solidFill>
-                            <a:schemeClr val="tx1"/>
-                          </a:solidFill>
-                          <a:latin typeface="Courier New" panose="02070309020205020404" pitchFamily="49" charset="0"/>
-                          <a:cs typeface="Courier New" panose="02070309020205020404" pitchFamily="49" charset="0"/>
-                        </a:rPr>
-                        <a:t> f </a:t>
-                      </a:r>
-                      <a:r>
-                        <a:rPr lang="en-US" sz="1800" b="1" baseline="0" dirty="0" err="1">
-                          <a:solidFill>
-                            <a:schemeClr val="tx1"/>
-                          </a:solidFill>
-                          <a:latin typeface="Courier New" panose="02070309020205020404" pitchFamily="49" charset="0"/>
-                          <a:cs typeface="Courier New" panose="02070309020205020404" pitchFamily="49" charset="0"/>
-                        </a:rPr>
-                        <a:t>dsa</a:t>
-                      </a:r>
-                      <a:r>
-                        <a:rPr lang="en-US" sz="1800" b="1" baseline="0" dirty="0">
-                          <a:solidFill>
-                            <a:schemeClr val="tx1"/>
-                          </a:solidFill>
-                          <a:latin typeface="Courier New" panose="02070309020205020404" pitchFamily="49" charset="0"/>
-                          <a:cs typeface="Courier New" panose="02070309020205020404" pitchFamily="49" charset="0"/>
-                        </a:rPr>
-                        <a:t> </a:t>
-                      </a:r>
-                      <a:r>
-                        <a:rPr lang="en-US" sz="1800" b="1" baseline="0" dirty="0" err="1">
-                          <a:solidFill>
-                            <a:schemeClr val="tx1"/>
-                          </a:solidFill>
-                          <a:latin typeface="Courier New" panose="02070309020205020404" pitchFamily="49" charset="0"/>
-                          <a:cs typeface="Courier New" panose="02070309020205020404" pitchFamily="49" charset="0"/>
-                        </a:rPr>
-                        <a:t>fdsa</a:t>
-                      </a:r>
-                      <a:r>
-                        <a:rPr lang="en-US" sz="1800" b="1" baseline="0" dirty="0">
-                          <a:solidFill>
-                            <a:schemeClr val="tx1"/>
-                          </a:solidFill>
-                          <a:latin typeface="Courier New" panose="02070309020205020404" pitchFamily="49" charset="0"/>
-                          <a:cs typeface="Courier New" panose="02070309020205020404" pitchFamily="49" charset="0"/>
-                        </a:rPr>
-                        <a:t> f </a:t>
-                      </a:r>
-                      <a:r>
-                        <a:rPr lang="en-US" sz="1800" b="1" baseline="0" dirty="0" err="1">
-                          <a:solidFill>
-                            <a:schemeClr val="tx1"/>
-                          </a:solidFill>
-                          <a:latin typeface="Courier New" panose="02070309020205020404" pitchFamily="49" charset="0"/>
-                          <a:cs typeface="Courier New" panose="02070309020205020404" pitchFamily="49" charset="0"/>
-                        </a:rPr>
-                        <a:t>dsAf</a:t>
-                      </a:r>
-                      <a:r>
-                        <a:rPr lang="en-US" sz="1800" b="1" baseline="0" dirty="0">
-                          <a:solidFill>
-                            <a:schemeClr val="tx1"/>
-                          </a:solidFill>
-                          <a:latin typeface="Courier New" panose="02070309020205020404" pitchFamily="49" charset="0"/>
-                          <a:cs typeface="Courier New" panose="02070309020205020404" pitchFamily="49" charset="0"/>
-                        </a:rPr>
-                        <a:t> </a:t>
-                      </a:r>
-                      <a:r>
-                        <a:rPr lang="en-US" sz="1800" b="1" baseline="0" dirty="0" err="1">
-                          <a:solidFill>
-                            <a:schemeClr val="tx1"/>
-                          </a:solidFill>
-                          <a:latin typeface="Courier New" panose="02070309020205020404" pitchFamily="49" charset="0"/>
-                          <a:cs typeface="Courier New" panose="02070309020205020404" pitchFamily="49" charset="0"/>
-                        </a:rPr>
-                        <a:t>sAf</a:t>
-                      </a:r>
-                      <a:r>
-                        <a:rPr lang="en-US" sz="1800" b="1" baseline="0" dirty="0">
-                          <a:solidFill>
-                            <a:schemeClr val="tx1"/>
-                          </a:solidFill>
-                          <a:latin typeface="Courier New" panose="02070309020205020404" pitchFamily="49" charset="0"/>
-                          <a:cs typeface="Courier New" panose="02070309020205020404" pitchFamily="49" charset="0"/>
-                        </a:rPr>
-                        <a:t> f </a:t>
-                      </a:r>
-                      <a:r>
-                        <a:rPr lang="en-US" sz="1800" b="1" baseline="0" dirty="0" err="1">
-                          <a:solidFill>
-                            <a:schemeClr val="tx1"/>
-                          </a:solidFill>
-                          <a:latin typeface="Courier New" panose="02070309020205020404" pitchFamily="49" charset="0"/>
-                          <a:cs typeface="Courier New" panose="02070309020205020404" pitchFamily="49" charset="0"/>
-                        </a:rPr>
-                        <a:t>dsaf</a:t>
-                      </a:r>
-                      <a:r>
-                        <a:rPr lang="en-US" sz="1800" b="1" baseline="0" dirty="0">
-                          <a:solidFill>
-                            <a:schemeClr val="tx1"/>
-                          </a:solidFill>
-                          <a:latin typeface="Courier New" panose="02070309020205020404" pitchFamily="49" charset="0"/>
-                          <a:cs typeface="Courier New" panose="02070309020205020404" pitchFamily="49" charset="0"/>
-                        </a:rPr>
-                        <a:t>'</a:t>
-                      </a:r>
-                    </a:p>
-                    <a:p>
-                      <a:pPr marL="266700" indent="-266700">
-                        <a:buClr>
-                          <a:srgbClr val="C00000"/>
-                        </a:buClr>
-                        <a:buSzPct val="100000"/>
-                        <a:buFont typeface="Courier New" panose="02070309020205020404" pitchFamily="49" charset="0"/>
-                        <a:buChar char="&gt;"/>
-                      </a:pPr>
-                      <a:r>
-                        <a:rPr lang="en-US" sz="1800" b="1" baseline="0" dirty="0">
-                          <a:solidFill>
-                            <a:srgbClr val="C00000"/>
-                          </a:solidFill>
-                          <a:latin typeface="Courier New" panose="02070309020205020404" pitchFamily="49" charset="0"/>
-                          <a:cs typeface="Courier New" panose="02070309020205020404" pitchFamily="49" charset="0"/>
-                        </a:rPr>
-                        <a:t>Counter</a:t>
-                      </a:r>
-                      <a:r>
-                        <a:rPr lang="en-US" sz="1800" b="1" baseline="0" dirty="0">
-                          <a:solidFill>
-                            <a:schemeClr val="tx1"/>
-                          </a:solidFill>
-                          <a:latin typeface="Courier New" panose="02070309020205020404" pitchFamily="49" charset="0"/>
-                          <a:cs typeface="Courier New" panose="02070309020205020404" pitchFamily="49" charset="0"/>
-                        </a:rPr>
-                        <a:t>(</a:t>
-                      </a:r>
-                      <a:r>
-                        <a:rPr lang="en-US" sz="1800" b="1" baseline="0" dirty="0" err="1">
-                          <a:solidFill>
-                            <a:schemeClr val="tx1"/>
-                          </a:solidFill>
-                          <a:latin typeface="Courier New" panose="02070309020205020404" pitchFamily="49" charset="0"/>
-                          <a:cs typeface="Courier New" panose="02070309020205020404" pitchFamily="49" charset="0"/>
-                        </a:rPr>
-                        <a:t>T.lower</a:t>
-                      </a:r>
-                      <a:r>
-                        <a:rPr lang="en-US" sz="1800" b="1" baseline="0" dirty="0">
-                          <a:solidFill>
-                            <a:schemeClr val="tx1"/>
-                          </a:solidFill>
-                          <a:latin typeface="Courier New" panose="02070309020205020404" pitchFamily="49" charset="0"/>
-                          <a:cs typeface="Courier New" panose="02070309020205020404" pitchFamily="49" charset="0"/>
-                        </a:rPr>
-                        <a:t>().split()).</a:t>
-                      </a:r>
-                      <a:r>
-                        <a:rPr lang="en-US" sz="1800" b="1" baseline="0" dirty="0" err="1">
-                          <a:solidFill>
-                            <a:schemeClr val="tx1"/>
-                          </a:solidFill>
-                          <a:latin typeface="Courier New" panose="02070309020205020404" pitchFamily="49" charset="0"/>
-                          <a:cs typeface="Courier New" panose="02070309020205020404" pitchFamily="49" charset="0"/>
-                        </a:rPr>
-                        <a:t>most_common</a:t>
-                      </a:r>
-                      <a:r>
-                        <a:rPr lang="en-US" sz="1800" b="1" baseline="0" dirty="0">
-                          <a:solidFill>
-                            <a:schemeClr val="tx1"/>
-                          </a:solidFill>
-                          <a:latin typeface="Courier New" panose="02070309020205020404" pitchFamily="49" charset="0"/>
-                          <a:cs typeface="Courier New" panose="02070309020205020404" pitchFamily="49" charset="0"/>
-                        </a:rPr>
-                        <a:t>(3)</a:t>
-                      </a:r>
-                    </a:p>
-                    <a:p>
-                      <a:pPr marL="266700" marR="0" lvl="0" indent="-266700" algn="l" defTabSz="914400" rtl="0" eaLnBrk="1" fontAlgn="auto" latinLnBrk="0" hangingPunct="1">
-                        <a:lnSpc>
-                          <a:spcPct val="100000"/>
-                        </a:lnSpc>
-                        <a:spcBef>
-                          <a:spcPts val="0"/>
-                        </a:spcBef>
-                        <a:spcAft>
-                          <a:spcPts val="0"/>
-                        </a:spcAft>
-                        <a:buClr>
-                          <a:schemeClr val="accent1">
-                            <a:lumMod val="50000"/>
-                          </a:schemeClr>
-                        </a:buClr>
-                        <a:buSzPct val="120000"/>
-                        <a:buFont typeface="Courier New" panose="02070309020205020404" pitchFamily="49" charset="0"/>
-                        <a:buChar char="|"/>
-                        <a:tabLst/>
-                        <a:defRPr/>
-                      </a:pPr>
-                      <a:r>
-                        <a:rPr lang="pt-BR" sz="1800" b="1" baseline="0" dirty="0">
-                          <a:solidFill>
-                            <a:schemeClr val="tx1"/>
-                          </a:solidFill>
-                          <a:latin typeface="Courier New" panose="02070309020205020404" pitchFamily="49" charset="0"/>
-                          <a:cs typeface="Courier New" panose="02070309020205020404" pitchFamily="49" charset="0"/>
-                        </a:rPr>
-                        <a:t>[('f', 5), ('dsa', 4), ('dsaf', 4)]</a:t>
-                      </a:r>
-                    </a:p>
-                  </a:txBody>
-                  <a:tcPr>
-                    <a:lnL w="6350" cap="flat" cmpd="sng" algn="ctr">
-                      <a:solidFill>
-                        <a:schemeClr val="tx1"/>
-                      </a:solidFill>
-                      <a:prstDash val="solid"/>
-                      <a:round/>
-                      <a:headEnd type="none" w="med" len="med"/>
-                      <a:tailEnd type="none" w="med" len="med"/>
-                    </a:lnL>
-                    <a:lnR w="6350" cap="flat" cmpd="sng" algn="ctr">
-                      <a:solidFill>
-                        <a:schemeClr val="tx1"/>
-                      </a:solidFill>
-                      <a:prstDash val="solid"/>
-                      <a:round/>
-                      <a:headEnd type="none" w="med" len="med"/>
-                      <a:tailEnd type="none" w="med" len="med"/>
-                    </a:lnR>
-                    <a:lnT w="6350" cap="flat" cmpd="sng" algn="ctr">
-                      <a:solidFill>
-                        <a:schemeClr val="tx1"/>
-                      </a:solidFill>
-                      <a:prstDash val="solid"/>
-                      <a:round/>
-                      <a:headEnd type="none" w="med" len="med"/>
-                      <a:tailEnd type="none" w="med" len="med"/>
-                    </a:lnT>
-                    <a:lnB w="6350" cap="flat" cmpd="sng" algn="ctr">
-                      <a:solidFill>
-                        <a:schemeClr val="tx1"/>
-                      </a:solidFill>
-                      <a:prstDash val="solid"/>
-                      <a:round/>
-                      <a:headEnd type="none" w="med" len="med"/>
-                      <a:tailEnd type="none" w="med" len="med"/>
-                    </a:lnB>
-                    <a:lnTlToBr w="12700" cmpd="sng">
-                      <a:noFill/>
-                      <a:prstDash val="solid"/>
-                    </a:lnTlToBr>
-                    <a:lnBlToTr w="12700" cmpd="sng">
-                      <a:noFill/>
-                      <a:prstDash val="solid"/>
-                    </a:lnBlToTr>
-                    <a:solidFill>
-                      <a:schemeClr val="accent5">
-                        <a:lumMod val="20000"/>
-                        <a:lumOff val="80000"/>
-                      </a:schemeClr>
-                    </a:solidFill>
-                  </a:tcPr>
-                </a:tc>
-                <a:extLst>
-                  <a:ext uri="{0D108BD9-81ED-4DB2-BD59-A6C34878D82A}">
-                    <a16:rowId xmlns:a16="http://schemas.microsoft.com/office/drawing/2014/main" val="4112970457"/>
-                  </a:ext>
-                </a:extLst>
-              </a:tr>
-            </a:tbl>
-          </a:graphicData>
-        </a:graphic>
-      </p:graphicFrame>
-    </p:spTree>
-    <p:extLst>
-      <p:ext uri="{BB962C8B-B14F-4D97-AF65-F5344CB8AC3E}">
-        <p14:creationId xmlns:p14="http://schemas.microsoft.com/office/powerpoint/2010/main" val="976103109"/>
-      </p:ext>
-    </p:extLst>
-  </p:cSld>
-  <p:clrMapOvr>
-    <a:masterClrMapping/>
-  </p:clrMapOvr>
-</p:sld>
-</file>
-
 <file path=ppt/slides/slide2.xml><?xml version="1.0" encoding="utf-8"?>
 <p:sld xmlns:a="http://schemas.openxmlformats.org/drawingml/2006/main" xmlns:r="http://schemas.openxmlformats.org/officeDocument/2006/relationships" xmlns:p="http://schemas.openxmlformats.org/presentationml/2006/main">
   <p:cSld>
@@ -18865,6 +19081,1387 @@
       </p:grpSpPr>
       <p:sp>
         <p:nvSpPr>
+          <p:cNvPr id="2" name="Title 1"/>
+          <p:cNvSpPr>
+            <a:spLocks noGrp="1"/>
+          </p:cNvSpPr>
+          <p:nvPr>
+            <p:ph type="title"/>
+          </p:nvPr>
+        </p:nvSpPr>
+        <p:spPr>
+          <a:xfrm>
+            <a:off x="838200" y="221432"/>
+            <a:ext cx="10644051" cy="1325563"/>
+          </a:xfrm>
+        </p:spPr>
+        <p:txBody>
+          <a:bodyPr/>
+          <a:lstStyle/>
+          <a:p>
+            <a:r>
+              <a:rPr lang="da-DK" dirty="0" err="1">
+                <a:latin typeface="Courier New" panose="02070309020205020404" pitchFamily="49" charset="0"/>
+                <a:cs typeface="Courier New" panose="02070309020205020404" pitchFamily="49" charset="0"/>
+              </a:rPr>
+              <a:t>Counter</a:t>
+            </a:r>
+            <a:r>
+              <a:rPr lang="da-DK" dirty="0">
+                <a:latin typeface="+mn-lt"/>
+                <a:cs typeface="Courier New" panose="02070309020205020404" pitchFamily="49" charset="0"/>
+              </a:rPr>
+              <a:t> – </a:t>
+            </a:r>
+            <a:r>
+              <a:rPr lang="da-DK" dirty="0" err="1">
+                <a:latin typeface="+mn-lt"/>
+                <a:cs typeface="Courier New" panose="02070309020205020404" pitchFamily="49" charset="0"/>
+              </a:rPr>
+              <a:t>dictionaries</a:t>
+            </a:r>
+            <a:r>
+              <a:rPr lang="da-DK" dirty="0">
+                <a:latin typeface="+mn-lt"/>
+                <a:cs typeface="Courier New" panose="02070309020205020404" pitchFamily="49" charset="0"/>
+              </a:rPr>
+              <a:t> for </a:t>
+            </a:r>
+            <a:r>
+              <a:rPr lang="da-DK" dirty="0" err="1">
+                <a:latin typeface="+mn-lt"/>
+                <a:cs typeface="Courier New" panose="02070309020205020404" pitchFamily="49" charset="0"/>
+              </a:rPr>
+              <a:t>counting</a:t>
+            </a:r>
+            <a:endParaRPr lang="en-US" dirty="0">
+              <a:latin typeface="+mn-lt"/>
+              <a:cs typeface="Courier New" panose="02070309020205020404" pitchFamily="49" charset="0"/>
+            </a:endParaRPr>
+          </a:p>
+        </p:txBody>
+      </p:sp>
+      <p:graphicFrame>
+        <p:nvGraphicFramePr>
+          <p:cNvPr id="5" name="Table 4"/>
+          <p:cNvGraphicFramePr>
+            <a:graphicFrameLocks noGrp="1"/>
+          </p:cNvGraphicFramePr>
+          <p:nvPr>
+            <p:extLst>
+              <p:ext uri="{D42A27DB-BD31-4B8C-83A1-F6EECF244321}">
+                <p14:modId xmlns:p14="http://schemas.microsoft.com/office/powerpoint/2010/main" val="4073213014"/>
+              </p:ext>
+            </p:extLst>
+          </p:nvPr>
+        </p:nvGraphicFramePr>
+        <p:xfrm>
+          <a:off x="237308" y="1546995"/>
+          <a:ext cx="11717383" cy="4922520"/>
+        </p:xfrm>
+        <a:graphic>
+          <a:graphicData uri="http://schemas.openxmlformats.org/drawingml/2006/table">
+            <a:tbl>
+              <a:tblPr firstRow="1" bandRow="1">
+                <a:tableStyleId>{5C22544A-7EE6-4342-B048-85BDC9FD1C3A}</a:tableStyleId>
+              </a:tblPr>
+              <a:tblGrid>
+                <a:gridCol w="11717383">
+                  <a:extLst>
+                    <a:ext uri="{9D8B030D-6E8A-4147-A177-3AD203B41FA5}">
+                      <a16:colId xmlns:a16="http://schemas.microsoft.com/office/drawing/2014/main" val="1873682825"/>
+                    </a:ext>
+                  </a:extLst>
+                </a:gridCol>
+              </a:tblGrid>
+              <a:tr h="213807">
+                <a:tc>
+                  <a:txBody>
+                    <a:bodyPr/>
+                    <a:lstStyle/>
+                    <a:p>
+                      <a:r>
+                        <a:rPr lang="da-DK" sz="1800" b="1" dirty="0" err="1">
+                          <a:latin typeface="Courier New" panose="02070309020205020404" pitchFamily="49" charset="0"/>
+                          <a:cs typeface="Courier New" panose="02070309020205020404" pitchFamily="49" charset="0"/>
+                        </a:rPr>
+                        <a:t>Python</a:t>
+                      </a:r>
+                      <a:r>
+                        <a:rPr lang="da-DK" sz="1800" b="1" dirty="0">
+                          <a:latin typeface="Courier New" panose="02070309020205020404" pitchFamily="49" charset="0"/>
+                          <a:cs typeface="Courier New" panose="02070309020205020404" pitchFamily="49" charset="0"/>
+                        </a:rPr>
+                        <a:t> </a:t>
+                      </a:r>
+                      <a:r>
+                        <a:rPr lang="da-DK" sz="1800" b="1" dirty="0" err="1">
+                          <a:latin typeface="Courier New" panose="02070309020205020404" pitchFamily="49" charset="0"/>
+                          <a:cs typeface="Courier New" panose="02070309020205020404" pitchFamily="49" charset="0"/>
+                        </a:rPr>
+                        <a:t>shell</a:t>
+                      </a:r>
+                      <a:endParaRPr lang="da-DK" sz="1800" b="1" dirty="0">
+                        <a:latin typeface="Courier New" panose="02070309020205020404" pitchFamily="49" charset="0"/>
+                        <a:cs typeface="Courier New" panose="02070309020205020404" pitchFamily="49" charset="0"/>
+                      </a:endParaRPr>
+                    </a:p>
+                  </a:txBody>
+                  <a:tcPr anchor="ctr">
+                    <a:lnL w="6350" cap="flat" cmpd="sng" algn="ctr">
+                      <a:solidFill>
+                        <a:schemeClr val="tx1"/>
+                      </a:solidFill>
+                      <a:prstDash val="solid"/>
+                      <a:round/>
+                      <a:headEnd type="none" w="med" len="med"/>
+                      <a:tailEnd type="none" w="med" len="med"/>
+                    </a:lnL>
+                    <a:lnR w="6350" cap="flat" cmpd="sng" algn="ctr">
+                      <a:solidFill>
+                        <a:schemeClr val="tx1"/>
+                      </a:solidFill>
+                      <a:prstDash val="solid"/>
+                      <a:round/>
+                      <a:headEnd type="none" w="med" len="med"/>
+                      <a:tailEnd type="none" w="med" len="med"/>
+                    </a:lnR>
+                    <a:lnT w="6350" cap="flat" cmpd="sng" algn="ctr">
+                      <a:solidFill>
+                        <a:schemeClr val="tx1"/>
+                      </a:solidFill>
+                      <a:prstDash val="solid"/>
+                      <a:round/>
+                      <a:headEnd type="none" w="med" len="med"/>
+                      <a:tailEnd type="none" w="med" len="med"/>
+                    </a:lnT>
+                    <a:lnB w="6350" cap="flat" cmpd="sng" algn="ctr">
+                      <a:solidFill>
+                        <a:schemeClr val="tx1"/>
+                      </a:solidFill>
+                      <a:prstDash val="solid"/>
+                      <a:round/>
+                      <a:headEnd type="none" w="med" len="med"/>
+                      <a:tailEnd type="none" w="med" len="med"/>
+                    </a:lnB>
+                    <a:lnTlToBr w="12700" cmpd="sng">
+                      <a:noFill/>
+                      <a:prstDash val="solid"/>
+                    </a:lnTlToBr>
+                    <a:lnBlToTr w="12700" cmpd="sng">
+                      <a:noFill/>
+                      <a:prstDash val="solid"/>
+                    </a:lnBlToTr>
+                    <a:solidFill>
+                      <a:srgbClr val="C00000"/>
+                    </a:solidFill>
+                  </a:tcPr>
+                </a:tc>
+                <a:extLst>
+                  <a:ext uri="{0D108BD9-81ED-4DB2-BD59-A6C34878D82A}">
+                    <a16:rowId xmlns:a16="http://schemas.microsoft.com/office/drawing/2014/main" val="3330819881"/>
+                  </a:ext>
+                </a:extLst>
+              </a:tr>
+              <a:tr h="2364992">
+                <a:tc>
+                  <a:txBody>
+                    <a:bodyPr/>
+                    <a:lstStyle/>
+                    <a:p>
+                      <a:pPr marL="266700" indent="-266700">
+                        <a:buClr>
+                          <a:srgbClr val="C00000"/>
+                        </a:buClr>
+                        <a:buSzPct val="100000"/>
+                        <a:buFont typeface="Courier New" panose="02070309020205020404" pitchFamily="49" charset="0"/>
+                        <a:buChar char="&gt;"/>
+                      </a:pPr>
+                      <a:r>
+                        <a:rPr lang="pt-BR" sz="1800" b="1" baseline="0" dirty="0">
+                          <a:latin typeface="Courier New" panose="02070309020205020404" pitchFamily="49" charset="0"/>
+                          <a:cs typeface="Courier New" panose="02070309020205020404" pitchFamily="49" charset="0"/>
+                        </a:rPr>
+                        <a:t>from </a:t>
+                      </a:r>
+                      <a:r>
+                        <a:rPr lang="pt-BR" sz="1800" b="1" baseline="0" dirty="0">
+                          <a:solidFill>
+                            <a:srgbClr val="C00000"/>
+                          </a:solidFill>
+                          <a:latin typeface="Courier New" panose="02070309020205020404" pitchFamily="49" charset="0"/>
+                          <a:cs typeface="Courier New" panose="02070309020205020404" pitchFamily="49" charset="0"/>
+                        </a:rPr>
+                        <a:t>collections</a:t>
+                      </a:r>
+                      <a:r>
+                        <a:rPr lang="pt-BR" sz="1800" b="1" baseline="0" dirty="0">
+                          <a:latin typeface="Courier New" panose="02070309020205020404" pitchFamily="49" charset="0"/>
+                          <a:cs typeface="Courier New" panose="02070309020205020404" pitchFamily="49" charset="0"/>
+                        </a:rPr>
+                        <a:t> import </a:t>
+                      </a:r>
+                      <a:r>
+                        <a:rPr lang="pt-BR" sz="1800" b="1" baseline="0" dirty="0">
+                          <a:solidFill>
+                            <a:srgbClr val="C00000"/>
+                          </a:solidFill>
+                          <a:latin typeface="Courier New" panose="02070309020205020404" pitchFamily="49" charset="0"/>
+                          <a:cs typeface="Courier New" panose="02070309020205020404" pitchFamily="49" charset="0"/>
+                        </a:rPr>
+                        <a:t>Counter</a:t>
+                      </a:r>
+                    </a:p>
+                    <a:p>
+                      <a:pPr marL="266700" indent="-266700">
+                        <a:buClr>
+                          <a:srgbClr val="C00000"/>
+                        </a:buClr>
+                        <a:buSzPct val="100000"/>
+                        <a:buFont typeface="Courier New" panose="02070309020205020404" pitchFamily="49" charset="0"/>
+                        <a:buChar char="&gt;"/>
+                      </a:pPr>
+                      <a:r>
+                        <a:rPr lang="pt-BR" sz="1800" b="1" baseline="0" dirty="0">
+                          <a:solidFill>
+                            <a:schemeClr val="tx1"/>
+                          </a:solidFill>
+                          <a:latin typeface="Courier New" panose="02070309020205020404" pitchFamily="49" charset="0"/>
+                          <a:cs typeface="Courier New" panose="02070309020205020404" pitchFamily="49" charset="0"/>
+                        </a:rPr>
+                        <a:t>fq = </a:t>
+                      </a:r>
+                      <a:r>
+                        <a:rPr lang="pt-BR" sz="1800" b="1" baseline="0" dirty="0">
+                          <a:solidFill>
+                            <a:srgbClr val="C00000"/>
+                          </a:solidFill>
+                          <a:latin typeface="Courier New" panose="02070309020205020404" pitchFamily="49" charset="0"/>
+                          <a:cs typeface="Courier New" panose="02070309020205020404" pitchFamily="49" charset="0"/>
+                        </a:rPr>
+                        <a:t>Counter</a:t>
+                      </a:r>
+                      <a:r>
+                        <a:rPr lang="pt-BR" sz="1800" b="1" baseline="0" dirty="0">
+                          <a:latin typeface="Courier New" panose="02070309020205020404" pitchFamily="49" charset="0"/>
+                          <a:cs typeface="Courier New" panose="02070309020205020404" pitchFamily="49" charset="0"/>
+                        </a:rPr>
+                        <a:t>('abracadabra')  </a:t>
+                      </a:r>
+                      <a:r>
+                        <a:rPr lang="pt-BR" sz="1800" b="1" baseline="0" dirty="0">
+                          <a:solidFill>
+                            <a:schemeClr val="bg1">
+                              <a:lumMod val="50000"/>
+                            </a:schemeClr>
+                          </a:solidFill>
+                          <a:latin typeface="Courier New" panose="02070309020205020404" pitchFamily="49" charset="0"/>
+                          <a:cs typeface="Courier New" panose="02070309020205020404" pitchFamily="49" charset="0"/>
+                        </a:rPr>
+                        <a:t># create new counter from a sequence</a:t>
+                      </a:r>
+                    </a:p>
+                    <a:p>
+                      <a:pPr marL="266700" indent="-266700">
+                        <a:buClr>
+                          <a:srgbClr val="C00000"/>
+                        </a:buClr>
+                        <a:buSzPct val="100000"/>
+                        <a:buFont typeface="Courier New" panose="02070309020205020404" pitchFamily="49" charset="0"/>
+                        <a:buChar char="&gt;"/>
+                      </a:pPr>
+                      <a:r>
+                        <a:rPr lang="pt-BR" sz="1800" b="1" baseline="0" dirty="0">
+                          <a:solidFill>
+                            <a:schemeClr val="tx1"/>
+                          </a:solidFill>
+                          <a:latin typeface="Courier New" panose="02070309020205020404" pitchFamily="49" charset="0"/>
+                          <a:cs typeface="Courier New" panose="02070309020205020404" pitchFamily="49" charset="0"/>
+                        </a:rPr>
+                        <a:t>fq</a:t>
+                      </a:r>
+                    </a:p>
+                    <a:p>
+                      <a:pPr marL="266700" marR="0" lvl="0" indent="-266700" algn="l" defTabSz="914400" rtl="0" eaLnBrk="1" fontAlgn="auto" latinLnBrk="0" hangingPunct="1">
+                        <a:lnSpc>
+                          <a:spcPct val="100000"/>
+                        </a:lnSpc>
+                        <a:spcBef>
+                          <a:spcPts val="0"/>
+                        </a:spcBef>
+                        <a:spcAft>
+                          <a:spcPts val="0"/>
+                        </a:spcAft>
+                        <a:buClr>
+                          <a:schemeClr val="accent1">
+                            <a:lumMod val="50000"/>
+                          </a:schemeClr>
+                        </a:buClr>
+                        <a:buSzPct val="120000"/>
+                        <a:buFont typeface="Courier New" panose="02070309020205020404" pitchFamily="49" charset="0"/>
+                        <a:buChar char="|"/>
+                        <a:tabLst/>
+                        <a:defRPr/>
+                      </a:pPr>
+                      <a:r>
+                        <a:rPr lang="pt-BR" sz="1800" b="1" baseline="0" dirty="0">
+                          <a:solidFill>
+                            <a:srgbClr val="C00000"/>
+                          </a:solidFill>
+                          <a:latin typeface="Courier New" panose="02070309020205020404" pitchFamily="49" charset="0"/>
+                          <a:cs typeface="Courier New" panose="02070309020205020404" pitchFamily="49" charset="0"/>
+                        </a:rPr>
+                        <a:t>Counter</a:t>
+                      </a:r>
+                      <a:r>
+                        <a:rPr lang="pt-BR" sz="1800" b="1" baseline="0" dirty="0">
+                          <a:latin typeface="Courier New" panose="02070309020205020404" pitchFamily="49" charset="0"/>
+                          <a:cs typeface="Courier New" panose="02070309020205020404" pitchFamily="49" charset="0"/>
+                        </a:rPr>
+                        <a:t>({'a': 5, 'b': 2, 'r': 2, 'c': 1, 'd': 1})</a:t>
+                      </a:r>
+                      <a:r>
+                        <a:rPr lang="pt-BR" sz="1800" b="1" baseline="0" dirty="0">
+                          <a:solidFill>
+                            <a:schemeClr val="bg1">
+                              <a:lumMod val="50000"/>
+                            </a:schemeClr>
+                          </a:solidFill>
+                          <a:latin typeface="Courier New" panose="02070309020205020404" pitchFamily="49" charset="0"/>
+                          <a:cs typeface="Courier New" panose="02070309020205020404" pitchFamily="49" charset="0"/>
+                        </a:rPr>
+                        <a:t>  # frequencies of the letters</a:t>
+                      </a:r>
+                    </a:p>
+                    <a:p>
+                      <a:pPr marL="266700" indent="-266700">
+                        <a:buClr>
+                          <a:srgbClr val="C00000"/>
+                        </a:buClr>
+                        <a:buSzPct val="100000"/>
+                        <a:buFont typeface="Courier New" panose="02070309020205020404" pitchFamily="49" charset="0"/>
+                        <a:buChar char="&gt;"/>
+                      </a:pPr>
+                      <a:r>
+                        <a:rPr lang="en-US" sz="1800" b="1" baseline="0" dirty="0" err="1">
+                          <a:latin typeface="Courier New" panose="02070309020205020404" pitchFamily="49" charset="0"/>
+                          <a:cs typeface="Courier New" panose="02070309020205020404" pitchFamily="49" charset="0"/>
+                        </a:rPr>
+                        <a:t>fq</a:t>
+                      </a:r>
+                      <a:r>
+                        <a:rPr lang="en-US" sz="1800" b="1" baseline="0" dirty="0">
+                          <a:latin typeface="Courier New" panose="02070309020205020404" pitchFamily="49" charset="0"/>
+                          <a:cs typeface="Courier New" panose="02070309020205020404" pitchFamily="49" charset="0"/>
+                        </a:rPr>
+                        <a:t>['a']</a:t>
+                      </a:r>
+                      <a:endParaRPr lang="pt-BR" sz="1800" b="1" baseline="0" dirty="0">
+                        <a:solidFill>
+                          <a:schemeClr val="bg1">
+                            <a:lumMod val="50000"/>
+                          </a:schemeClr>
+                        </a:solidFill>
+                        <a:latin typeface="Courier New" panose="02070309020205020404" pitchFamily="49" charset="0"/>
+                        <a:cs typeface="Courier New" panose="02070309020205020404" pitchFamily="49" charset="0"/>
+                      </a:endParaRPr>
+                    </a:p>
+                    <a:p>
+                      <a:pPr marL="266700" marR="0" lvl="0" indent="-266700" algn="l" defTabSz="914400" rtl="0" eaLnBrk="1" fontAlgn="auto" latinLnBrk="0" hangingPunct="1">
+                        <a:lnSpc>
+                          <a:spcPct val="100000"/>
+                        </a:lnSpc>
+                        <a:spcBef>
+                          <a:spcPts val="0"/>
+                        </a:spcBef>
+                        <a:spcAft>
+                          <a:spcPts val="0"/>
+                        </a:spcAft>
+                        <a:buClr>
+                          <a:schemeClr val="accent1">
+                            <a:lumMod val="50000"/>
+                          </a:schemeClr>
+                        </a:buClr>
+                        <a:buSzPct val="120000"/>
+                        <a:buFont typeface="Courier New" panose="02070309020205020404" pitchFamily="49" charset="0"/>
+                        <a:buChar char="|"/>
+                        <a:tabLst/>
+                        <a:defRPr/>
+                      </a:pPr>
+                      <a:r>
+                        <a:rPr lang="pt-BR" sz="1800" b="1" baseline="0" dirty="0">
+                          <a:latin typeface="Courier New" panose="02070309020205020404" pitchFamily="49" charset="0"/>
+                          <a:cs typeface="Courier New" panose="02070309020205020404" pitchFamily="49" charset="0"/>
+                        </a:rPr>
+                        <a:t>5</a:t>
+                      </a:r>
+                    </a:p>
+                    <a:p>
+                      <a:pPr marL="266700" indent="-266700">
+                        <a:buClr>
+                          <a:srgbClr val="C00000"/>
+                        </a:buClr>
+                        <a:buSzPct val="100000"/>
+                        <a:buFont typeface="Courier New" panose="02070309020205020404" pitchFamily="49" charset="0"/>
+                        <a:buChar char="&gt;"/>
+                      </a:pPr>
+                      <a:r>
+                        <a:rPr lang="en-US" sz="1800" b="1" baseline="0" dirty="0" err="1">
+                          <a:latin typeface="Courier New" panose="02070309020205020404" pitchFamily="49" charset="0"/>
+                          <a:cs typeface="Courier New" panose="02070309020205020404" pitchFamily="49" charset="0"/>
+                        </a:rPr>
+                        <a:t>fq.most_common</a:t>
+                      </a:r>
+                      <a:r>
+                        <a:rPr lang="en-US" sz="1800" b="1" baseline="0" dirty="0">
+                          <a:latin typeface="Courier New" panose="02070309020205020404" pitchFamily="49" charset="0"/>
+                          <a:cs typeface="Courier New" panose="02070309020205020404" pitchFamily="49" charset="0"/>
+                        </a:rPr>
+                        <a:t>(3)</a:t>
+                      </a:r>
+                    </a:p>
+                    <a:p>
+                      <a:pPr marL="266700" marR="0" lvl="0" indent="-266700" algn="l" defTabSz="914400" rtl="0" eaLnBrk="1" fontAlgn="auto" latinLnBrk="0" hangingPunct="1">
+                        <a:lnSpc>
+                          <a:spcPct val="100000"/>
+                        </a:lnSpc>
+                        <a:spcBef>
+                          <a:spcPts val="0"/>
+                        </a:spcBef>
+                        <a:spcAft>
+                          <a:spcPts val="0"/>
+                        </a:spcAft>
+                        <a:buClr>
+                          <a:schemeClr val="accent1">
+                            <a:lumMod val="50000"/>
+                          </a:schemeClr>
+                        </a:buClr>
+                        <a:buSzPct val="120000"/>
+                        <a:buFont typeface="Courier New" panose="02070309020205020404" pitchFamily="49" charset="0"/>
+                        <a:buChar char="|"/>
+                        <a:tabLst/>
+                        <a:defRPr/>
+                      </a:pPr>
+                      <a:r>
+                        <a:rPr lang="en-US" sz="1800" b="1" baseline="0" dirty="0">
+                          <a:latin typeface="Courier New" panose="02070309020205020404" pitchFamily="49" charset="0"/>
+                          <a:cs typeface="Courier New" panose="02070309020205020404" pitchFamily="49" charset="0"/>
+                        </a:rPr>
+                        <a:t>[('a', 5), ('b', 2), ('r', 2)]</a:t>
+                      </a:r>
+                      <a:endParaRPr lang="pt-BR" sz="1800" b="1" baseline="0" dirty="0">
+                        <a:latin typeface="Courier New" panose="02070309020205020404" pitchFamily="49" charset="0"/>
+                        <a:cs typeface="Courier New" panose="02070309020205020404" pitchFamily="49" charset="0"/>
+                      </a:endParaRPr>
+                    </a:p>
+                    <a:p>
+                      <a:pPr marL="266700" indent="-266700">
+                        <a:buClr>
+                          <a:srgbClr val="C00000"/>
+                        </a:buClr>
+                        <a:buSzPct val="100000"/>
+                        <a:buFont typeface="Courier New" panose="02070309020205020404" pitchFamily="49" charset="0"/>
+                        <a:buChar char="&gt;"/>
+                      </a:pPr>
+                      <a:r>
+                        <a:rPr lang="en-US" sz="1800" b="1" baseline="0" dirty="0">
+                          <a:latin typeface="Courier New" panose="02070309020205020404" pitchFamily="49" charset="0"/>
+                          <a:cs typeface="Courier New" panose="02070309020205020404" pitchFamily="49" charset="0"/>
+                        </a:rPr>
+                        <a:t>f</a:t>
+                      </a:r>
+                      <a:r>
+                        <a:rPr lang="da-DK" sz="1800" b="1" baseline="0" dirty="0">
+                          <a:latin typeface="Courier New" panose="02070309020205020404" pitchFamily="49" charset="0"/>
+                          <a:cs typeface="Courier New" panose="02070309020205020404" pitchFamily="49" charset="0"/>
+                        </a:rPr>
+                        <a:t>q['x'] += 5  </a:t>
+                      </a:r>
+                      <a:r>
+                        <a:rPr lang="da-DK" sz="1800" b="1" baseline="0" dirty="0">
+                          <a:solidFill>
+                            <a:schemeClr val="bg1">
+                              <a:lumMod val="50000"/>
+                            </a:schemeClr>
+                          </a:solidFill>
+                          <a:latin typeface="Courier New" panose="02070309020205020404" pitchFamily="49" charset="0"/>
+                          <a:cs typeface="Courier New" panose="02070309020205020404" pitchFamily="49" charset="0"/>
+                        </a:rPr>
+                        <a:t># </a:t>
+                      </a:r>
+                      <a:r>
+                        <a:rPr lang="da-DK" sz="1800" b="1" baseline="0" dirty="0" err="1">
+                          <a:solidFill>
+                            <a:schemeClr val="bg1">
+                              <a:lumMod val="50000"/>
+                            </a:schemeClr>
+                          </a:solidFill>
+                          <a:latin typeface="Courier New" panose="02070309020205020404" pitchFamily="49" charset="0"/>
+                          <a:cs typeface="Courier New" panose="02070309020205020404" pitchFamily="49" charset="0"/>
+                        </a:rPr>
+                        <a:t>increase</a:t>
+                      </a:r>
+                      <a:r>
+                        <a:rPr lang="da-DK" sz="1800" b="1" baseline="0" dirty="0">
+                          <a:solidFill>
+                            <a:schemeClr val="bg1">
+                              <a:lumMod val="50000"/>
+                            </a:schemeClr>
+                          </a:solidFill>
+                          <a:latin typeface="Courier New" panose="02070309020205020404" pitchFamily="49" charset="0"/>
+                          <a:cs typeface="Courier New" panose="02070309020205020404" pitchFamily="49" charset="0"/>
+                        </a:rPr>
+                        <a:t> </a:t>
+                      </a:r>
+                      <a:r>
+                        <a:rPr lang="da-DK" sz="1800" b="1" baseline="0" dirty="0" err="1">
+                          <a:solidFill>
+                            <a:schemeClr val="bg1">
+                              <a:lumMod val="50000"/>
+                            </a:schemeClr>
+                          </a:solidFill>
+                          <a:latin typeface="Courier New" panose="02070309020205020404" pitchFamily="49" charset="0"/>
+                          <a:cs typeface="Courier New" panose="02070309020205020404" pitchFamily="49" charset="0"/>
+                        </a:rPr>
+                        <a:t>count</a:t>
+                      </a:r>
+                      <a:r>
+                        <a:rPr lang="da-DK" sz="1800" b="1" baseline="0" dirty="0">
+                          <a:solidFill>
+                            <a:schemeClr val="bg1">
+                              <a:lumMod val="50000"/>
+                            </a:schemeClr>
+                          </a:solidFill>
+                          <a:latin typeface="Courier New" panose="02070309020205020404" pitchFamily="49" charset="0"/>
+                          <a:cs typeface="Courier New" panose="02070309020205020404" pitchFamily="49" charset="0"/>
+                        </a:rPr>
+                        <a:t> of 'x', </a:t>
+                      </a:r>
+                      <a:r>
+                        <a:rPr lang="da-DK" sz="1800" b="1" baseline="0" dirty="0" err="1">
+                          <a:solidFill>
+                            <a:schemeClr val="bg1">
+                              <a:lumMod val="50000"/>
+                            </a:schemeClr>
+                          </a:solidFill>
+                          <a:latin typeface="Courier New" panose="02070309020205020404" pitchFamily="49" charset="0"/>
+                          <a:cs typeface="Courier New" panose="02070309020205020404" pitchFamily="49" charset="0"/>
+                        </a:rPr>
+                        <a:t>also</a:t>
+                      </a:r>
+                      <a:r>
+                        <a:rPr lang="da-DK" sz="1800" b="1" baseline="0" dirty="0">
+                          <a:solidFill>
+                            <a:schemeClr val="bg1">
+                              <a:lumMod val="50000"/>
+                            </a:schemeClr>
+                          </a:solidFill>
+                          <a:latin typeface="Courier New" panose="02070309020205020404" pitchFamily="49" charset="0"/>
+                          <a:cs typeface="Courier New" panose="02070309020205020404" pitchFamily="49" charset="0"/>
+                        </a:rPr>
+                        <a:t> valid if 'x' not in </a:t>
+                      </a:r>
+                      <a:r>
+                        <a:rPr lang="da-DK" sz="1800" b="1" baseline="0" dirty="0" err="1">
+                          <a:solidFill>
+                            <a:schemeClr val="bg1">
+                              <a:lumMod val="50000"/>
+                            </a:schemeClr>
+                          </a:solidFill>
+                          <a:latin typeface="Courier New" panose="02070309020205020404" pitchFamily="49" charset="0"/>
+                          <a:cs typeface="Courier New" panose="02070309020205020404" pitchFamily="49" charset="0"/>
+                        </a:rPr>
+                        <a:t>Counter</a:t>
+                      </a:r>
+                      <a:r>
+                        <a:rPr lang="da-DK" sz="1800" b="1" baseline="0" dirty="0">
+                          <a:solidFill>
+                            <a:schemeClr val="bg1">
+                              <a:lumMod val="50000"/>
+                            </a:schemeClr>
+                          </a:solidFill>
+                          <a:latin typeface="Courier New" panose="02070309020205020404" pitchFamily="49" charset="0"/>
+                          <a:cs typeface="Courier New" panose="02070309020205020404" pitchFamily="49" charset="0"/>
+                        </a:rPr>
+                        <a:t> </a:t>
+                      </a:r>
+                      <a:r>
+                        <a:rPr lang="da-DK" sz="1800" b="1" baseline="0" dirty="0" err="1">
+                          <a:solidFill>
+                            <a:schemeClr val="bg1">
+                              <a:lumMod val="50000"/>
+                            </a:schemeClr>
+                          </a:solidFill>
+                          <a:latin typeface="Courier New" panose="02070309020205020404" pitchFamily="49" charset="0"/>
+                          <a:cs typeface="Courier New" panose="02070309020205020404" pitchFamily="49" charset="0"/>
+                        </a:rPr>
+                        <a:t>yet</a:t>
+                      </a:r>
+                      <a:endParaRPr lang="da-DK" sz="1800" b="1" baseline="0" dirty="0">
+                        <a:solidFill>
+                          <a:schemeClr val="tx1"/>
+                        </a:solidFill>
+                        <a:latin typeface="Courier New" panose="02070309020205020404" pitchFamily="49" charset="0"/>
+                        <a:cs typeface="Courier New" panose="02070309020205020404" pitchFamily="49" charset="0"/>
+                      </a:endParaRPr>
+                    </a:p>
+                    <a:p>
+                      <a:pPr marL="266700" indent="-266700">
+                        <a:buClr>
+                          <a:srgbClr val="C00000"/>
+                        </a:buClr>
+                        <a:buSzPct val="100000"/>
+                        <a:buFont typeface="Courier New" panose="02070309020205020404" pitchFamily="49" charset="0"/>
+                        <a:buChar char="&gt;"/>
+                      </a:pPr>
+                      <a:r>
+                        <a:rPr lang="pt-BR" sz="1800" b="1" baseline="0" dirty="0">
+                          <a:solidFill>
+                            <a:srgbClr val="C00000"/>
+                          </a:solidFill>
+                          <a:latin typeface="Courier New" panose="02070309020205020404" pitchFamily="49" charset="0"/>
+                          <a:cs typeface="Courier New" panose="02070309020205020404" pitchFamily="49" charset="0"/>
+                        </a:rPr>
+                        <a:t>Counter</a:t>
+                      </a:r>
+                      <a:r>
+                        <a:rPr lang="pt-BR" sz="1800" b="1" baseline="0" dirty="0">
+                          <a:solidFill>
+                            <a:schemeClr val="tx1"/>
+                          </a:solidFill>
+                          <a:latin typeface="Courier New" panose="02070309020205020404" pitchFamily="49" charset="0"/>
+                          <a:cs typeface="Courier New" panose="02070309020205020404" pitchFamily="49" charset="0"/>
+                        </a:rPr>
+                        <a:t>('aaabbbcc') </a:t>
+                      </a:r>
+                      <a:r>
+                        <a:rPr lang="pt-BR" sz="1800" b="1" baseline="0" dirty="0">
+                          <a:solidFill>
+                            <a:srgbClr val="C00000"/>
+                          </a:solidFill>
+                          <a:latin typeface="Courier New" panose="02070309020205020404" pitchFamily="49" charset="0"/>
+                          <a:cs typeface="Courier New" panose="02070309020205020404" pitchFamily="49" charset="0"/>
+                        </a:rPr>
+                        <a:t>-</a:t>
+                      </a:r>
+                      <a:r>
+                        <a:rPr lang="pt-BR" sz="1800" b="1" baseline="0" dirty="0">
+                          <a:solidFill>
+                            <a:schemeClr val="tx1"/>
+                          </a:solidFill>
+                          <a:latin typeface="Courier New" panose="02070309020205020404" pitchFamily="49" charset="0"/>
+                          <a:cs typeface="Courier New" panose="02070309020205020404" pitchFamily="49" charset="0"/>
+                        </a:rPr>
+                        <a:t> </a:t>
+                      </a:r>
+                      <a:r>
+                        <a:rPr lang="pt-BR" sz="1800" b="1" baseline="0" dirty="0">
+                          <a:solidFill>
+                            <a:srgbClr val="C00000"/>
+                          </a:solidFill>
+                          <a:latin typeface="Courier New" panose="02070309020205020404" pitchFamily="49" charset="0"/>
+                          <a:cs typeface="Courier New" panose="02070309020205020404" pitchFamily="49" charset="0"/>
+                        </a:rPr>
+                        <a:t>Counter</a:t>
+                      </a:r>
+                      <a:r>
+                        <a:rPr lang="pt-BR" sz="1800" b="1" baseline="0" dirty="0">
+                          <a:solidFill>
+                            <a:schemeClr val="tx1"/>
+                          </a:solidFill>
+                          <a:latin typeface="Courier New" panose="02070309020205020404" pitchFamily="49" charset="0"/>
+                          <a:cs typeface="Courier New" panose="02070309020205020404" pitchFamily="49" charset="0"/>
+                        </a:rPr>
+                        <a:t>('aabdd')  </a:t>
+                      </a:r>
+                      <a:r>
+                        <a:rPr lang="pt-BR" sz="1800" b="1" baseline="0" dirty="0">
+                          <a:solidFill>
+                            <a:schemeClr val="bg1">
+                              <a:lumMod val="50000"/>
+                            </a:schemeClr>
+                          </a:solidFill>
+                          <a:latin typeface="Courier New" panose="02070309020205020404" pitchFamily="49" charset="0"/>
+                          <a:cs typeface="Courier New" panose="02070309020205020404" pitchFamily="49" charset="0"/>
+                        </a:rPr>
+                        <a:t># counters can be subtracted</a:t>
+                      </a:r>
+                      <a:endParaRPr lang="en-US" sz="1800" b="1" baseline="0" dirty="0">
+                        <a:solidFill>
+                          <a:schemeClr val="bg1">
+                            <a:lumMod val="50000"/>
+                          </a:schemeClr>
+                        </a:solidFill>
+                        <a:latin typeface="Courier New" panose="02070309020205020404" pitchFamily="49" charset="0"/>
+                        <a:cs typeface="Courier New" panose="02070309020205020404" pitchFamily="49" charset="0"/>
+                      </a:endParaRPr>
+                    </a:p>
+                    <a:p>
+                      <a:pPr marL="266700" marR="0" lvl="0" indent="-266700" algn="l" defTabSz="914400" rtl="0" eaLnBrk="1" fontAlgn="auto" latinLnBrk="0" hangingPunct="1">
+                        <a:lnSpc>
+                          <a:spcPct val="100000"/>
+                        </a:lnSpc>
+                        <a:spcBef>
+                          <a:spcPts val="0"/>
+                        </a:spcBef>
+                        <a:spcAft>
+                          <a:spcPts val="0"/>
+                        </a:spcAft>
+                        <a:buClr>
+                          <a:schemeClr val="accent1">
+                            <a:lumMod val="50000"/>
+                          </a:schemeClr>
+                        </a:buClr>
+                        <a:buSzPct val="120000"/>
+                        <a:buFont typeface="Courier New" panose="02070309020205020404" pitchFamily="49" charset="0"/>
+                        <a:buChar char="|"/>
+                        <a:tabLst/>
+                        <a:defRPr/>
+                      </a:pPr>
+                      <a:r>
+                        <a:rPr lang="pt-BR" sz="1800" b="1" baseline="0" dirty="0">
+                          <a:solidFill>
+                            <a:srgbClr val="C00000"/>
+                          </a:solidFill>
+                          <a:latin typeface="Courier New" panose="02070309020205020404" pitchFamily="49" charset="0"/>
+                          <a:cs typeface="Courier New" panose="02070309020205020404" pitchFamily="49" charset="0"/>
+                        </a:rPr>
+                        <a:t>Counter</a:t>
+                      </a:r>
+                      <a:r>
+                        <a:rPr lang="pt-BR" sz="1800" b="1" baseline="0" dirty="0">
+                          <a:solidFill>
+                            <a:schemeClr val="tx1"/>
+                          </a:solidFill>
+                          <a:latin typeface="Courier New" panose="02070309020205020404" pitchFamily="49" charset="0"/>
+                          <a:cs typeface="Courier New" panose="02070309020205020404" pitchFamily="49" charset="0"/>
+                        </a:rPr>
+                        <a:t>({'b': 2, 'c': 2, 'a': 1})</a:t>
+                      </a:r>
+                    </a:p>
+                    <a:p>
+                      <a:pPr marL="266700" indent="-266700">
+                        <a:buClr>
+                          <a:srgbClr val="C00000"/>
+                        </a:buClr>
+                        <a:buSzPct val="100000"/>
+                        <a:buFont typeface="Courier New" panose="02070309020205020404" pitchFamily="49" charset="0"/>
+                        <a:buChar char="&gt;"/>
+                      </a:pPr>
+                      <a:r>
+                        <a:rPr lang="en-US" sz="1800" b="1" baseline="0" dirty="0">
+                          <a:solidFill>
+                            <a:srgbClr val="C00000"/>
+                          </a:solidFill>
+                          <a:latin typeface="Courier New" panose="02070309020205020404" pitchFamily="49" charset="0"/>
+                          <a:cs typeface="Courier New" panose="02070309020205020404" pitchFamily="49" charset="0"/>
+                        </a:rPr>
+                        <a:t>Counter</a:t>
+                      </a:r>
+                      <a:r>
+                        <a:rPr lang="en-US" sz="1800" b="1" baseline="0" dirty="0">
+                          <a:solidFill>
+                            <a:schemeClr val="tx1"/>
+                          </a:solidFill>
+                          <a:latin typeface="Courier New" panose="02070309020205020404" pitchFamily="49" charset="0"/>
+                          <a:cs typeface="Courier New" panose="02070309020205020404" pitchFamily="49" charset="0"/>
+                        </a:rPr>
+                        <a:t>([1, 2, 1, 3, 4, 5]) </a:t>
+                      </a:r>
+                      <a:r>
+                        <a:rPr lang="en-US" sz="1800" b="1" baseline="0" dirty="0">
+                          <a:solidFill>
+                            <a:srgbClr val="C00000"/>
+                          </a:solidFill>
+                          <a:latin typeface="Courier New" panose="02070309020205020404" pitchFamily="49" charset="0"/>
+                          <a:cs typeface="Courier New" panose="02070309020205020404" pitchFamily="49" charset="0"/>
+                        </a:rPr>
+                        <a:t>+</a:t>
+                      </a:r>
+                      <a:r>
+                        <a:rPr lang="en-US" sz="1800" b="1" baseline="0" dirty="0">
+                          <a:solidFill>
+                            <a:schemeClr val="tx1"/>
+                          </a:solidFill>
+                          <a:latin typeface="Courier New" panose="02070309020205020404" pitchFamily="49" charset="0"/>
+                          <a:cs typeface="Courier New" panose="02070309020205020404" pitchFamily="49" charset="0"/>
+                        </a:rPr>
+                        <a:t> </a:t>
+                      </a:r>
+                      <a:r>
+                        <a:rPr lang="en-US" sz="1800" b="1" baseline="0" dirty="0">
+                          <a:solidFill>
+                            <a:srgbClr val="C00000"/>
+                          </a:solidFill>
+                          <a:latin typeface="Courier New" panose="02070309020205020404" pitchFamily="49" charset="0"/>
+                          <a:cs typeface="Courier New" panose="02070309020205020404" pitchFamily="49" charset="0"/>
+                        </a:rPr>
+                        <a:t>Counter</a:t>
+                      </a:r>
+                      <a:r>
+                        <a:rPr lang="en-US" sz="1800" b="1" baseline="0" dirty="0">
+                          <a:solidFill>
+                            <a:schemeClr val="tx1"/>
+                          </a:solidFill>
+                          <a:latin typeface="Courier New" panose="02070309020205020404" pitchFamily="49" charset="0"/>
+                          <a:cs typeface="Courier New" panose="02070309020205020404" pitchFamily="49" charset="0"/>
+                        </a:rPr>
+                        <a:t>([3, 3, 3])  </a:t>
+                      </a:r>
+                      <a:r>
+                        <a:rPr lang="pt-BR" sz="1800" b="1" baseline="0" dirty="0">
+                          <a:solidFill>
+                            <a:schemeClr val="bg1">
+                              <a:lumMod val="50000"/>
+                            </a:schemeClr>
+                          </a:solidFill>
+                          <a:latin typeface="Courier New" panose="02070309020205020404" pitchFamily="49" charset="0"/>
+                          <a:cs typeface="Courier New" panose="02070309020205020404" pitchFamily="49" charset="0"/>
+                        </a:rPr>
+                        <a:t># counters can be added</a:t>
+                      </a:r>
+                      <a:endParaRPr lang="en-US" sz="1800" b="1" baseline="0" dirty="0">
+                        <a:solidFill>
+                          <a:schemeClr val="bg1">
+                            <a:lumMod val="50000"/>
+                          </a:schemeClr>
+                        </a:solidFill>
+                        <a:latin typeface="Courier New" panose="02070309020205020404" pitchFamily="49" charset="0"/>
+                        <a:cs typeface="Courier New" panose="02070309020205020404" pitchFamily="49" charset="0"/>
+                      </a:endParaRPr>
+                    </a:p>
+                    <a:p>
+                      <a:pPr marL="266700" marR="0" lvl="0" indent="-266700" algn="l" defTabSz="914400" rtl="0" eaLnBrk="1" fontAlgn="auto" latinLnBrk="0" hangingPunct="1">
+                        <a:lnSpc>
+                          <a:spcPct val="100000"/>
+                        </a:lnSpc>
+                        <a:spcBef>
+                          <a:spcPts val="0"/>
+                        </a:spcBef>
+                        <a:spcAft>
+                          <a:spcPts val="600"/>
+                        </a:spcAft>
+                        <a:buClr>
+                          <a:schemeClr val="accent1">
+                            <a:lumMod val="50000"/>
+                          </a:schemeClr>
+                        </a:buClr>
+                        <a:buSzPct val="120000"/>
+                        <a:buFont typeface="Courier New" panose="02070309020205020404" pitchFamily="49" charset="0"/>
+                        <a:buChar char="|"/>
+                        <a:tabLst/>
+                        <a:defRPr/>
+                      </a:pPr>
+                      <a:r>
+                        <a:rPr lang="pt-BR" sz="1800" b="1" baseline="0" dirty="0">
+                          <a:solidFill>
+                            <a:srgbClr val="C00000"/>
+                          </a:solidFill>
+                          <a:latin typeface="Courier New" panose="02070309020205020404" pitchFamily="49" charset="0"/>
+                          <a:cs typeface="Courier New" panose="02070309020205020404" pitchFamily="49" charset="0"/>
+                        </a:rPr>
+                        <a:t>Counter</a:t>
+                      </a:r>
+                      <a:r>
+                        <a:rPr lang="pt-BR" sz="1800" b="1" baseline="0" dirty="0">
+                          <a:solidFill>
+                            <a:srgbClr val="000000"/>
+                          </a:solidFill>
+                          <a:latin typeface="Courier New" panose="02070309020205020404" pitchFamily="49" charset="0"/>
+                          <a:cs typeface="Courier New" panose="02070309020205020404" pitchFamily="49" charset="0"/>
+                        </a:rPr>
+                        <a:t>(</a:t>
+                      </a:r>
+                      <a:r>
+                        <a:rPr lang="pt-BR" sz="1800" b="1" baseline="0" dirty="0">
+                          <a:solidFill>
+                            <a:schemeClr val="tx1"/>
+                          </a:solidFill>
+                          <a:latin typeface="Courier New" panose="02070309020205020404" pitchFamily="49" charset="0"/>
+                          <a:cs typeface="Courier New" panose="02070309020205020404" pitchFamily="49" charset="0"/>
+                        </a:rPr>
+                        <a:t>{3: 4, 1: 2, 2: 1, 4: 1, 5: 1})</a:t>
+                      </a:r>
+                    </a:p>
+                    <a:p>
+                      <a:pPr marL="266700" indent="-266700">
+                        <a:buClr>
+                          <a:srgbClr val="C00000"/>
+                        </a:buClr>
+                        <a:buSzPct val="100000"/>
+                        <a:buFont typeface="Courier New" panose="02070309020205020404" pitchFamily="49" charset="0"/>
+                        <a:buChar char="&gt;"/>
+                      </a:pPr>
+                      <a:r>
+                        <a:rPr lang="en-US" sz="1800" b="1" baseline="0" dirty="0">
+                          <a:solidFill>
+                            <a:schemeClr val="tx1"/>
+                          </a:solidFill>
+                          <a:latin typeface="Courier New" panose="02070309020205020404" pitchFamily="49" charset="0"/>
+                          <a:cs typeface="Courier New" panose="02070309020205020404" pitchFamily="49" charset="0"/>
+                        </a:rPr>
+                        <a:t>T = '</a:t>
+                      </a:r>
+                      <a:r>
+                        <a:rPr lang="en-US" sz="1800" b="1" baseline="0" dirty="0" err="1">
+                          <a:solidFill>
+                            <a:schemeClr val="tx1"/>
+                          </a:solidFill>
+                          <a:latin typeface="Courier New" panose="02070309020205020404" pitchFamily="49" charset="0"/>
+                          <a:cs typeface="Courier New" panose="02070309020205020404" pitchFamily="49" charset="0"/>
+                        </a:rPr>
+                        <a:t>AfD</a:t>
+                      </a:r>
+                      <a:r>
+                        <a:rPr lang="en-US" sz="1800" b="1" baseline="0" dirty="0">
+                          <a:solidFill>
+                            <a:schemeClr val="tx1"/>
+                          </a:solidFill>
+                          <a:latin typeface="Courier New" panose="02070309020205020404" pitchFamily="49" charset="0"/>
+                          <a:cs typeface="Courier New" panose="02070309020205020404" pitchFamily="49" charset="0"/>
+                        </a:rPr>
+                        <a:t> </a:t>
+                      </a:r>
+                      <a:r>
+                        <a:rPr lang="en-US" sz="1800" b="1" baseline="0" dirty="0" err="1">
+                          <a:solidFill>
+                            <a:schemeClr val="tx1"/>
+                          </a:solidFill>
+                          <a:latin typeface="Courier New" panose="02070309020205020404" pitchFamily="49" charset="0"/>
+                          <a:cs typeface="Courier New" panose="02070309020205020404" pitchFamily="49" charset="0"/>
+                        </a:rPr>
+                        <a:t>adsf</a:t>
+                      </a:r>
+                      <a:r>
+                        <a:rPr lang="en-US" sz="1800" b="1" baseline="0" dirty="0">
+                          <a:solidFill>
+                            <a:schemeClr val="tx1"/>
+                          </a:solidFill>
+                          <a:latin typeface="Courier New" panose="02070309020205020404" pitchFamily="49" charset="0"/>
+                          <a:cs typeface="Courier New" panose="02070309020205020404" pitchFamily="49" charset="0"/>
+                        </a:rPr>
+                        <a:t> </a:t>
+                      </a:r>
+                      <a:r>
+                        <a:rPr lang="en-US" sz="1800" b="1" baseline="0" dirty="0" err="1">
+                          <a:solidFill>
+                            <a:schemeClr val="tx1"/>
+                          </a:solidFill>
+                          <a:latin typeface="Courier New" panose="02070309020205020404" pitchFamily="49" charset="0"/>
+                          <a:cs typeface="Courier New" panose="02070309020205020404" pitchFamily="49" charset="0"/>
+                        </a:rPr>
+                        <a:t>dsa</a:t>
+                      </a:r>
+                      <a:r>
+                        <a:rPr lang="en-US" sz="1800" b="1" baseline="0" dirty="0">
+                          <a:solidFill>
+                            <a:schemeClr val="tx1"/>
+                          </a:solidFill>
+                          <a:latin typeface="Courier New" panose="02070309020205020404" pitchFamily="49" charset="0"/>
+                          <a:cs typeface="Courier New" panose="02070309020205020404" pitchFamily="49" charset="0"/>
+                        </a:rPr>
+                        <a:t> f </a:t>
+                      </a:r>
+                      <a:r>
+                        <a:rPr lang="en-US" sz="1800" b="1" baseline="0" dirty="0" err="1">
+                          <a:solidFill>
+                            <a:schemeClr val="tx1"/>
+                          </a:solidFill>
+                          <a:latin typeface="Courier New" panose="02070309020205020404" pitchFamily="49" charset="0"/>
+                          <a:cs typeface="Courier New" panose="02070309020205020404" pitchFamily="49" charset="0"/>
+                        </a:rPr>
+                        <a:t>dsaf</a:t>
+                      </a:r>
+                      <a:r>
+                        <a:rPr lang="en-US" sz="1800" b="1" baseline="0" dirty="0">
+                          <a:solidFill>
+                            <a:schemeClr val="tx1"/>
+                          </a:solidFill>
+                          <a:latin typeface="Courier New" panose="02070309020205020404" pitchFamily="49" charset="0"/>
+                          <a:cs typeface="Courier New" panose="02070309020205020404" pitchFamily="49" charset="0"/>
+                        </a:rPr>
+                        <a:t> </a:t>
+                      </a:r>
+                      <a:r>
+                        <a:rPr lang="en-US" sz="1800" b="1" baseline="0" dirty="0" err="1">
+                          <a:solidFill>
+                            <a:schemeClr val="tx1"/>
+                          </a:solidFill>
+                          <a:latin typeface="Courier New" panose="02070309020205020404" pitchFamily="49" charset="0"/>
+                          <a:cs typeface="Courier New" panose="02070309020205020404" pitchFamily="49" charset="0"/>
+                        </a:rPr>
+                        <a:t>daf</a:t>
+                      </a:r>
+                      <a:r>
+                        <a:rPr lang="en-US" sz="1800" b="1" baseline="0" dirty="0">
+                          <a:solidFill>
+                            <a:schemeClr val="tx1"/>
+                          </a:solidFill>
+                          <a:latin typeface="Courier New" panose="02070309020205020404" pitchFamily="49" charset="0"/>
+                          <a:cs typeface="Courier New" panose="02070309020205020404" pitchFamily="49" charset="0"/>
+                        </a:rPr>
+                        <a:t> </a:t>
+                      </a:r>
+                      <a:r>
+                        <a:rPr lang="en-US" sz="1800" b="1" baseline="0" dirty="0" err="1">
+                          <a:solidFill>
+                            <a:schemeClr val="tx1"/>
+                          </a:solidFill>
+                          <a:latin typeface="Courier New" panose="02070309020205020404" pitchFamily="49" charset="0"/>
+                          <a:cs typeface="Courier New" panose="02070309020205020404" pitchFamily="49" charset="0"/>
+                        </a:rPr>
+                        <a:t>dsaf</a:t>
+                      </a:r>
+                      <a:r>
+                        <a:rPr lang="en-US" sz="1800" b="1" baseline="0" dirty="0">
+                          <a:solidFill>
+                            <a:schemeClr val="tx1"/>
+                          </a:solidFill>
+                          <a:latin typeface="Courier New" panose="02070309020205020404" pitchFamily="49" charset="0"/>
+                          <a:cs typeface="Courier New" panose="02070309020205020404" pitchFamily="49" charset="0"/>
+                        </a:rPr>
+                        <a:t> DSA </a:t>
+                      </a:r>
+                      <a:r>
+                        <a:rPr lang="en-US" sz="1800" b="1" baseline="0" dirty="0" err="1">
+                          <a:solidFill>
+                            <a:schemeClr val="tx1"/>
+                          </a:solidFill>
+                          <a:latin typeface="Courier New" panose="02070309020205020404" pitchFamily="49" charset="0"/>
+                          <a:cs typeface="Courier New" panose="02070309020205020404" pitchFamily="49" charset="0"/>
+                        </a:rPr>
+                        <a:t>fda</a:t>
+                      </a:r>
+                      <a:r>
+                        <a:rPr lang="en-US" sz="1800" b="1" baseline="0" dirty="0">
+                          <a:solidFill>
+                            <a:schemeClr val="tx1"/>
+                          </a:solidFill>
+                          <a:latin typeface="Courier New" panose="02070309020205020404" pitchFamily="49" charset="0"/>
+                          <a:cs typeface="Courier New" panose="02070309020205020404" pitchFamily="49" charset="0"/>
+                        </a:rPr>
+                        <a:t> f SA </a:t>
+                      </a:r>
+                      <a:r>
+                        <a:rPr lang="en-US" sz="1800" b="1" baseline="0" dirty="0" err="1">
+                          <a:solidFill>
+                            <a:schemeClr val="tx1"/>
+                          </a:solidFill>
+                          <a:latin typeface="Courier New" panose="02070309020205020404" pitchFamily="49" charset="0"/>
+                          <a:cs typeface="Courier New" panose="02070309020205020404" pitchFamily="49" charset="0"/>
+                        </a:rPr>
+                        <a:t>dsa</a:t>
+                      </a:r>
+                      <a:r>
+                        <a:rPr lang="en-US" sz="1800" b="1" baseline="0" dirty="0">
+                          <a:solidFill>
+                            <a:schemeClr val="tx1"/>
+                          </a:solidFill>
+                          <a:latin typeface="Courier New" panose="02070309020205020404" pitchFamily="49" charset="0"/>
+                          <a:cs typeface="Courier New" panose="02070309020205020404" pitchFamily="49" charset="0"/>
+                        </a:rPr>
+                        <a:t> f </a:t>
+                      </a:r>
+                      <a:r>
+                        <a:rPr lang="en-US" sz="1800" b="1" baseline="0" dirty="0" err="1">
+                          <a:solidFill>
+                            <a:schemeClr val="tx1"/>
+                          </a:solidFill>
+                          <a:latin typeface="Courier New" panose="02070309020205020404" pitchFamily="49" charset="0"/>
+                          <a:cs typeface="Courier New" panose="02070309020205020404" pitchFamily="49" charset="0"/>
+                        </a:rPr>
+                        <a:t>dsa</a:t>
+                      </a:r>
+                      <a:r>
+                        <a:rPr lang="en-US" sz="1800" b="1" baseline="0" dirty="0">
+                          <a:solidFill>
+                            <a:schemeClr val="tx1"/>
+                          </a:solidFill>
+                          <a:latin typeface="Courier New" panose="02070309020205020404" pitchFamily="49" charset="0"/>
+                          <a:cs typeface="Courier New" panose="02070309020205020404" pitchFamily="49" charset="0"/>
+                        </a:rPr>
+                        <a:t> </a:t>
+                      </a:r>
+                      <a:r>
+                        <a:rPr lang="en-US" sz="1800" b="1" baseline="0" dirty="0" err="1">
+                          <a:solidFill>
+                            <a:schemeClr val="tx1"/>
+                          </a:solidFill>
+                          <a:latin typeface="Courier New" panose="02070309020205020404" pitchFamily="49" charset="0"/>
+                          <a:cs typeface="Courier New" panose="02070309020205020404" pitchFamily="49" charset="0"/>
+                        </a:rPr>
+                        <a:t>fdsa</a:t>
+                      </a:r>
+                      <a:r>
+                        <a:rPr lang="en-US" sz="1800" b="1" baseline="0" dirty="0">
+                          <a:solidFill>
+                            <a:schemeClr val="tx1"/>
+                          </a:solidFill>
+                          <a:latin typeface="Courier New" panose="02070309020205020404" pitchFamily="49" charset="0"/>
+                          <a:cs typeface="Courier New" panose="02070309020205020404" pitchFamily="49" charset="0"/>
+                        </a:rPr>
+                        <a:t> f </a:t>
+                      </a:r>
+                      <a:r>
+                        <a:rPr lang="en-US" sz="1800" b="1" baseline="0" dirty="0" err="1">
+                          <a:solidFill>
+                            <a:schemeClr val="tx1"/>
+                          </a:solidFill>
+                          <a:latin typeface="Courier New" panose="02070309020205020404" pitchFamily="49" charset="0"/>
+                          <a:cs typeface="Courier New" panose="02070309020205020404" pitchFamily="49" charset="0"/>
+                        </a:rPr>
+                        <a:t>dsAf</a:t>
+                      </a:r>
+                      <a:r>
+                        <a:rPr lang="en-US" sz="1800" b="1" baseline="0" dirty="0">
+                          <a:solidFill>
+                            <a:schemeClr val="tx1"/>
+                          </a:solidFill>
+                          <a:latin typeface="Courier New" panose="02070309020205020404" pitchFamily="49" charset="0"/>
+                          <a:cs typeface="Courier New" panose="02070309020205020404" pitchFamily="49" charset="0"/>
+                        </a:rPr>
+                        <a:t> </a:t>
+                      </a:r>
+                      <a:r>
+                        <a:rPr lang="en-US" sz="1800" b="1" baseline="0" dirty="0" err="1">
+                          <a:solidFill>
+                            <a:schemeClr val="tx1"/>
+                          </a:solidFill>
+                          <a:latin typeface="Courier New" panose="02070309020205020404" pitchFamily="49" charset="0"/>
+                          <a:cs typeface="Courier New" panose="02070309020205020404" pitchFamily="49" charset="0"/>
+                        </a:rPr>
+                        <a:t>sAf</a:t>
+                      </a:r>
+                      <a:r>
+                        <a:rPr lang="en-US" sz="1800" b="1" baseline="0" dirty="0">
+                          <a:solidFill>
+                            <a:schemeClr val="tx1"/>
+                          </a:solidFill>
+                          <a:latin typeface="Courier New" panose="02070309020205020404" pitchFamily="49" charset="0"/>
+                          <a:cs typeface="Courier New" panose="02070309020205020404" pitchFamily="49" charset="0"/>
+                        </a:rPr>
+                        <a:t> f </a:t>
+                      </a:r>
+                      <a:r>
+                        <a:rPr lang="en-US" sz="1800" b="1" baseline="0" dirty="0" err="1">
+                          <a:solidFill>
+                            <a:schemeClr val="tx1"/>
+                          </a:solidFill>
+                          <a:latin typeface="Courier New" panose="02070309020205020404" pitchFamily="49" charset="0"/>
+                          <a:cs typeface="Courier New" panose="02070309020205020404" pitchFamily="49" charset="0"/>
+                        </a:rPr>
+                        <a:t>dsaf</a:t>
+                      </a:r>
+                      <a:r>
+                        <a:rPr lang="en-US" sz="1800" b="1" baseline="0" dirty="0">
+                          <a:solidFill>
+                            <a:schemeClr val="tx1"/>
+                          </a:solidFill>
+                          <a:latin typeface="Courier New" panose="02070309020205020404" pitchFamily="49" charset="0"/>
+                          <a:cs typeface="Courier New" panose="02070309020205020404" pitchFamily="49" charset="0"/>
+                        </a:rPr>
+                        <a:t>'</a:t>
+                      </a:r>
+                    </a:p>
+                    <a:p>
+                      <a:pPr marL="266700" indent="-266700">
+                        <a:buClr>
+                          <a:srgbClr val="C00000"/>
+                        </a:buClr>
+                        <a:buSzPct val="100000"/>
+                        <a:buFont typeface="Courier New" panose="02070309020205020404" pitchFamily="49" charset="0"/>
+                        <a:buChar char="&gt;"/>
+                      </a:pPr>
+                      <a:r>
+                        <a:rPr lang="en-US" sz="1800" b="1" baseline="0" dirty="0">
+                          <a:solidFill>
+                            <a:srgbClr val="C00000"/>
+                          </a:solidFill>
+                          <a:latin typeface="Courier New" panose="02070309020205020404" pitchFamily="49" charset="0"/>
+                          <a:cs typeface="Courier New" panose="02070309020205020404" pitchFamily="49" charset="0"/>
+                        </a:rPr>
+                        <a:t>Counter</a:t>
+                      </a:r>
+                      <a:r>
+                        <a:rPr lang="en-US" sz="1800" b="1" baseline="0" dirty="0">
+                          <a:solidFill>
+                            <a:schemeClr val="tx1"/>
+                          </a:solidFill>
+                          <a:latin typeface="Courier New" panose="02070309020205020404" pitchFamily="49" charset="0"/>
+                          <a:cs typeface="Courier New" panose="02070309020205020404" pitchFamily="49" charset="0"/>
+                        </a:rPr>
+                        <a:t>(</a:t>
+                      </a:r>
+                      <a:r>
+                        <a:rPr lang="en-US" sz="1800" b="1" baseline="0" dirty="0" err="1">
+                          <a:solidFill>
+                            <a:schemeClr val="tx1"/>
+                          </a:solidFill>
+                          <a:latin typeface="Courier New" panose="02070309020205020404" pitchFamily="49" charset="0"/>
+                          <a:cs typeface="Courier New" panose="02070309020205020404" pitchFamily="49" charset="0"/>
+                        </a:rPr>
+                        <a:t>T.lower</a:t>
+                      </a:r>
+                      <a:r>
+                        <a:rPr lang="en-US" sz="1800" b="1" baseline="0" dirty="0">
+                          <a:solidFill>
+                            <a:schemeClr val="tx1"/>
+                          </a:solidFill>
+                          <a:latin typeface="Courier New" panose="02070309020205020404" pitchFamily="49" charset="0"/>
+                          <a:cs typeface="Courier New" panose="02070309020205020404" pitchFamily="49" charset="0"/>
+                        </a:rPr>
+                        <a:t>().split()).</a:t>
+                      </a:r>
+                      <a:r>
+                        <a:rPr lang="en-US" sz="1800" b="1" baseline="0" dirty="0" err="1">
+                          <a:solidFill>
+                            <a:schemeClr val="tx1"/>
+                          </a:solidFill>
+                          <a:latin typeface="Courier New" panose="02070309020205020404" pitchFamily="49" charset="0"/>
+                          <a:cs typeface="Courier New" panose="02070309020205020404" pitchFamily="49" charset="0"/>
+                        </a:rPr>
+                        <a:t>most_common</a:t>
+                      </a:r>
+                      <a:r>
+                        <a:rPr lang="en-US" sz="1800" b="1" baseline="0" dirty="0">
+                          <a:solidFill>
+                            <a:schemeClr val="tx1"/>
+                          </a:solidFill>
+                          <a:latin typeface="Courier New" panose="02070309020205020404" pitchFamily="49" charset="0"/>
+                          <a:cs typeface="Courier New" panose="02070309020205020404" pitchFamily="49" charset="0"/>
+                        </a:rPr>
+                        <a:t>(3)</a:t>
+                      </a:r>
+                    </a:p>
+                    <a:p>
+                      <a:pPr marL="266700" marR="0" lvl="0" indent="-266700" algn="l" defTabSz="914400" rtl="0" eaLnBrk="1" fontAlgn="auto" latinLnBrk="0" hangingPunct="1">
+                        <a:lnSpc>
+                          <a:spcPct val="100000"/>
+                        </a:lnSpc>
+                        <a:spcBef>
+                          <a:spcPts val="0"/>
+                        </a:spcBef>
+                        <a:spcAft>
+                          <a:spcPts val="0"/>
+                        </a:spcAft>
+                        <a:buClr>
+                          <a:schemeClr val="accent1">
+                            <a:lumMod val="50000"/>
+                          </a:schemeClr>
+                        </a:buClr>
+                        <a:buSzPct val="120000"/>
+                        <a:buFont typeface="Courier New" panose="02070309020205020404" pitchFamily="49" charset="0"/>
+                        <a:buChar char="|"/>
+                        <a:tabLst/>
+                        <a:defRPr/>
+                      </a:pPr>
+                      <a:r>
+                        <a:rPr lang="pt-BR" sz="1800" b="1" baseline="0" dirty="0">
+                          <a:solidFill>
+                            <a:schemeClr val="tx1"/>
+                          </a:solidFill>
+                          <a:latin typeface="Courier New" panose="02070309020205020404" pitchFamily="49" charset="0"/>
+                          <a:cs typeface="Courier New" panose="02070309020205020404" pitchFamily="49" charset="0"/>
+                        </a:rPr>
+                        <a:t>[('f', 5), ('dsa', 4), ('dsaf', 4)]</a:t>
+                      </a:r>
+                    </a:p>
+                  </a:txBody>
+                  <a:tcPr>
+                    <a:lnL w="6350" cap="flat" cmpd="sng" algn="ctr">
+                      <a:solidFill>
+                        <a:schemeClr val="tx1"/>
+                      </a:solidFill>
+                      <a:prstDash val="solid"/>
+                      <a:round/>
+                      <a:headEnd type="none" w="med" len="med"/>
+                      <a:tailEnd type="none" w="med" len="med"/>
+                    </a:lnL>
+                    <a:lnR w="6350" cap="flat" cmpd="sng" algn="ctr">
+                      <a:solidFill>
+                        <a:schemeClr val="tx1"/>
+                      </a:solidFill>
+                      <a:prstDash val="solid"/>
+                      <a:round/>
+                      <a:headEnd type="none" w="med" len="med"/>
+                      <a:tailEnd type="none" w="med" len="med"/>
+                    </a:lnR>
+                    <a:lnT w="6350" cap="flat" cmpd="sng" algn="ctr">
+                      <a:solidFill>
+                        <a:schemeClr val="tx1"/>
+                      </a:solidFill>
+                      <a:prstDash val="solid"/>
+                      <a:round/>
+                      <a:headEnd type="none" w="med" len="med"/>
+                      <a:tailEnd type="none" w="med" len="med"/>
+                    </a:lnT>
+                    <a:lnB w="6350" cap="flat" cmpd="sng" algn="ctr">
+                      <a:solidFill>
+                        <a:schemeClr val="tx1"/>
+                      </a:solidFill>
+                      <a:prstDash val="solid"/>
+                      <a:round/>
+                      <a:headEnd type="none" w="med" len="med"/>
+                      <a:tailEnd type="none" w="med" len="med"/>
+                    </a:lnB>
+                    <a:lnTlToBr w="12700" cmpd="sng">
+                      <a:noFill/>
+                      <a:prstDash val="solid"/>
+                    </a:lnTlToBr>
+                    <a:lnBlToTr w="12700" cmpd="sng">
+                      <a:noFill/>
+                      <a:prstDash val="solid"/>
+                    </a:lnBlToTr>
+                    <a:solidFill>
+                      <a:schemeClr val="accent5">
+                        <a:lumMod val="20000"/>
+                        <a:lumOff val="80000"/>
+                      </a:schemeClr>
+                    </a:solidFill>
+                  </a:tcPr>
+                </a:tc>
+                <a:extLst>
+                  <a:ext uri="{0D108BD9-81ED-4DB2-BD59-A6C34878D82A}">
+                    <a16:rowId xmlns:a16="http://schemas.microsoft.com/office/drawing/2014/main" val="4112970457"/>
+                  </a:ext>
+                </a:extLst>
+              </a:tr>
+            </a:tbl>
+          </a:graphicData>
+        </a:graphic>
+      </p:graphicFrame>
+    </p:spTree>
+    <p:extLst>
+      <p:ext uri="{BB962C8B-B14F-4D97-AF65-F5344CB8AC3E}">
+        <p14:creationId xmlns:p14="http://schemas.microsoft.com/office/powerpoint/2010/main" val="976103109"/>
+      </p:ext>
+    </p:extLst>
+  </p:cSld>
+  <p:clrMapOvr>
+    <a:masterClrMapping/>
+  </p:clrMapOvr>
+</p:sld>
+</file>
+
+<file path=ppt/slides/slide21.xml><?xml version="1.0" encoding="utf-8"?>
+<p:sld xmlns:a="http://schemas.openxmlformats.org/drawingml/2006/main" xmlns:r="http://schemas.openxmlformats.org/officeDocument/2006/relationships" xmlns:p="http://schemas.openxmlformats.org/presentationml/2006/main">
+  <p:cSld>
+    <p:spTree>
+      <p:nvGrpSpPr>
+        <p:cNvPr id="1" name=""/>
+        <p:cNvGrpSpPr/>
+        <p:nvPr/>
+      </p:nvGrpSpPr>
+      <p:grpSpPr>
+        <a:xfrm>
+          <a:off x="0" y="0"/>
+          <a:ext cx="0" cy="0"/>
+          <a:chOff x="0" y="0"/>
+          <a:chExt cx="0" cy="0"/>
+        </a:xfrm>
+      </p:grpSpPr>
+      <p:sp>
+        <p:nvSpPr>
           <p:cNvPr id="4" name="Rectangle 3"/>
           <p:cNvSpPr/>
           <p:nvPr/>
@@ -19391,7 +20988,7 @@
 </p:sld>
 </file>
 
-<file path=ppt/slides/slide21.xml><?xml version="1.0" encoding="utf-8"?>
+<file path=ppt/slides/slide22.xml><?xml version="1.0" encoding="utf-8"?>
 <p:sld xmlns:a="http://schemas.openxmlformats.org/drawingml/2006/main" xmlns:r="http://schemas.openxmlformats.org/officeDocument/2006/relationships" xmlns:p="http://schemas.openxmlformats.org/presentationml/2006/main">
   <p:cSld>
     <p:spTree>

</xml_diff>

<commit_message>
exercises.html all-slides-with-answers.pdf all-slides.pdf dictionaries.pdf dictionaries.pptx
</commit_message>
<xml_diff>
--- a/ipsa/slides/dictionaries.pptx
+++ b/ipsa/slides/dictionaries.pptx
@@ -149,7 +149,7 @@
   <pc:docChgLst>
     <pc:chgData name="Gerth Stølting Brodal" userId="04ef4784-6591-4f86-a140-f5c3b108582a" providerId="ADAL" clId="{73BAC7D6-516A-44B5-B4B0-C7B08CA8B392}"/>
     <pc:docChg chg="undo custSel modSld">
-      <pc:chgData name="Gerth Stølting Brodal" userId="04ef4784-6591-4f86-a140-f5c3b108582a" providerId="ADAL" clId="{73BAC7D6-516A-44B5-B4B0-C7B08CA8B392}" dt="2026-02-11T07:32:49.124" v="401" actId="20577"/>
+      <pc:chgData name="Gerth Stølting Brodal" userId="04ef4784-6591-4f86-a140-f5c3b108582a" providerId="ADAL" clId="{73BAC7D6-516A-44B5-B4B0-C7B08CA8B392}" dt="2026-02-19T15:16:27.918" v="453" actId="20577"/>
       <pc:docMkLst>
         <pc:docMk/>
       </pc:docMkLst>
@@ -396,7 +396,7 @@
         </pc:graphicFrameChg>
       </pc:sldChg>
       <pc:sldChg chg="modSp mod">
-        <pc:chgData name="Gerth Stølting Brodal" userId="04ef4784-6591-4f86-a140-f5c3b108582a" providerId="ADAL" clId="{73BAC7D6-516A-44B5-B4B0-C7B08CA8B392}" dt="2026-02-11T06:49:00.665" v="326" actId="790"/>
+        <pc:chgData name="Gerth Stølting Brodal" userId="04ef4784-6591-4f86-a140-f5c3b108582a" providerId="ADAL" clId="{73BAC7D6-516A-44B5-B4B0-C7B08CA8B392}" dt="2026-02-19T15:16:27.918" v="453" actId="20577"/>
         <pc:sldMkLst>
           <pc:docMk/>
           <pc:sldMk cId="3852152376" sldId="550"/>
@@ -410,7 +410,7 @@
           </ac:spMkLst>
         </pc:spChg>
         <pc:spChg chg="mod">
-          <ac:chgData name="Gerth Stølting Brodal" userId="04ef4784-6591-4f86-a140-f5c3b108582a" providerId="ADAL" clId="{73BAC7D6-516A-44B5-B4B0-C7B08CA8B392}" dt="2026-02-11T06:49:00.665" v="326" actId="790"/>
+          <ac:chgData name="Gerth Stølting Brodal" userId="04ef4784-6591-4f86-a140-f5c3b108582a" providerId="ADAL" clId="{73BAC7D6-516A-44B5-B4B0-C7B08CA8B392}" dt="2026-02-19T15:16:27.918" v="453" actId="20577"/>
           <ac:spMkLst>
             <pc:docMk/>
             <pc:sldMk cId="3852152376" sldId="550"/>
@@ -1130,7 +1130,7 @@
           <a:p>
             <a:fld id="{FB1A172F-81D4-4DC4-9113-1DBD56EC3646}" type="datetimeFigureOut">
               <a:rPr lang="en-US" smtClean="0"/>
-              <a:t>2/11/2026</a:t>
+              <a:t>2/19/2026</a:t>
             </a:fld>
             <a:endParaRPr lang="en-US"/>
           </a:p>
@@ -4050,7 +4050,7 @@
           <a:p>
             <a:fld id="{0560A9CD-0304-4E0B-9E82-E7E0115DE05B}" type="datetimeFigureOut">
               <a:rPr lang="en-US" smtClean="0"/>
-              <a:t>2/11/2026</a:t>
+              <a:t>2/19/2026</a:t>
             </a:fld>
             <a:endParaRPr lang="en-US"/>
           </a:p>
@@ -4218,7 +4218,7 @@
           <a:p>
             <a:fld id="{0560A9CD-0304-4E0B-9E82-E7E0115DE05B}" type="datetimeFigureOut">
               <a:rPr lang="en-US" smtClean="0"/>
-              <a:t>2/11/2026</a:t>
+              <a:t>2/19/2026</a:t>
             </a:fld>
             <a:endParaRPr lang="en-US"/>
           </a:p>
@@ -4396,7 +4396,7 @@
           <a:p>
             <a:fld id="{0560A9CD-0304-4E0B-9E82-E7E0115DE05B}" type="datetimeFigureOut">
               <a:rPr lang="en-US" smtClean="0"/>
-              <a:t>2/11/2026</a:t>
+              <a:t>2/19/2026</a:t>
             </a:fld>
             <a:endParaRPr lang="en-US"/>
           </a:p>
@@ -4573,7 +4573,7 @@
           <a:p>
             <a:fld id="{0560A9CD-0304-4E0B-9E82-E7E0115DE05B}" type="datetimeFigureOut">
               <a:rPr lang="en-US" smtClean="0"/>
-              <a:t>2/11/2026</a:t>
+              <a:t>2/19/2026</a:t>
             </a:fld>
             <a:endParaRPr lang="en-US"/>
           </a:p>
@@ -4818,7 +4818,7 @@
           <a:p>
             <a:fld id="{0560A9CD-0304-4E0B-9E82-E7E0115DE05B}" type="datetimeFigureOut">
               <a:rPr lang="en-US" smtClean="0"/>
-              <a:t>2/11/2026</a:t>
+              <a:t>2/19/2026</a:t>
             </a:fld>
             <a:endParaRPr lang="en-US"/>
           </a:p>
@@ -5047,7 +5047,7 @@
           <a:p>
             <a:fld id="{0560A9CD-0304-4E0B-9E82-E7E0115DE05B}" type="datetimeFigureOut">
               <a:rPr lang="en-US" smtClean="0"/>
-              <a:t>2/11/2026</a:t>
+              <a:t>2/19/2026</a:t>
             </a:fld>
             <a:endParaRPr lang="en-US"/>
           </a:p>
@@ -5411,7 +5411,7 @@
           <a:p>
             <a:fld id="{0560A9CD-0304-4E0B-9E82-E7E0115DE05B}" type="datetimeFigureOut">
               <a:rPr lang="en-US" smtClean="0"/>
-              <a:t>2/11/2026</a:t>
+              <a:t>2/19/2026</a:t>
             </a:fld>
             <a:endParaRPr lang="en-US"/>
           </a:p>
@@ -5528,7 +5528,7 @@
           <a:p>
             <a:fld id="{0560A9CD-0304-4E0B-9E82-E7E0115DE05B}" type="datetimeFigureOut">
               <a:rPr lang="en-US" smtClean="0"/>
-              <a:t>2/11/2026</a:t>
+              <a:t>2/19/2026</a:t>
             </a:fld>
             <a:endParaRPr lang="en-US"/>
           </a:p>
@@ -5623,7 +5623,7 @@
           <a:p>
             <a:fld id="{0560A9CD-0304-4E0B-9E82-E7E0115DE05B}" type="datetimeFigureOut">
               <a:rPr lang="en-US" smtClean="0"/>
-              <a:t>2/11/2026</a:t>
+              <a:t>2/19/2026</a:t>
             </a:fld>
             <a:endParaRPr lang="en-US"/>
           </a:p>
@@ -5898,7 +5898,7 @@
           <a:p>
             <a:fld id="{0560A9CD-0304-4E0B-9E82-E7E0115DE05B}" type="datetimeFigureOut">
               <a:rPr lang="en-US" smtClean="0"/>
-              <a:t>2/11/2026</a:t>
+              <a:t>2/19/2026</a:t>
             </a:fld>
             <a:endParaRPr lang="en-US"/>
           </a:p>
@@ -6150,7 +6150,7 @@
           <a:p>
             <a:fld id="{0560A9CD-0304-4E0B-9E82-E7E0115DE05B}" type="datetimeFigureOut">
               <a:rPr lang="en-US" smtClean="0"/>
-              <a:t>2/11/2026</a:t>
+              <a:t>2/19/2026</a:t>
             </a:fld>
             <a:endParaRPr lang="en-US"/>
           </a:p>
@@ -6361,7 +6361,7 @@
           <a:p>
             <a:fld id="{0560A9CD-0304-4E0B-9E82-E7E0115DE05B}" type="datetimeFigureOut">
               <a:rPr lang="en-US" smtClean="0"/>
-              <a:t>2/11/2026</a:t>
+              <a:t>2/19/2026</a:t>
             </a:fld>
             <a:endParaRPr lang="en-US"/>
           </a:p>
@@ -6942,7 +6942,7 @@
         </p:spPr>
         <p:txBody>
           <a:bodyPr>
-            <a:normAutofit/>
+            <a:normAutofit lnSpcReduction="10000"/>
           </a:bodyPr>
           <a:lstStyle/>
           <a:p>
@@ -7050,6 +7050,13 @@
             <a:r>
               <a:rPr lang="en-US" noProof="0" dirty="0"/>
               <a:t> represent mutable sets, where ”==” elements only appear once</a:t>
+            </a:r>
+            <a:br>
+              <a:rPr lang="en-US" noProof="0" dirty="0"/>
+            </a:br>
+            <a:r>
+              <a:rPr lang="en-US" noProof="0" dirty="0"/>
+              <a:t>(opposed to lists where elements can repeat)</a:t>
             </a:r>
           </a:p>
           <a:p>
@@ -21671,8 +21678,8 @@
           </a:p>
         </p:txBody>
       </p:sp>
-      <mc:AlternateContent xmlns:mc="http://schemas.openxmlformats.org/markup-compatibility/2006">
-        <mc:Choice xmlns:a14="http://schemas.microsoft.com/office/drawing/2010/main" Requires="a14">
+      <mc:AlternateContent xmlns:mc="http://schemas.openxmlformats.org/markup-compatibility/2006" xmlns:a14="http://schemas.microsoft.com/office/drawing/2010/main">
+        <mc:Choice Requires="a14">
           <p:sp>
             <p:nvSpPr>
               <p:cNvPr id="7" name="TextBox 6"/>
@@ -21713,6 +21720,7 @@
                             <a:solidFill>
                               <a:schemeClr val="tx1"/>
                             </a:solidFill>
+                            <a:latin typeface="Cambria Math" panose="02040503050406030204" pitchFamily="18" charset="0"/>
                           </a:rPr>
                         </m:ctrlPr>
                       </m:dPr>
@@ -21732,6 +21740,7 @@
                                 <a:solidFill>
                                   <a:schemeClr val="tx1"/>
                                 </a:solidFill>
+                                <a:latin typeface="Cambria Math" panose="02040503050406030204" pitchFamily="18" charset="0"/>
                               </a:rPr>
                             </m:ctrlPr>
                           </m:mPr>
@@ -21796,7 +21805,7 @@
             </p:txBody>
           </p:sp>
         </mc:Choice>
-        <mc:Fallback>
+        <mc:Fallback xmlns="">
           <p:sp>
             <p:nvSpPr>
               <p:cNvPr id="7" name="TextBox 6"/>

</xml_diff>